<commit_message>
Intent layouts and edit activity_signup.xml
</commit_message>
<xml_diff>
--- a/화면디자인.pptx
+++ b/화면디자인.pptx
@@ -270,7 +270,7 @@
           <a:p>
             <a:fld id="{9C821A5F-709B-4F3C-8FB8-505B675E4AE3}" type="datetimeFigureOut">
               <a:rPr lang="ko-KR" altLang="en-US" smtClean="0"/>
-              <a:t>2020-08-29</a:t>
+              <a:t>2020-09-06</a:t>
             </a:fld>
             <a:endParaRPr lang="ko-KR" altLang="en-US"/>
           </a:p>
@@ -468,7 +468,7 @@
           <a:p>
             <a:fld id="{9C821A5F-709B-4F3C-8FB8-505B675E4AE3}" type="datetimeFigureOut">
               <a:rPr lang="ko-KR" altLang="en-US" smtClean="0"/>
-              <a:t>2020-08-29</a:t>
+              <a:t>2020-09-06</a:t>
             </a:fld>
             <a:endParaRPr lang="ko-KR" altLang="en-US"/>
           </a:p>
@@ -676,7 +676,7 @@
           <a:p>
             <a:fld id="{9C821A5F-709B-4F3C-8FB8-505B675E4AE3}" type="datetimeFigureOut">
               <a:rPr lang="ko-KR" altLang="en-US" smtClean="0"/>
-              <a:t>2020-08-29</a:t>
+              <a:t>2020-09-06</a:t>
             </a:fld>
             <a:endParaRPr lang="ko-KR" altLang="en-US"/>
           </a:p>
@@ -874,7 +874,7 @@
           <a:p>
             <a:fld id="{9C821A5F-709B-4F3C-8FB8-505B675E4AE3}" type="datetimeFigureOut">
               <a:rPr lang="ko-KR" altLang="en-US" smtClean="0"/>
-              <a:t>2020-08-29</a:t>
+              <a:t>2020-09-06</a:t>
             </a:fld>
             <a:endParaRPr lang="ko-KR" altLang="en-US"/>
           </a:p>
@@ -1149,7 +1149,7 @@
           <a:p>
             <a:fld id="{9C821A5F-709B-4F3C-8FB8-505B675E4AE3}" type="datetimeFigureOut">
               <a:rPr lang="ko-KR" altLang="en-US" smtClean="0"/>
-              <a:t>2020-08-29</a:t>
+              <a:t>2020-09-06</a:t>
             </a:fld>
             <a:endParaRPr lang="ko-KR" altLang="en-US"/>
           </a:p>
@@ -1414,7 +1414,7 @@
           <a:p>
             <a:fld id="{9C821A5F-709B-4F3C-8FB8-505B675E4AE3}" type="datetimeFigureOut">
               <a:rPr lang="ko-KR" altLang="en-US" smtClean="0"/>
-              <a:t>2020-08-29</a:t>
+              <a:t>2020-09-06</a:t>
             </a:fld>
             <a:endParaRPr lang="ko-KR" altLang="en-US"/>
           </a:p>
@@ -1826,7 +1826,7 @@
           <a:p>
             <a:fld id="{9C821A5F-709B-4F3C-8FB8-505B675E4AE3}" type="datetimeFigureOut">
               <a:rPr lang="ko-KR" altLang="en-US" smtClean="0"/>
-              <a:t>2020-08-29</a:t>
+              <a:t>2020-09-06</a:t>
             </a:fld>
             <a:endParaRPr lang="ko-KR" altLang="en-US"/>
           </a:p>
@@ -1967,7 +1967,7 @@
           <a:p>
             <a:fld id="{9C821A5F-709B-4F3C-8FB8-505B675E4AE3}" type="datetimeFigureOut">
               <a:rPr lang="ko-KR" altLang="en-US" smtClean="0"/>
-              <a:t>2020-08-29</a:t>
+              <a:t>2020-09-06</a:t>
             </a:fld>
             <a:endParaRPr lang="ko-KR" altLang="en-US"/>
           </a:p>
@@ -2080,7 +2080,7 @@
           <a:p>
             <a:fld id="{9C821A5F-709B-4F3C-8FB8-505B675E4AE3}" type="datetimeFigureOut">
               <a:rPr lang="ko-KR" altLang="en-US" smtClean="0"/>
-              <a:t>2020-08-29</a:t>
+              <a:t>2020-09-06</a:t>
             </a:fld>
             <a:endParaRPr lang="ko-KR" altLang="en-US"/>
           </a:p>
@@ -2391,7 +2391,7 @@
           <a:p>
             <a:fld id="{9C821A5F-709B-4F3C-8FB8-505B675E4AE3}" type="datetimeFigureOut">
               <a:rPr lang="ko-KR" altLang="en-US" smtClean="0"/>
-              <a:t>2020-08-29</a:t>
+              <a:t>2020-09-06</a:t>
             </a:fld>
             <a:endParaRPr lang="ko-KR" altLang="en-US"/>
           </a:p>
@@ -2679,7 +2679,7 @@
           <a:p>
             <a:fld id="{9C821A5F-709B-4F3C-8FB8-505B675E4AE3}" type="datetimeFigureOut">
               <a:rPr lang="ko-KR" altLang="en-US" smtClean="0"/>
-              <a:t>2020-08-29</a:t>
+              <a:t>2020-09-06</a:t>
             </a:fld>
             <a:endParaRPr lang="ko-KR" altLang="en-US"/>
           </a:p>
@@ -2920,7 +2920,7 @@
           <a:p>
             <a:fld id="{9C821A5F-709B-4F3C-8FB8-505B675E4AE3}" type="datetimeFigureOut">
               <a:rPr lang="ko-KR" altLang="en-US" smtClean="0"/>
-              <a:t>2020-08-29</a:t>
+              <a:t>2020-09-06</a:t>
             </a:fld>
             <a:endParaRPr lang="ko-KR" altLang="en-US"/>
           </a:p>
@@ -7290,12 +7290,48 @@
           <a:chExt cx="0" cy="0"/>
         </a:xfrm>
       </p:grpSpPr>
+      <p:pic>
+        <p:nvPicPr>
+          <p:cNvPr id="5" name="그림 4">
+            <a:extLst>
+              <a:ext uri="{FF2B5EF4-FFF2-40B4-BE49-F238E27FC236}">
+                <a16:creationId xmlns:a16="http://schemas.microsoft.com/office/drawing/2014/main" id="{AAAD02F9-87F3-4E70-B10C-08E26B90DFDC}"/>
+              </a:ext>
+            </a:extLst>
+          </p:cNvPr>
+          <p:cNvPicPr>
+            <a:picLocks noChangeAspect="1"/>
+          </p:cNvPicPr>
+          <p:nvPr/>
+        </p:nvPicPr>
+        <p:blipFill>
+          <a:blip r:embed="rId2">
+            <a:extLst>
+              <a:ext uri="{28A0092B-C50C-407E-A947-70E740481C1C}">
+                <a14:useLocalDpi xmlns:a14="http://schemas.microsoft.com/office/drawing/2010/main" val="0"/>
+              </a:ext>
+            </a:extLst>
+          </a:blip>
+          <a:stretch>
+            <a:fillRect/>
+          </a:stretch>
+        </p:blipFill>
+        <p:spPr>
+          <a:xfrm>
+            <a:off x="529446" y="586130"/>
+            <a:ext cx="3322608" cy="5285690"/>
+          </a:xfrm>
+          <a:prstGeom prst="rect">
+            <a:avLst/>
+          </a:prstGeom>
+        </p:spPr>
+      </p:pic>
       <p:grpSp>
         <p:nvGrpSpPr>
-          <p:cNvPr id="45" name="그룹 44">
+          <p:cNvPr id="2" name="그룹 1">
             <a:extLst>
               <a:ext uri="{FF2B5EF4-FFF2-40B4-BE49-F238E27FC236}">
-                <a16:creationId xmlns:a16="http://schemas.microsoft.com/office/drawing/2014/main" id="{F752F325-7759-4319-8857-87E47C37F1F4}"/>
+                <a16:creationId xmlns:a16="http://schemas.microsoft.com/office/drawing/2014/main" id="{65FC85F1-0B34-4188-8D36-F57E361CF315}"/>
               </a:ext>
             </a:extLst>
           </p:cNvPr>
@@ -7304,139 +7340,68 @@
         </p:nvGrpSpPr>
         <p:grpSpPr>
           <a:xfrm>
-            <a:off x="529446" y="586130"/>
-            <a:ext cx="3322608" cy="5285690"/>
-            <a:chOff x="529446" y="586130"/>
-            <a:chExt cx="3322608" cy="5285690"/>
+            <a:off x="841335" y="1295306"/>
+            <a:ext cx="2748915" cy="307777"/>
+            <a:chOff x="840105" y="1300460"/>
+            <a:chExt cx="2748915" cy="307777"/>
           </a:xfrm>
         </p:grpSpPr>
-        <p:pic>
-          <p:nvPicPr>
-            <p:cNvPr id="5" name="그림 4">
+        <p:sp>
+          <p:nvSpPr>
+            <p:cNvPr id="6" name="직사각형 5">
               <a:extLst>
                 <a:ext uri="{FF2B5EF4-FFF2-40B4-BE49-F238E27FC236}">
-                  <a16:creationId xmlns:a16="http://schemas.microsoft.com/office/drawing/2014/main" id="{AAAD02F9-87F3-4E70-B10C-08E26B90DFDC}"/>
+                  <a16:creationId xmlns:a16="http://schemas.microsoft.com/office/drawing/2014/main" id="{C3F13A24-5ACC-44BF-A450-9233DD5727AF}"/>
                 </a:ext>
               </a:extLst>
             </p:cNvPr>
-            <p:cNvPicPr>
-              <a:picLocks noChangeAspect="1"/>
-            </p:cNvPicPr>
+            <p:cNvSpPr/>
             <p:nvPr/>
-          </p:nvPicPr>
-          <p:blipFill>
-            <a:blip r:embed="rId2">
-              <a:extLst>
-                <a:ext uri="{28A0092B-C50C-407E-A947-70E740481C1C}">
-                  <a14:useLocalDpi xmlns:a14="http://schemas.microsoft.com/office/drawing/2010/main" val="0"/>
-                </a:ext>
-              </a:extLst>
-            </a:blip>
-            <a:stretch>
-              <a:fillRect/>
-            </a:stretch>
-          </p:blipFill>
+          </p:nvSpPr>
           <p:spPr>
             <a:xfrm>
-              <a:off x="529446" y="586130"/>
-              <a:ext cx="3322608" cy="5285690"/>
+              <a:off x="840105" y="1300460"/>
+              <a:ext cx="2748915" cy="307777"/>
             </a:xfrm>
             <a:prstGeom prst="rect">
               <a:avLst/>
             </a:prstGeom>
+            <a:solidFill>
+              <a:srgbClr val="FFFFFF"/>
+            </a:solidFill>
+            <a:ln>
+              <a:solidFill>
+                <a:schemeClr val="accent3">
+                  <a:lumMod val="60000"/>
+                  <a:lumOff val="40000"/>
+                </a:schemeClr>
+              </a:solidFill>
+            </a:ln>
           </p:spPr>
-        </p:pic>
-        <p:grpSp>
-          <p:nvGrpSpPr>
-            <p:cNvPr id="44" name="그룹 43">
-              <a:extLst>
-                <a:ext uri="{FF2B5EF4-FFF2-40B4-BE49-F238E27FC236}">
-                  <a16:creationId xmlns:a16="http://schemas.microsoft.com/office/drawing/2014/main" id="{F5362A9C-2829-4B3B-BF9B-DEB24CC4D97E}"/>
-                </a:ext>
-              </a:extLst>
-            </p:cNvPr>
-            <p:cNvGrpSpPr/>
-            <p:nvPr/>
-          </p:nvGrpSpPr>
-          <p:grpSpPr>
-            <a:xfrm>
-              <a:off x="840105" y="1300460"/>
-              <a:ext cx="2748915" cy="307777"/>
-              <a:chOff x="840105" y="1300460"/>
-              <a:chExt cx="2748915" cy="307777"/>
-            </a:xfrm>
-          </p:grpSpPr>
-          <p:sp>
-            <p:nvSpPr>
-              <p:cNvPr id="6" name="직사각형 5">
-                <a:extLst>
-                  <a:ext uri="{FF2B5EF4-FFF2-40B4-BE49-F238E27FC236}">
-                    <a16:creationId xmlns:a16="http://schemas.microsoft.com/office/drawing/2014/main" id="{C3F13A24-5ACC-44BF-A450-9233DD5727AF}"/>
-                  </a:ext>
-                </a:extLst>
-              </p:cNvPr>
-              <p:cNvSpPr/>
-              <p:nvPr/>
-            </p:nvSpPr>
-            <p:spPr>
-              <a:xfrm>
-                <a:off x="840105" y="1300460"/>
-                <a:ext cx="2748915" cy="307777"/>
-              </a:xfrm>
-              <a:prstGeom prst="rect">
-                <a:avLst/>
-              </a:prstGeom>
-              <a:solidFill>
-                <a:srgbClr val="FFFFFF"/>
-              </a:solidFill>
-              <a:ln>
-                <a:solidFill>
-                  <a:schemeClr val="accent3">
-                    <a:lumMod val="60000"/>
-                    <a:lumOff val="40000"/>
-                  </a:schemeClr>
-                </a:solidFill>
-              </a:ln>
-            </p:spPr>
-            <p:txBody>
-              <a:bodyPr wrap="square" lIns="91440" tIns="45720" rIns="91440" bIns="45720">
-                <a:spAutoFit/>
-              </a:bodyPr>
-              <a:lstStyle/>
-              <a:p>
-                <a:r>
-                  <a:rPr lang="ko-KR" altLang="en-US" sz="1400">
-                    <a:latin typeface="Microsoft GothicNeo" panose="020B0500000101010101" pitchFamily="50" charset="-127"/>
-                    <a:ea typeface="Microsoft GothicNeo" panose="020B0500000101010101" pitchFamily="50" charset="-127"/>
-                    <a:cs typeface="Microsoft GothicNeo" panose="020B0500000101010101" pitchFamily="50" charset="-127"/>
-                  </a:rPr>
-                  <a:t>  </a:t>
-                </a:r>
-                <a:r>
-                  <a:rPr lang="en-US" altLang="ko-KR" sz="1400">
-                    <a:latin typeface="Microsoft GothicNeo" panose="020B0500000101010101" pitchFamily="50" charset="-127"/>
-                    <a:ea typeface="Microsoft GothicNeo" panose="020B0500000101010101" pitchFamily="50" charset="-127"/>
-                    <a:cs typeface="Microsoft GothicNeo" panose="020B0500000101010101" pitchFamily="50" charset="-127"/>
-                  </a:rPr>
-                  <a:t>  </a:t>
-                </a:r>
-                <a:r>
-                  <a:rPr lang="ko-KR" altLang="en-US" sz="1200" b="0" cap="none" spc="0">
-                    <a:ln w="0"/>
-                    <a:effectLst>
-                      <a:outerShdw blurRad="38100" dist="25400" dir="5400000" algn="ctr" rotWithShape="0">
-                        <a:srgbClr val="6E747A">
-                          <a:alpha val="43000"/>
-                        </a:srgbClr>
-                      </a:outerShdw>
-                    </a:effectLst>
-                    <a:latin typeface="Microsoft GothicNeo" panose="020B0500000101010101" pitchFamily="50" charset="-127"/>
-                    <a:ea typeface="Microsoft GothicNeo" panose="020B0500000101010101" pitchFamily="50" charset="-127"/>
-                    <a:cs typeface="Microsoft GothicNeo" panose="020B0500000101010101" pitchFamily="50" charset="-127"/>
-                  </a:rPr>
-                  <a:t>회원가입</a:t>
-                </a:r>
-                <a:endParaRPr lang="en-US" altLang="ko-KR" sz="1200" b="0" cap="none" spc="0">
+          <p:txBody>
+            <a:bodyPr wrap="square" lIns="91440" tIns="45720" rIns="91440" bIns="45720">
+              <a:spAutoFit/>
+            </a:bodyPr>
+            <a:lstStyle/>
+            <a:p>
+              <a:r>
+                <a:rPr lang="ko-KR" altLang="en-US" sz="1400">
+                  <a:latin typeface="Microsoft GothicNeo" panose="020B0500000101010101" pitchFamily="50" charset="-127"/>
+                  <a:ea typeface="Microsoft GothicNeo" panose="020B0500000101010101" pitchFamily="50" charset="-127"/>
+                  <a:cs typeface="Microsoft GothicNeo" panose="020B0500000101010101" pitchFamily="50" charset="-127"/>
+                </a:rPr>
+                <a:t>  </a:t>
+              </a:r>
+              <a:r>
+                <a:rPr lang="en-US" altLang="ko-KR" sz="1400">
+                  <a:latin typeface="Microsoft GothicNeo" panose="020B0500000101010101" pitchFamily="50" charset="-127"/>
+                  <a:ea typeface="Microsoft GothicNeo" panose="020B0500000101010101" pitchFamily="50" charset="-127"/>
+                  <a:cs typeface="Microsoft GothicNeo" panose="020B0500000101010101" pitchFamily="50" charset="-127"/>
+                </a:rPr>
+                <a:t>  </a:t>
+              </a:r>
+              <a:r>
+                <a:rPr lang="ko-KR" altLang="en-US" sz="1200" b="0" cap="none" spc="0">
                   <a:ln w="0"/>
                   <a:effectLst>
                     <a:outerShdw blurRad="38100" dist="25400" dir="5400000" algn="ctr" rotWithShape="0">
@@ -7448,149 +7413,18 @@
                   <a:latin typeface="Microsoft GothicNeo" panose="020B0500000101010101" pitchFamily="50" charset="-127"/>
                   <a:ea typeface="Microsoft GothicNeo" panose="020B0500000101010101" pitchFamily="50" charset="-127"/>
                   <a:cs typeface="Microsoft GothicNeo" panose="020B0500000101010101" pitchFamily="50" charset="-127"/>
-                </a:endParaRPr>
-              </a:p>
-            </p:txBody>
-          </p:sp>
-          <p:sp>
-            <p:nvSpPr>
-              <p:cNvPr id="13" name="L 도형 12">
-                <a:extLst>
-                  <a:ext uri="{FF2B5EF4-FFF2-40B4-BE49-F238E27FC236}">
-                    <a16:creationId xmlns:a16="http://schemas.microsoft.com/office/drawing/2014/main" id="{84E8DDDA-0D51-49C8-B3B7-152785C7B6A9}"/>
-                  </a:ext>
-                </a:extLst>
-              </p:cNvPr>
-              <p:cNvSpPr/>
-              <p:nvPr/>
-            </p:nvSpPr>
-            <p:spPr>
-              <a:xfrm rot="2866156">
-                <a:off x="962701" y="1429332"/>
-                <a:ext cx="97518" cy="93924"/>
-              </a:xfrm>
-              <a:prstGeom prst="corner">
-                <a:avLst>
-                  <a:gd name="adj1" fmla="val 24685"/>
-                  <a:gd name="adj2" fmla="val 22022"/>
-                </a:avLst>
-              </a:prstGeom>
-              <a:solidFill>
-                <a:schemeClr val="tx1"/>
-              </a:solidFill>
-              <a:ln>
-                <a:noFill/>
-              </a:ln>
-            </p:spPr>
-            <p:style>
-              <a:lnRef idx="2">
-                <a:schemeClr val="accent1">
-                  <a:shade val="50000"/>
-                </a:schemeClr>
-              </a:lnRef>
-              <a:fillRef idx="1">
-                <a:schemeClr val="accent1"/>
-              </a:fillRef>
-              <a:effectRef idx="0">
-                <a:schemeClr val="accent1"/>
-              </a:effectRef>
-              <a:fontRef idx="minor">
-                <a:schemeClr val="lt1"/>
-              </a:fontRef>
-            </p:style>
-            <p:txBody>
-              <a:bodyPr rtlCol="0" anchor="ctr"/>
-              <a:lstStyle/>
-              <a:p>
-                <a:pPr algn="ctr"/>
-                <a:endParaRPr lang="ko-KR" altLang="en-US"/>
-              </a:p>
-            </p:txBody>
-          </p:sp>
-        </p:grpSp>
-        <p:sp>
-          <p:nvSpPr>
-            <p:cNvPr id="14" name="직사각형 13">
-              <a:extLst>
-                <a:ext uri="{FF2B5EF4-FFF2-40B4-BE49-F238E27FC236}">
-                  <a16:creationId xmlns:a16="http://schemas.microsoft.com/office/drawing/2014/main" id="{A49B62CC-7FCA-4FD5-AB68-4A61FFEDB054}"/>
-                </a:ext>
-              </a:extLst>
-            </p:cNvPr>
-            <p:cNvSpPr/>
-            <p:nvPr/>
-          </p:nvSpPr>
-          <p:spPr>
-            <a:xfrm>
-              <a:off x="1079006" y="1946909"/>
-              <a:ext cx="2299122" cy="249927"/>
-            </a:xfrm>
-            <a:prstGeom prst="rect">
-              <a:avLst/>
-            </a:prstGeom>
-            <a:solidFill>
-              <a:schemeClr val="bg1"/>
-            </a:solidFill>
-            <a:ln w="9525">
-              <a:solidFill>
-                <a:schemeClr val="bg1">
-                  <a:lumMod val="85000"/>
-                </a:schemeClr>
-              </a:solidFill>
-            </a:ln>
-          </p:spPr>
-          <p:style>
-            <a:lnRef idx="2">
-              <a:schemeClr val="accent1">
-                <a:shade val="50000"/>
-              </a:schemeClr>
-            </a:lnRef>
-            <a:fillRef idx="1">
-              <a:schemeClr val="accent1"/>
-            </a:fillRef>
-            <a:effectRef idx="0">
-              <a:schemeClr val="accent1"/>
-            </a:effectRef>
-            <a:fontRef idx="minor">
-              <a:schemeClr val="lt1"/>
-            </a:fontRef>
-          </p:style>
-          <p:txBody>
-            <a:bodyPr rtlCol="0" anchor="ctr"/>
-            <a:lstStyle/>
-            <a:p>
-              <a:r>
-                <a:rPr lang="ko-KR" altLang="en-US" sz="1000">
-                  <a:solidFill>
-                    <a:schemeClr val="bg2">
-                      <a:lumMod val="75000"/>
-                    </a:schemeClr>
-                  </a:solidFill>
-                  <a:latin typeface="Microsoft GothicNeo" panose="020B0500000101010101" pitchFamily="50" charset="-127"/>
-                  <a:ea typeface="Microsoft GothicNeo" panose="020B0500000101010101" pitchFamily="50" charset="-127"/>
-                  <a:cs typeface="Microsoft GothicNeo" panose="020B0500000101010101" pitchFamily="50" charset="-127"/>
                 </a:rPr>
-                <a:t>이름을 입력해주세요</a:t>
+                <a:t>회원가입</a:t>
               </a:r>
-              <a:r>
-                <a:rPr lang="en-US" altLang="ko-KR" sz="1000">
-                  <a:solidFill>
-                    <a:schemeClr val="bg2">
-                      <a:lumMod val="75000"/>
-                    </a:schemeClr>
-                  </a:solidFill>
-                  <a:latin typeface="Microsoft GothicNeo" panose="020B0500000101010101" pitchFamily="50" charset="-127"/>
-                  <a:ea typeface="Microsoft GothicNeo" panose="020B0500000101010101" pitchFamily="50" charset="-127"/>
-                  <a:cs typeface="Microsoft GothicNeo" panose="020B0500000101010101" pitchFamily="50" charset="-127"/>
-                </a:rPr>
-                <a:t>.</a:t>
-              </a:r>
-              <a:endParaRPr lang="ko-KR" altLang="en-US" sz="1000">
-                <a:solidFill>
-                  <a:schemeClr val="bg2">
-                    <a:lumMod val="75000"/>
-                  </a:schemeClr>
-                </a:solidFill>
+              <a:endParaRPr lang="en-US" altLang="ko-KR" sz="1200" b="0" cap="none" spc="0">
+                <a:ln w="0"/>
+                <a:effectLst>
+                  <a:outerShdw blurRad="38100" dist="25400" dir="5400000" algn="ctr" rotWithShape="0">
+                    <a:srgbClr val="6E747A">
+                      <a:alpha val="43000"/>
+                    </a:srgbClr>
+                  </a:outerShdw>
+                </a:effectLst>
                 <a:latin typeface="Microsoft GothicNeo" panose="020B0500000101010101" pitchFamily="50" charset="-127"/>
                 <a:ea typeface="Microsoft GothicNeo" panose="020B0500000101010101" pitchFamily="50" charset="-127"/>
                 <a:cs typeface="Microsoft GothicNeo" panose="020B0500000101010101" pitchFamily="50" charset="-127"/>
@@ -7600,62 +7434,10 @@
         </p:sp>
         <p:sp>
           <p:nvSpPr>
-            <p:cNvPr id="23" name="TextBox 22">
+            <p:cNvPr id="13" name="L 도형 12">
               <a:extLst>
                 <a:ext uri="{FF2B5EF4-FFF2-40B4-BE49-F238E27FC236}">
-                  <a16:creationId xmlns:a16="http://schemas.microsoft.com/office/drawing/2014/main" id="{9600F5B3-16DB-4DE6-8C8A-E3EF58CEBFE4}"/>
-                </a:ext>
-              </a:extLst>
-            </p:cNvPr>
-            <p:cNvSpPr txBox="1"/>
-            <p:nvPr/>
-          </p:nvSpPr>
-          <p:spPr>
-            <a:xfrm>
-              <a:off x="1066232" y="1708889"/>
-              <a:ext cx="508473" cy="246221"/>
-            </a:xfrm>
-            <a:prstGeom prst="rect">
-              <a:avLst/>
-            </a:prstGeom>
-            <a:noFill/>
-          </p:spPr>
-          <p:txBody>
-            <a:bodyPr wrap="none" rtlCol="0">
-              <a:spAutoFit/>
-            </a:bodyPr>
-            <a:lstStyle/>
-            <a:p>
-              <a:r>
-                <a:rPr lang="ko-KR" altLang="en-US" sz="1000">
-                  <a:latin typeface="Microsoft GothicNeo" panose="020B0500000101010101" pitchFamily="50" charset="-127"/>
-                  <a:ea typeface="Microsoft GothicNeo" panose="020B0500000101010101" pitchFamily="50" charset="-127"/>
-                  <a:cs typeface="Microsoft GothicNeo" panose="020B0500000101010101" pitchFamily="50" charset="-127"/>
-                </a:rPr>
-                <a:t>이름 </a:t>
-              </a:r>
-              <a:r>
-                <a:rPr lang="en-US" altLang="ko-KR" sz="1000">
-                  <a:latin typeface="Microsoft GothicNeo" panose="020B0500000101010101" pitchFamily="50" charset="-127"/>
-                  <a:ea typeface="Microsoft GothicNeo" panose="020B0500000101010101" pitchFamily="50" charset="-127"/>
-                  <a:cs typeface="Microsoft GothicNeo" panose="020B0500000101010101" pitchFamily="50" charset="-127"/>
-                </a:rPr>
-                <a:t>*</a:t>
-              </a:r>
-              <a:endParaRPr lang="ko-KR" altLang="en-US" sz="1000">
-                <a:latin typeface="Microsoft GothicNeo" panose="020B0500000101010101" pitchFamily="50" charset="-127"/>
-                <a:ea typeface="Microsoft GothicNeo" panose="020B0500000101010101" pitchFamily="50" charset="-127"/>
-                <a:cs typeface="Microsoft GothicNeo" panose="020B0500000101010101" pitchFamily="50" charset="-127"/>
-              </a:endParaRPr>
-            </a:p>
-          </p:txBody>
-        </p:sp>
-        <p:sp>
-          <p:nvSpPr>
-            <p:cNvPr id="30" name="직사각형 29">
-              <a:extLst>
-                <a:ext uri="{FF2B5EF4-FFF2-40B4-BE49-F238E27FC236}">
-                  <a16:creationId xmlns:a16="http://schemas.microsoft.com/office/drawing/2014/main" id="{F3107D73-1D20-431C-8AC5-7336930F189D}"/>
+                  <a16:creationId xmlns:a16="http://schemas.microsoft.com/office/drawing/2014/main" id="{84E8DDDA-0D51-49C8-B3B7-152785C7B6A9}"/>
                 </a:ext>
               </a:extLst>
             </p:cNvPr>
@@ -7663,642 +7445,18 @@
             <p:nvPr/>
           </p:nvSpPr>
           <p:spPr>
-            <a:xfrm>
-              <a:off x="1066232" y="2434856"/>
-              <a:ext cx="2299122" cy="249927"/>
+            <a:xfrm rot="2866156">
+              <a:off x="962701" y="1429332"/>
+              <a:ext cx="97518" cy="93924"/>
             </a:xfrm>
-            <a:prstGeom prst="rect">
-              <a:avLst/>
+            <a:prstGeom prst="corner">
+              <a:avLst>
+                <a:gd name="adj1" fmla="val 24685"/>
+                <a:gd name="adj2" fmla="val 22022"/>
+              </a:avLst>
             </a:prstGeom>
             <a:solidFill>
-              <a:schemeClr val="bg1"/>
-            </a:solidFill>
-            <a:ln w="9525">
-              <a:solidFill>
-                <a:schemeClr val="bg1">
-                  <a:lumMod val="85000"/>
-                </a:schemeClr>
-              </a:solidFill>
-            </a:ln>
-          </p:spPr>
-          <p:style>
-            <a:lnRef idx="2">
-              <a:schemeClr val="accent1">
-                <a:shade val="50000"/>
-              </a:schemeClr>
-            </a:lnRef>
-            <a:fillRef idx="1">
-              <a:schemeClr val="accent1"/>
-            </a:fillRef>
-            <a:effectRef idx="0">
-              <a:schemeClr val="accent1"/>
-            </a:effectRef>
-            <a:fontRef idx="minor">
-              <a:schemeClr val="lt1"/>
-            </a:fontRef>
-          </p:style>
-          <p:txBody>
-            <a:bodyPr rtlCol="0" anchor="ctr"/>
-            <a:lstStyle/>
-            <a:p>
-              <a:r>
-                <a:rPr lang="en-US" altLang="ko-KR" sz="1000">
-                  <a:solidFill>
-                    <a:schemeClr val="bg2">
-                      <a:lumMod val="75000"/>
-                    </a:schemeClr>
-                  </a:solidFill>
-                  <a:latin typeface="Microsoft GothicNeo" panose="020B0500000101010101" pitchFamily="50" charset="-127"/>
-                  <a:ea typeface="Microsoft GothicNeo" panose="020B0500000101010101" pitchFamily="50" charset="-127"/>
-                  <a:cs typeface="Microsoft GothicNeo" panose="020B0500000101010101" pitchFamily="50" charset="-127"/>
-                </a:rPr>
-                <a:t>YYMMDD</a:t>
-              </a:r>
-              <a:endParaRPr lang="ko-KR" altLang="en-US" sz="1000">
-                <a:solidFill>
-                  <a:schemeClr val="bg2">
-                    <a:lumMod val="75000"/>
-                  </a:schemeClr>
-                </a:solidFill>
-                <a:latin typeface="Microsoft GothicNeo" panose="020B0500000101010101" pitchFamily="50" charset="-127"/>
-                <a:ea typeface="Microsoft GothicNeo" panose="020B0500000101010101" pitchFamily="50" charset="-127"/>
-                <a:cs typeface="Microsoft GothicNeo" panose="020B0500000101010101" pitchFamily="50" charset="-127"/>
-              </a:endParaRPr>
-            </a:p>
-          </p:txBody>
-        </p:sp>
-        <p:sp>
-          <p:nvSpPr>
-            <p:cNvPr id="31" name="TextBox 30">
-              <a:extLst>
-                <a:ext uri="{FF2B5EF4-FFF2-40B4-BE49-F238E27FC236}">
-                  <a16:creationId xmlns:a16="http://schemas.microsoft.com/office/drawing/2014/main" id="{0C887BDC-418F-4979-92E5-32E9940E47A3}"/>
-                </a:ext>
-              </a:extLst>
-            </p:cNvPr>
-            <p:cNvSpPr txBox="1"/>
-            <p:nvPr/>
-          </p:nvSpPr>
-          <p:spPr>
-            <a:xfrm>
-              <a:off x="1053458" y="2196836"/>
-              <a:ext cx="745717" cy="246221"/>
-            </a:xfrm>
-            <a:prstGeom prst="rect">
-              <a:avLst/>
-            </a:prstGeom>
-            <a:noFill/>
-          </p:spPr>
-          <p:txBody>
-            <a:bodyPr wrap="none" rtlCol="0">
-              <a:spAutoFit/>
-            </a:bodyPr>
-            <a:lstStyle/>
-            <a:p>
-              <a:r>
-                <a:rPr lang="ko-KR" altLang="en-US" sz="1000">
-                  <a:latin typeface="Microsoft GothicNeo" panose="020B0500000101010101" pitchFamily="50" charset="-127"/>
-                  <a:ea typeface="Microsoft GothicNeo" panose="020B0500000101010101" pitchFamily="50" charset="-127"/>
-                  <a:cs typeface="Microsoft GothicNeo" panose="020B0500000101010101" pitchFamily="50" charset="-127"/>
-                </a:rPr>
-                <a:t>생년월일 </a:t>
-              </a:r>
-              <a:r>
-                <a:rPr lang="en-US" altLang="ko-KR" sz="1000">
-                  <a:latin typeface="Microsoft GothicNeo" panose="020B0500000101010101" pitchFamily="50" charset="-127"/>
-                  <a:ea typeface="Microsoft GothicNeo" panose="020B0500000101010101" pitchFamily="50" charset="-127"/>
-                  <a:cs typeface="Microsoft GothicNeo" panose="020B0500000101010101" pitchFamily="50" charset="-127"/>
-                </a:rPr>
-                <a:t>*</a:t>
-              </a:r>
-              <a:endParaRPr lang="ko-KR" altLang="en-US" sz="1000">
-                <a:latin typeface="Microsoft GothicNeo" panose="020B0500000101010101" pitchFamily="50" charset="-127"/>
-                <a:ea typeface="Microsoft GothicNeo" panose="020B0500000101010101" pitchFamily="50" charset="-127"/>
-                <a:cs typeface="Microsoft GothicNeo" panose="020B0500000101010101" pitchFamily="50" charset="-127"/>
-              </a:endParaRPr>
-            </a:p>
-          </p:txBody>
-        </p:sp>
-        <p:sp>
-          <p:nvSpPr>
-            <p:cNvPr id="32" name="직사각형 31">
-              <a:extLst>
-                <a:ext uri="{FF2B5EF4-FFF2-40B4-BE49-F238E27FC236}">
-                  <a16:creationId xmlns:a16="http://schemas.microsoft.com/office/drawing/2014/main" id="{45428230-8660-4AB5-B29D-4E5BC9DBD114}"/>
-                </a:ext>
-              </a:extLst>
-            </p:cNvPr>
-            <p:cNvSpPr/>
-            <p:nvPr/>
-          </p:nvSpPr>
-          <p:spPr>
-            <a:xfrm>
-              <a:off x="1066232" y="2930215"/>
-              <a:ext cx="2299122" cy="249927"/>
-            </a:xfrm>
-            <a:prstGeom prst="rect">
-              <a:avLst/>
-            </a:prstGeom>
-            <a:solidFill>
-              <a:schemeClr val="bg1"/>
-            </a:solidFill>
-            <a:ln w="9525">
-              <a:solidFill>
-                <a:schemeClr val="bg1">
-                  <a:lumMod val="85000"/>
-                </a:schemeClr>
-              </a:solidFill>
-            </a:ln>
-          </p:spPr>
-          <p:style>
-            <a:lnRef idx="2">
-              <a:schemeClr val="accent1">
-                <a:shade val="50000"/>
-              </a:schemeClr>
-            </a:lnRef>
-            <a:fillRef idx="1">
-              <a:schemeClr val="accent1"/>
-            </a:fillRef>
-            <a:effectRef idx="0">
-              <a:schemeClr val="accent1"/>
-            </a:effectRef>
-            <a:fontRef idx="minor">
-              <a:schemeClr val="lt1"/>
-            </a:fontRef>
-          </p:style>
-          <p:txBody>
-            <a:bodyPr rtlCol="0" anchor="ctr"/>
-            <a:lstStyle/>
-            <a:p>
-              <a:r>
-                <a:rPr lang="en-US" altLang="ko-KR" sz="1000">
-                  <a:solidFill>
-                    <a:schemeClr val="bg2">
-                      <a:lumMod val="75000"/>
-                    </a:schemeClr>
-                  </a:solidFill>
-                  <a:latin typeface="Microsoft GothicNeo" panose="020B0500000101010101" pitchFamily="50" charset="-127"/>
-                  <a:ea typeface="Microsoft GothicNeo" panose="020B0500000101010101" pitchFamily="50" charset="-127"/>
-                  <a:cs typeface="Microsoft GothicNeo" panose="020B0500000101010101" pitchFamily="50" charset="-127"/>
-                </a:rPr>
-                <a:t>000-0000-0000</a:t>
-              </a:r>
-              <a:endParaRPr lang="ko-KR" altLang="en-US" sz="1000">
-                <a:solidFill>
-                  <a:schemeClr val="bg2">
-                    <a:lumMod val="75000"/>
-                  </a:schemeClr>
-                </a:solidFill>
-                <a:latin typeface="Microsoft GothicNeo" panose="020B0500000101010101" pitchFamily="50" charset="-127"/>
-                <a:ea typeface="Microsoft GothicNeo" panose="020B0500000101010101" pitchFamily="50" charset="-127"/>
-                <a:cs typeface="Microsoft GothicNeo" panose="020B0500000101010101" pitchFamily="50" charset="-127"/>
-              </a:endParaRPr>
-            </a:p>
-          </p:txBody>
-        </p:sp>
-        <p:sp>
-          <p:nvSpPr>
-            <p:cNvPr id="33" name="TextBox 32">
-              <a:extLst>
-                <a:ext uri="{FF2B5EF4-FFF2-40B4-BE49-F238E27FC236}">
-                  <a16:creationId xmlns:a16="http://schemas.microsoft.com/office/drawing/2014/main" id="{0979E462-1601-4C53-A7F0-EAD50C1F4305}"/>
-                </a:ext>
-              </a:extLst>
-            </p:cNvPr>
-            <p:cNvSpPr txBox="1"/>
-            <p:nvPr/>
-          </p:nvSpPr>
-          <p:spPr>
-            <a:xfrm>
-              <a:off x="1053458" y="2692195"/>
-              <a:ext cx="745717" cy="246221"/>
-            </a:xfrm>
-            <a:prstGeom prst="rect">
-              <a:avLst/>
-            </a:prstGeom>
-            <a:noFill/>
-          </p:spPr>
-          <p:txBody>
-            <a:bodyPr wrap="none" rtlCol="0">
-              <a:spAutoFit/>
-            </a:bodyPr>
-            <a:lstStyle/>
-            <a:p>
-              <a:r>
-                <a:rPr lang="ko-KR" altLang="en-US" sz="1000">
-                  <a:latin typeface="Microsoft GothicNeo" panose="020B0500000101010101" pitchFamily="50" charset="-127"/>
-                  <a:ea typeface="Microsoft GothicNeo" panose="020B0500000101010101" pitchFamily="50" charset="-127"/>
-                  <a:cs typeface="Microsoft GothicNeo" panose="020B0500000101010101" pitchFamily="50" charset="-127"/>
-                </a:rPr>
-                <a:t>전화번호 </a:t>
-              </a:r>
-              <a:r>
-                <a:rPr lang="en-US" altLang="ko-KR" sz="1000">
-                  <a:latin typeface="Microsoft GothicNeo" panose="020B0500000101010101" pitchFamily="50" charset="-127"/>
-                  <a:ea typeface="Microsoft GothicNeo" panose="020B0500000101010101" pitchFamily="50" charset="-127"/>
-                  <a:cs typeface="Microsoft GothicNeo" panose="020B0500000101010101" pitchFamily="50" charset="-127"/>
-                </a:rPr>
-                <a:t>*</a:t>
-              </a:r>
-              <a:endParaRPr lang="ko-KR" altLang="en-US" sz="1000">
-                <a:latin typeface="Microsoft GothicNeo" panose="020B0500000101010101" pitchFamily="50" charset="-127"/>
-                <a:ea typeface="Microsoft GothicNeo" panose="020B0500000101010101" pitchFamily="50" charset="-127"/>
-                <a:cs typeface="Microsoft GothicNeo" panose="020B0500000101010101" pitchFamily="50" charset="-127"/>
-              </a:endParaRPr>
-            </a:p>
-          </p:txBody>
-        </p:sp>
-        <p:sp>
-          <p:nvSpPr>
-            <p:cNvPr id="34" name="직사각형 33">
-              <a:extLst>
-                <a:ext uri="{FF2B5EF4-FFF2-40B4-BE49-F238E27FC236}">
-                  <a16:creationId xmlns:a16="http://schemas.microsoft.com/office/drawing/2014/main" id="{9C68A048-9431-42E2-B33A-7240A08CE941}"/>
-                </a:ext>
-              </a:extLst>
-            </p:cNvPr>
-            <p:cNvSpPr/>
-            <p:nvPr/>
-          </p:nvSpPr>
-          <p:spPr>
-            <a:xfrm>
-              <a:off x="1079006" y="3418162"/>
-              <a:ext cx="2299122" cy="249927"/>
-            </a:xfrm>
-            <a:prstGeom prst="rect">
-              <a:avLst/>
-            </a:prstGeom>
-            <a:solidFill>
-              <a:schemeClr val="bg1"/>
-            </a:solidFill>
-            <a:ln w="9525">
-              <a:solidFill>
-                <a:schemeClr val="bg1">
-                  <a:lumMod val="85000"/>
-                </a:schemeClr>
-              </a:solidFill>
-            </a:ln>
-          </p:spPr>
-          <p:style>
-            <a:lnRef idx="2">
-              <a:schemeClr val="accent1">
-                <a:shade val="50000"/>
-              </a:schemeClr>
-            </a:lnRef>
-            <a:fillRef idx="1">
-              <a:schemeClr val="accent1"/>
-            </a:fillRef>
-            <a:effectRef idx="0">
-              <a:schemeClr val="accent1"/>
-            </a:effectRef>
-            <a:fontRef idx="minor">
-              <a:schemeClr val="lt1"/>
-            </a:fontRef>
-          </p:style>
-          <p:txBody>
-            <a:bodyPr rtlCol="0" anchor="ctr"/>
-            <a:lstStyle/>
-            <a:p>
-              <a:r>
-                <a:rPr lang="ko-KR" altLang="en-US" sz="1000">
-                  <a:solidFill>
-                    <a:schemeClr val="bg2">
-                      <a:lumMod val="75000"/>
-                    </a:schemeClr>
-                  </a:solidFill>
-                  <a:latin typeface="Microsoft GothicNeo" panose="020B0500000101010101" pitchFamily="50" charset="-127"/>
-                  <a:ea typeface="Microsoft GothicNeo" panose="020B0500000101010101" pitchFamily="50" charset="-127"/>
-                  <a:cs typeface="Microsoft GothicNeo" panose="020B0500000101010101" pitchFamily="50" charset="-127"/>
-                </a:rPr>
-                <a:t>정확한 학교명을 입력해주세요</a:t>
-              </a:r>
-              <a:r>
-                <a:rPr lang="en-US" altLang="ko-KR" sz="1000">
-                  <a:solidFill>
-                    <a:schemeClr val="bg2">
-                      <a:lumMod val="75000"/>
-                    </a:schemeClr>
-                  </a:solidFill>
-                  <a:latin typeface="Microsoft GothicNeo" panose="020B0500000101010101" pitchFamily="50" charset="-127"/>
-                  <a:ea typeface="Microsoft GothicNeo" panose="020B0500000101010101" pitchFamily="50" charset="-127"/>
-                  <a:cs typeface="Microsoft GothicNeo" panose="020B0500000101010101" pitchFamily="50" charset="-127"/>
-                </a:rPr>
-                <a:t>.</a:t>
-              </a:r>
-              <a:endParaRPr lang="ko-KR" altLang="en-US" sz="1000">
-                <a:solidFill>
-                  <a:schemeClr val="bg2">
-                    <a:lumMod val="75000"/>
-                  </a:schemeClr>
-                </a:solidFill>
-                <a:latin typeface="Microsoft GothicNeo" panose="020B0500000101010101" pitchFamily="50" charset="-127"/>
-                <a:ea typeface="Microsoft GothicNeo" panose="020B0500000101010101" pitchFamily="50" charset="-127"/>
-                <a:cs typeface="Microsoft GothicNeo" panose="020B0500000101010101" pitchFamily="50" charset="-127"/>
-              </a:endParaRPr>
-            </a:p>
-          </p:txBody>
-        </p:sp>
-        <p:sp>
-          <p:nvSpPr>
-            <p:cNvPr id="35" name="TextBox 34">
-              <a:extLst>
-                <a:ext uri="{FF2B5EF4-FFF2-40B4-BE49-F238E27FC236}">
-                  <a16:creationId xmlns:a16="http://schemas.microsoft.com/office/drawing/2014/main" id="{C94B2845-3191-44F3-99CC-3008806E6D5D}"/>
-                </a:ext>
-              </a:extLst>
-            </p:cNvPr>
-            <p:cNvSpPr txBox="1"/>
-            <p:nvPr/>
-          </p:nvSpPr>
-          <p:spPr>
-            <a:xfrm>
-              <a:off x="1066232" y="3180142"/>
-              <a:ext cx="455574" cy="246221"/>
-            </a:xfrm>
-            <a:prstGeom prst="rect">
-              <a:avLst/>
-            </a:prstGeom>
-            <a:noFill/>
-          </p:spPr>
-          <p:txBody>
-            <a:bodyPr wrap="none" rtlCol="0">
-              <a:spAutoFit/>
-            </a:bodyPr>
-            <a:lstStyle/>
-            <a:p>
-              <a:r>
-                <a:rPr lang="ko-KR" altLang="en-US" sz="1000">
-                  <a:latin typeface="Microsoft GothicNeo" panose="020B0500000101010101" pitchFamily="50" charset="-127"/>
-                  <a:ea typeface="Microsoft GothicNeo" panose="020B0500000101010101" pitchFamily="50" charset="-127"/>
-                  <a:cs typeface="Microsoft GothicNeo" panose="020B0500000101010101" pitchFamily="50" charset="-127"/>
-                </a:rPr>
-                <a:t>학교 </a:t>
-              </a:r>
-            </a:p>
-          </p:txBody>
-        </p:sp>
-        <p:sp>
-          <p:nvSpPr>
-            <p:cNvPr id="36" name="직사각형 35">
-              <a:extLst>
-                <a:ext uri="{FF2B5EF4-FFF2-40B4-BE49-F238E27FC236}">
-                  <a16:creationId xmlns:a16="http://schemas.microsoft.com/office/drawing/2014/main" id="{0D23478B-CD87-4533-94E9-E480046C4EED}"/>
-                </a:ext>
-              </a:extLst>
-            </p:cNvPr>
-            <p:cNvSpPr/>
-            <p:nvPr/>
-          </p:nvSpPr>
-          <p:spPr>
-            <a:xfrm>
-              <a:off x="1091779" y="3913521"/>
-              <a:ext cx="2299122" cy="249927"/>
-            </a:xfrm>
-            <a:prstGeom prst="rect">
-              <a:avLst/>
-            </a:prstGeom>
-            <a:solidFill>
-              <a:schemeClr val="bg1"/>
-            </a:solidFill>
-            <a:ln w="9525">
-              <a:solidFill>
-                <a:schemeClr val="bg1">
-                  <a:lumMod val="85000"/>
-                </a:schemeClr>
-              </a:solidFill>
-            </a:ln>
-          </p:spPr>
-          <p:style>
-            <a:lnRef idx="2">
-              <a:schemeClr val="accent1">
-                <a:shade val="50000"/>
-              </a:schemeClr>
-            </a:lnRef>
-            <a:fillRef idx="1">
-              <a:schemeClr val="accent1"/>
-            </a:fillRef>
-            <a:effectRef idx="0">
-              <a:schemeClr val="accent1"/>
-            </a:effectRef>
-            <a:fontRef idx="minor">
-              <a:schemeClr val="lt1"/>
-            </a:fontRef>
-          </p:style>
-          <p:txBody>
-            <a:bodyPr rtlCol="0" anchor="ctr"/>
-            <a:lstStyle/>
-            <a:p>
-              <a:r>
-                <a:rPr lang="ko-KR" altLang="en-US" sz="1000">
-                  <a:solidFill>
-                    <a:schemeClr val="bg2">
-                      <a:lumMod val="75000"/>
-                    </a:schemeClr>
-                  </a:solidFill>
-                  <a:latin typeface="Microsoft GothicNeo" panose="020B0500000101010101" pitchFamily="50" charset="-127"/>
-                  <a:ea typeface="Microsoft GothicNeo" panose="020B0500000101010101" pitchFamily="50" charset="-127"/>
-                  <a:cs typeface="Microsoft GothicNeo" panose="020B0500000101010101" pitchFamily="50" charset="-127"/>
-                </a:rPr>
-                <a:t>비밀번호</a:t>
-              </a:r>
-            </a:p>
-          </p:txBody>
-        </p:sp>
-        <p:sp>
-          <p:nvSpPr>
-            <p:cNvPr id="37" name="TextBox 36">
-              <a:extLst>
-                <a:ext uri="{FF2B5EF4-FFF2-40B4-BE49-F238E27FC236}">
-                  <a16:creationId xmlns:a16="http://schemas.microsoft.com/office/drawing/2014/main" id="{1FCE9CCD-CD49-4610-B276-4DEE3D646C2D}"/>
-                </a:ext>
-              </a:extLst>
-            </p:cNvPr>
-            <p:cNvSpPr txBox="1"/>
-            <p:nvPr/>
-          </p:nvSpPr>
-          <p:spPr>
-            <a:xfrm>
-              <a:off x="1079005" y="3675501"/>
-              <a:ext cx="745717" cy="246221"/>
-            </a:xfrm>
-            <a:prstGeom prst="rect">
-              <a:avLst/>
-            </a:prstGeom>
-            <a:noFill/>
-          </p:spPr>
-          <p:txBody>
-            <a:bodyPr wrap="none" rtlCol="0">
-              <a:spAutoFit/>
-            </a:bodyPr>
-            <a:lstStyle/>
-            <a:p>
-              <a:r>
-                <a:rPr lang="ko-KR" altLang="en-US" sz="1000">
-                  <a:latin typeface="Microsoft GothicNeo" panose="020B0500000101010101" pitchFamily="50" charset="-127"/>
-                  <a:ea typeface="Microsoft GothicNeo" panose="020B0500000101010101" pitchFamily="50" charset="-127"/>
-                  <a:cs typeface="Microsoft GothicNeo" panose="020B0500000101010101" pitchFamily="50" charset="-127"/>
-                </a:rPr>
-                <a:t>비밀번호 </a:t>
-              </a:r>
-              <a:r>
-                <a:rPr lang="en-US" altLang="ko-KR" sz="1000">
-                  <a:latin typeface="Microsoft GothicNeo" panose="020B0500000101010101" pitchFamily="50" charset="-127"/>
-                  <a:ea typeface="Microsoft GothicNeo" panose="020B0500000101010101" pitchFamily="50" charset="-127"/>
-                  <a:cs typeface="Microsoft GothicNeo" panose="020B0500000101010101" pitchFamily="50" charset="-127"/>
-                </a:rPr>
-                <a:t>*</a:t>
-              </a:r>
-              <a:endParaRPr lang="ko-KR" altLang="en-US" sz="1000">
-                <a:latin typeface="Microsoft GothicNeo" panose="020B0500000101010101" pitchFamily="50" charset="-127"/>
-                <a:ea typeface="Microsoft GothicNeo" panose="020B0500000101010101" pitchFamily="50" charset="-127"/>
-                <a:cs typeface="Microsoft GothicNeo" panose="020B0500000101010101" pitchFamily="50" charset="-127"/>
-              </a:endParaRPr>
-            </a:p>
-          </p:txBody>
-        </p:sp>
-        <p:sp>
-          <p:nvSpPr>
-            <p:cNvPr id="38" name="직사각형 37">
-              <a:extLst>
-                <a:ext uri="{FF2B5EF4-FFF2-40B4-BE49-F238E27FC236}">
-                  <a16:creationId xmlns:a16="http://schemas.microsoft.com/office/drawing/2014/main" id="{F8DD150C-CF31-4C61-B831-7DB65CBBEAA9}"/>
-                </a:ext>
-              </a:extLst>
-            </p:cNvPr>
-            <p:cNvSpPr/>
-            <p:nvPr/>
-          </p:nvSpPr>
-          <p:spPr>
-            <a:xfrm>
-              <a:off x="1091779" y="4408880"/>
-              <a:ext cx="2299122" cy="249927"/>
-            </a:xfrm>
-            <a:prstGeom prst="rect">
-              <a:avLst/>
-            </a:prstGeom>
-            <a:solidFill>
-              <a:schemeClr val="bg1"/>
-            </a:solidFill>
-            <a:ln w="9525">
-              <a:solidFill>
-                <a:schemeClr val="bg1">
-                  <a:lumMod val="85000"/>
-                </a:schemeClr>
-              </a:solidFill>
-            </a:ln>
-          </p:spPr>
-          <p:style>
-            <a:lnRef idx="2">
-              <a:schemeClr val="accent1">
-                <a:shade val="50000"/>
-              </a:schemeClr>
-            </a:lnRef>
-            <a:fillRef idx="1">
-              <a:schemeClr val="accent1"/>
-            </a:fillRef>
-            <a:effectRef idx="0">
-              <a:schemeClr val="accent1"/>
-            </a:effectRef>
-            <a:fontRef idx="minor">
-              <a:schemeClr val="lt1"/>
-            </a:fontRef>
-          </p:style>
-          <p:txBody>
-            <a:bodyPr rtlCol="0" anchor="ctr"/>
-            <a:lstStyle/>
-            <a:p>
-              <a:r>
-                <a:rPr lang="ko-KR" altLang="en-US" sz="1000">
-                  <a:solidFill>
-                    <a:schemeClr val="bg2">
-                      <a:lumMod val="75000"/>
-                    </a:schemeClr>
-                  </a:solidFill>
-                  <a:latin typeface="Microsoft GothicNeo" panose="020B0500000101010101" pitchFamily="50" charset="-127"/>
-                  <a:ea typeface="Microsoft GothicNeo" panose="020B0500000101010101" pitchFamily="50" charset="-127"/>
-                  <a:cs typeface="Microsoft GothicNeo" panose="020B0500000101010101" pitchFamily="50" charset="-127"/>
-                </a:rPr>
-                <a:t>비밀번호 확인</a:t>
-              </a:r>
-            </a:p>
-          </p:txBody>
-        </p:sp>
-        <p:sp>
-          <p:nvSpPr>
-            <p:cNvPr id="39" name="TextBox 38">
-              <a:extLst>
-                <a:ext uri="{FF2B5EF4-FFF2-40B4-BE49-F238E27FC236}">
-                  <a16:creationId xmlns:a16="http://schemas.microsoft.com/office/drawing/2014/main" id="{F6D1FE15-D32D-456D-9A91-C1D3D5F39028}"/>
-                </a:ext>
-              </a:extLst>
-            </p:cNvPr>
-            <p:cNvSpPr txBox="1"/>
-            <p:nvPr/>
-          </p:nvSpPr>
-          <p:spPr>
-            <a:xfrm>
-              <a:off x="1079005" y="4170860"/>
-              <a:ext cx="1016625" cy="246221"/>
-            </a:xfrm>
-            <a:prstGeom prst="rect">
-              <a:avLst/>
-            </a:prstGeom>
-            <a:noFill/>
-          </p:spPr>
-          <p:txBody>
-            <a:bodyPr wrap="none" rtlCol="0">
-              <a:spAutoFit/>
-            </a:bodyPr>
-            <a:lstStyle/>
-            <a:p>
-              <a:r>
-                <a:rPr lang="ko-KR" altLang="en-US" sz="1000">
-                  <a:latin typeface="Microsoft GothicNeo" panose="020B0500000101010101" pitchFamily="50" charset="-127"/>
-                  <a:ea typeface="Microsoft GothicNeo" panose="020B0500000101010101" pitchFamily="50" charset="-127"/>
-                  <a:cs typeface="Microsoft GothicNeo" panose="020B0500000101010101" pitchFamily="50" charset="-127"/>
-                </a:rPr>
-                <a:t>비밀번호 확인 </a:t>
-              </a:r>
-              <a:r>
-                <a:rPr lang="en-US" altLang="ko-KR" sz="1000">
-                  <a:latin typeface="Microsoft GothicNeo" panose="020B0500000101010101" pitchFamily="50" charset="-127"/>
-                  <a:ea typeface="Microsoft GothicNeo" panose="020B0500000101010101" pitchFamily="50" charset="-127"/>
-                  <a:cs typeface="Microsoft GothicNeo" panose="020B0500000101010101" pitchFamily="50" charset="-127"/>
-                </a:rPr>
-                <a:t>*</a:t>
-              </a:r>
-              <a:endParaRPr lang="ko-KR" altLang="en-US" sz="1000">
-                <a:latin typeface="Microsoft GothicNeo" panose="020B0500000101010101" pitchFamily="50" charset="-127"/>
-                <a:ea typeface="Microsoft GothicNeo" panose="020B0500000101010101" pitchFamily="50" charset="-127"/>
-                <a:cs typeface="Microsoft GothicNeo" panose="020B0500000101010101" pitchFamily="50" charset="-127"/>
-              </a:endParaRPr>
-            </a:p>
-          </p:txBody>
-        </p:sp>
-        <p:sp>
-          <p:nvSpPr>
-            <p:cNvPr id="43" name="직사각형 42">
-              <a:extLst>
-                <a:ext uri="{FF2B5EF4-FFF2-40B4-BE49-F238E27FC236}">
-                  <a16:creationId xmlns:a16="http://schemas.microsoft.com/office/drawing/2014/main" id="{CCF495D8-4D6C-47E9-8A4B-7EC76ECA7758}"/>
-                </a:ext>
-              </a:extLst>
-            </p:cNvPr>
-            <p:cNvSpPr/>
-            <p:nvPr/>
-          </p:nvSpPr>
-          <p:spPr>
-            <a:xfrm>
-              <a:off x="1034693" y="4872327"/>
-              <a:ext cx="2362200" cy="307778"/>
-            </a:xfrm>
-            <a:prstGeom prst="rect">
-              <a:avLst/>
-            </a:prstGeom>
-            <a:solidFill>
-              <a:schemeClr val="accent1">
-                <a:lumMod val="75000"/>
-              </a:schemeClr>
+              <a:schemeClr val="tx1"/>
             </a:solidFill>
             <a:ln>
               <a:noFill/>
@@ -8325,14 +7483,1061 @@
             <a:lstStyle/>
             <a:p>
               <a:pPr algn="ctr"/>
+              <a:endParaRPr lang="ko-KR" altLang="en-US"/>
+            </a:p>
+          </p:txBody>
+        </p:sp>
+      </p:grpSp>
+      <p:sp>
+        <p:nvSpPr>
+          <p:cNvPr id="14" name="직사각형 13">
+            <a:extLst>
+              <a:ext uri="{FF2B5EF4-FFF2-40B4-BE49-F238E27FC236}">
+                <a16:creationId xmlns:a16="http://schemas.microsoft.com/office/drawing/2014/main" id="{A49B62CC-7FCA-4FD5-AB68-4A61FFEDB054}"/>
+              </a:ext>
+            </a:extLst>
+          </p:cNvPr>
+          <p:cNvSpPr/>
+          <p:nvPr/>
+        </p:nvSpPr>
+        <p:spPr>
+          <a:xfrm>
+            <a:off x="1079006" y="1946909"/>
+            <a:ext cx="2299122" cy="249927"/>
+          </a:xfrm>
+          <a:prstGeom prst="rect">
+            <a:avLst/>
+          </a:prstGeom>
+          <a:solidFill>
+            <a:schemeClr val="bg1"/>
+          </a:solidFill>
+          <a:ln w="9525">
+            <a:solidFill>
+              <a:schemeClr val="bg1">
+                <a:lumMod val="85000"/>
+              </a:schemeClr>
+            </a:solidFill>
+          </a:ln>
+        </p:spPr>
+        <p:style>
+          <a:lnRef idx="2">
+            <a:schemeClr val="accent1">
+              <a:shade val="50000"/>
+            </a:schemeClr>
+          </a:lnRef>
+          <a:fillRef idx="1">
+            <a:schemeClr val="accent1"/>
+          </a:fillRef>
+          <a:effectRef idx="0">
+            <a:schemeClr val="accent1"/>
+          </a:effectRef>
+          <a:fontRef idx="minor">
+            <a:schemeClr val="lt1"/>
+          </a:fontRef>
+        </p:style>
+        <p:txBody>
+          <a:bodyPr rtlCol="0" anchor="ctr"/>
+          <a:lstStyle/>
+          <a:p>
+            <a:r>
+              <a:rPr lang="ko-KR" altLang="en-US" sz="1000">
+                <a:solidFill>
+                  <a:schemeClr val="bg2">
+                    <a:lumMod val="75000"/>
+                  </a:schemeClr>
+                </a:solidFill>
+                <a:latin typeface="Microsoft GothicNeo" panose="020B0500000101010101" pitchFamily="50" charset="-127"/>
+                <a:ea typeface="Microsoft GothicNeo" panose="020B0500000101010101" pitchFamily="50" charset="-127"/>
+                <a:cs typeface="Microsoft GothicNeo" panose="020B0500000101010101" pitchFamily="50" charset="-127"/>
+              </a:rPr>
+              <a:t>이름을 입력해주세요</a:t>
+            </a:r>
+            <a:r>
+              <a:rPr lang="en-US" altLang="ko-KR" sz="1000">
+                <a:solidFill>
+                  <a:schemeClr val="bg2">
+                    <a:lumMod val="75000"/>
+                  </a:schemeClr>
+                </a:solidFill>
+                <a:latin typeface="Microsoft GothicNeo" panose="020B0500000101010101" pitchFamily="50" charset="-127"/>
+                <a:ea typeface="Microsoft GothicNeo" panose="020B0500000101010101" pitchFamily="50" charset="-127"/>
+                <a:cs typeface="Microsoft GothicNeo" panose="020B0500000101010101" pitchFamily="50" charset="-127"/>
+              </a:rPr>
+              <a:t>.</a:t>
+            </a:r>
+            <a:endParaRPr lang="ko-KR" altLang="en-US" sz="1000">
+              <a:solidFill>
+                <a:schemeClr val="bg2">
+                  <a:lumMod val="75000"/>
+                </a:schemeClr>
+              </a:solidFill>
+              <a:latin typeface="Microsoft GothicNeo" panose="020B0500000101010101" pitchFamily="50" charset="-127"/>
+              <a:ea typeface="Microsoft GothicNeo" panose="020B0500000101010101" pitchFamily="50" charset="-127"/>
+              <a:cs typeface="Microsoft GothicNeo" panose="020B0500000101010101" pitchFamily="50" charset="-127"/>
+            </a:endParaRPr>
+          </a:p>
+        </p:txBody>
+      </p:sp>
+      <p:sp>
+        <p:nvSpPr>
+          <p:cNvPr id="23" name="TextBox 22">
+            <a:extLst>
+              <a:ext uri="{FF2B5EF4-FFF2-40B4-BE49-F238E27FC236}">
+                <a16:creationId xmlns:a16="http://schemas.microsoft.com/office/drawing/2014/main" id="{9600F5B3-16DB-4DE6-8C8A-E3EF58CEBFE4}"/>
+              </a:ext>
+            </a:extLst>
+          </p:cNvPr>
+          <p:cNvSpPr txBox="1"/>
+          <p:nvPr/>
+        </p:nvSpPr>
+        <p:spPr>
+          <a:xfrm>
+            <a:off x="1066232" y="1708889"/>
+            <a:ext cx="508473" cy="246221"/>
+          </a:xfrm>
+          <a:prstGeom prst="rect">
+            <a:avLst/>
+          </a:prstGeom>
+          <a:noFill/>
+        </p:spPr>
+        <p:txBody>
+          <a:bodyPr wrap="none" rtlCol="0">
+            <a:spAutoFit/>
+          </a:bodyPr>
+          <a:lstStyle/>
+          <a:p>
+            <a:r>
+              <a:rPr lang="ko-KR" altLang="en-US" sz="1000">
+                <a:latin typeface="Microsoft GothicNeo" panose="020B0500000101010101" pitchFamily="50" charset="-127"/>
+                <a:ea typeface="Microsoft GothicNeo" panose="020B0500000101010101" pitchFamily="50" charset="-127"/>
+                <a:cs typeface="Microsoft GothicNeo" panose="020B0500000101010101" pitchFamily="50" charset="-127"/>
+              </a:rPr>
+              <a:t>이름 </a:t>
+            </a:r>
+            <a:r>
+              <a:rPr lang="en-US" altLang="ko-KR" sz="1000">
+                <a:latin typeface="Microsoft GothicNeo" panose="020B0500000101010101" pitchFamily="50" charset="-127"/>
+                <a:ea typeface="Microsoft GothicNeo" panose="020B0500000101010101" pitchFamily="50" charset="-127"/>
+                <a:cs typeface="Microsoft GothicNeo" panose="020B0500000101010101" pitchFamily="50" charset="-127"/>
+              </a:rPr>
+              <a:t>*</a:t>
+            </a:r>
+            <a:endParaRPr lang="ko-KR" altLang="en-US" sz="1000">
+              <a:latin typeface="Microsoft GothicNeo" panose="020B0500000101010101" pitchFamily="50" charset="-127"/>
+              <a:ea typeface="Microsoft GothicNeo" panose="020B0500000101010101" pitchFamily="50" charset="-127"/>
+              <a:cs typeface="Microsoft GothicNeo" panose="020B0500000101010101" pitchFamily="50" charset="-127"/>
+            </a:endParaRPr>
+          </a:p>
+        </p:txBody>
+      </p:sp>
+      <p:sp>
+        <p:nvSpPr>
+          <p:cNvPr id="30" name="직사각형 29">
+            <a:extLst>
+              <a:ext uri="{FF2B5EF4-FFF2-40B4-BE49-F238E27FC236}">
+                <a16:creationId xmlns:a16="http://schemas.microsoft.com/office/drawing/2014/main" id="{F3107D73-1D20-431C-8AC5-7336930F189D}"/>
+              </a:ext>
+            </a:extLst>
+          </p:cNvPr>
+          <p:cNvSpPr/>
+          <p:nvPr/>
+        </p:nvSpPr>
+        <p:spPr>
+          <a:xfrm>
+            <a:off x="1066232" y="2434856"/>
+            <a:ext cx="2299122" cy="249927"/>
+          </a:xfrm>
+          <a:prstGeom prst="rect">
+            <a:avLst/>
+          </a:prstGeom>
+          <a:solidFill>
+            <a:schemeClr val="bg1"/>
+          </a:solidFill>
+          <a:ln w="9525">
+            <a:solidFill>
+              <a:schemeClr val="bg1">
+                <a:lumMod val="85000"/>
+              </a:schemeClr>
+            </a:solidFill>
+          </a:ln>
+        </p:spPr>
+        <p:style>
+          <a:lnRef idx="2">
+            <a:schemeClr val="accent1">
+              <a:shade val="50000"/>
+            </a:schemeClr>
+          </a:lnRef>
+          <a:fillRef idx="1">
+            <a:schemeClr val="accent1"/>
+          </a:fillRef>
+          <a:effectRef idx="0">
+            <a:schemeClr val="accent1"/>
+          </a:effectRef>
+          <a:fontRef idx="minor">
+            <a:schemeClr val="lt1"/>
+          </a:fontRef>
+        </p:style>
+        <p:txBody>
+          <a:bodyPr rtlCol="0" anchor="ctr"/>
+          <a:lstStyle/>
+          <a:p>
+            <a:r>
+              <a:rPr lang="en-US" altLang="ko-KR" sz="1000">
+                <a:solidFill>
+                  <a:schemeClr val="bg2">
+                    <a:lumMod val="75000"/>
+                  </a:schemeClr>
+                </a:solidFill>
+                <a:latin typeface="Microsoft GothicNeo" panose="020B0500000101010101" pitchFamily="50" charset="-127"/>
+                <a:ea typeface="Microsoft GothicNeo" panose="020B0500000101010101" pitchFamily="50" charset="-127"/>
+                <a:cs typeface="Microsoft GothicNeo" panose="020B0500000101010101" pitchFamily="50" charset="-127"/>
+              </a:rPr>
+              <a:t>YYMMDD</a:t>
+            </a:r>
+            <a:endParaRPr lang="ko-KR" altLang="en-US" sz="1000">
+              <a:solidFill>
+                <a:schemeClr val="bg2">
+                  <a:lumMod val="75000"/>
+                </a:schemeClr>
+              </a:solidFill>
+              <a:latin typeface="Microsoft GothicNeo" panose="020B0500000101010101" pitchFamily="50" charset="-127"/>
+              <a:ea typeface="Microsoft GothicNeo" panose="020B0500000101010101" pitchFamily="50" charset="-127"/>
+              <a:cs typeface="Microsoft GothicNeo" panose="020B0500000101010101" pitchFamily="50" charset="-127"/>
+            </a:endParaRPr>
+          </a:p>
+        </p:txBody>
+      </p:sp>
+      <p:sp>
+        <p:nvSpPr>
+          <p:cNvPr id="31" name="TextBox 30">
+            <a:extLst>
+              <a:ext uri="{FF2B5EF4-FFF2-40B4-BE49-F238E27FC236}">
+                <a16:creationId xmlns:a16="http://schemas.microsoft.com/office/drawing/2014/main" id="{0C887BDC-418F-4979-92E5-32E9940E47A3}"/>
+              </a:ext>
+            </a:extLst>
+          </p:cNvPr>
+          <p:cNvSpPr txBox="1"/>
+          <p:nvPr/>
+        </p:nvSpPr>
+        <p:spPr>
+          <a:xfrm>
+            <a:off x="1053458" y="2196836"/>
+            <a:ext cx="745717" cy="246221"/>
+          </a:xfrm>
+          <a:prstGeom prst="rect">
+            <a:avLst/>
+          </a:prstGeom>
+          <a:noFill/>
+        </p:spPr>
+        <p:txBody>
+          <a:bodyPr wrap="none" rtlCol="0">
+            <a:spAutoFit/>
+          </a:bodyPr>
+          <a:lstStyle/>
+          <a:p>
+            <a:r>
+              <a:rPr lang="ko-KR" altLang="en-US" sz="1000">
+                <a:latin typeface="Microsoft GothicNeo" panose="020B0500000101010101" pitchFamily="50" charset="-127"/>
+                <a:ea typeface="Microsoft GothicNeo" panose="020B0500000101010101" pitchFamily="50" charset="-127"/>
+                <a:cs typeface="Microsoft GothicNeo" panose="020B0500000101010101" pitchFamily="50" charset="-127"/>
+              </a:rPr>
+              <a:t>생년월일 </a:t>
+            </a:r>
+            <a:r>
+              <a:rPr lang="en-US" altLang="ko-KR" sz="1000">
+                <a:latin typeface="Microsoft GothicNeo" panose="020B0500000101010101" pitchFamily="50" charset="-127"/>
+                <a:ea typeface="Microsoft GothicNeo" panose="020B0500000101010101" pitchFamily="50" charset="-127"/>
+                <a:cs typeface="Microsoft GothicNeo" panose="020B0500000101010101" pitchFamily="50" charset="-127"/>
+              </a:rPr>
+              <a:t>*</a:t>
+            </a:r>
+            <a:endParaRPr lang="ko-KR" altLang="en-US" sz="1000">
+              <a:latin typeface="Microsoft GothicNeo" panose="020B0500000101010101" pitchFamily="50" charset="-127"/>
+              <a:ea typeface="Microsoft GothicNeo" panose="020B0500000101010101" pitchFamily="50" charset="-127"/>
+              <a:cs typeface="Microsoft GothicNeo" panose="020B0500000101010101" pitchFamily="50" charset="-127"/>
+            </a:endParaRPr>
+          </a:p>
+        </p:txBody>
+      </p:sp>
+      <p:sp>
+        <p:nvSpPr>
+          <p:cNvPr id="32" name="직사각형 31">
+            <a:extLst>
+              <a:ext uri="{FF2B5EF4-FFF2-40B4-BE49-F238E27FC236}">
+                <a16:creationId xmlns:a16="http://schemas.microsoft.com/office/drawing/2014/main" id="{45428230-8660-4AB5-B29D-4E5BC9DBD114}"/>
+              </a:ext>
+            </a:extLst>
+          </p:cNvPr>
+          <p:cNvSpPr/>
+          <p:nvPr/>
+        </p:nvSpPr>
+        <p:spPr>
+          <a:xfrm>
+            <a:off x="1066232" y="2930215"/>
+            <a:ext cx="2299122" cy="249927"/>
+          </a:xfrm>
+          <a:prstGeom prst="rect">
+            <a:avLst/>
+          </a:prstGeom>
+          <a:solidFill>
+            <a:schemeClr val="bg1"/>
+          </a:solidFill>
+          <a:ln w="9525">
+            <a:solidFill>
+              <a:schemeClr val="bg1">
+                <a:lumMod val="85000"/>
+              </a:schemeClr>
+            </a:solidFill>
+          </a:ln>
+        </p:spPr>
+        <p:style>
+          <a:lnRef idx="2">
+            <a:schemeClr val="accent1">
+              <a:shade val="50000"/>
+            </a:schemeClr>
+          </a:lnRef>
+          <a:fillRef idx="1">
+            <a:schemeClr val="accent1"/>
+          </a:fillRef>
+          <a:effectRef idx="0">
+            <a:schemeClr val="accent1"/>
+          </a:effectRef>
+          <a:fontRef idx="minor">
+            <a:schemeClr val="lt1"/>
+          </a:fontRef>
+        </p:style>
+        <p:txBody>
+          <a:bodyPr rtlCol="0" anchor="ctr"/>
+          <a:lstStyle/>
+          <a:p>
+            <a:r>
+              <a:rPr lang="en-US" altLang="ko-KR" sz="1000">
+                <a:solidFill>
+                  <a:schemeClr val="bg2">
+                    <a:lumMod val="75000"/>
+                  </a:schemeClr>
+                </a:solidFill>
+                <a:latin typeface="Microsoft GothicNeo" panose="020B0500000101010101" pitchFamily="50" charset="-127"/>
+                <a:ea typeface="Microsoft GothicNeo" panose="020B0500000101010101" pitchFamily="50" charset="-127"/>
+                <a:cs typeface="Microsoft GothicNeo" panose="020B0500000101010101" pitchFamily="50" charset="-127"/>
+              </a:rPr>
+              <a:t>000-0000-0000</a:t>
+            </a:r>
+            <a:endParaRPr lang="ko-KR" altLang="en-US" sz="1000">
+              <a:solidFill>
+                <a:schemeClr val="bg2">
+                  <a:lumMod val="75000"/>
+                </a:schemeClr>
+              </a:solidFill>
+              <a:latin typeface="Microsoft GothicNeo" panose="020B0500000101010101" pitchFamily="50" charset="-127"/>
+              <a:ea typeface="Microsoft GothicNeo" panose="020B0500000101010101" pitchFamily="50" charset="-127"/>
+              <a:cs typeface="Microsoft GothicNeo" panose="020B0500000101010101" pitchFamily="50" charset="-127"/>
+            </a:endParaRPr>
+          </a:p>
+        </p:txBody>
+      </p:sp>
+      <p:sp>
+        <p:nvSpPr>
+          <p:cNvPr id="33" name="TextBox 32">
+            <a:extLst>
+              <a:ext uri="{FF2B5EF4-FFF2-40B4-BE49-F238E27FC236}">
+                <a16:creationId xmlns:a16="http://schemas.microsoft.com/office/drawing/2014/main" id="{0979E462-1601-4C53-A7F0-EAD50C1F4305}"/>
+              </a:ext>
+            </a:extLst>
+          </p:cNvPr>
+          <p:cNvSpPr txBox="1"/>
+          <p:nvPr/>
+        </p:nvSpPr>
+        <p:spPr>
+          <a:xfrm>
+            <a:off x="1053458" y="2692195"/>
+            <a:ext cx="627095" cy="246221"/>
+          </a:xfrm>
+          <a:prstGeom prst="rect">
+            <a:avLst/>
+          </a:prstGeom>
+          <a:noFill/>
+        </p:spPr>
+        <p:txBody>
+          <a:bodyPr wrap="none" rtlCol="0">
+            <a:spAutoFit/>
+          </a:bodyPr>
+          <a:lstStyle/>
+          <a:p>
+            <a:r>
+              <a:rPr lang="ko-KR" altLang="en-US" sz="1000">
+                <a:latin typeface="Microsoft GothicNeo" panose="020B0500000101010101" pitchFamily="50" charset="-127"/>
+                <a:ea typeface="Microsoft GothicNeo" panose="020B0500000101010101" pitchFamily="50" charset="-127"/>
+                <a:cs typeface="Microsoft GothicNeo" panose="020B0500000101010101" pitchFamily="50" charset="-127"/>
+              </a:rPr>
+              <a:t>아이디 </a:t>
+            </a:r>
+            <a:r>
+              <a:rPr lang="en-US" altLang="ko-KR" sz="1000">
+                <a:latin typeface="Microsoft GothicNeo" panose="020B0500000101010101" pitchFamily="50" charset="-127"/>
+                <a:ea typeface="Microsoft GothicNeo" panose="020B0500000101010101" pitchFamily="50" charset="-127"/>
+                <a:cs typeface="Microsoft GothicNeo" panose="020B0500000101010101" pitchFamily="50" charset="-127"/>
+              </a:rPr>
+              <a:t>*</a:t>
+            </a:r>
+            <a:endParaRPr lang="ko-KR" altLang="en-US" sz="1000">
+              <a:latin typeface="Microsoft GothicNeo" panose="020B0500000101010101" pitchFamily="50" charset="-127"/>
+              <a:ea typeface="Microsoft GothicNeo" panose="020B0500000101010101" pitchFamily="50" charset="-127"/>
+              <a:cs typeface="Microsoft GothicNeo" panose="020B0500000101010101" pitchFamily="50" charset="-127"/>
+            </a:endParaRPr>
+          </a:p>
+        </p:txBody>
+      </p:sp>
+      <p:sp>
+        <p:nvSpPr>
+          <p:cNvPr id="34" name="직사각형 33">
+            <a:extLst>
+              <a:ext uri="{FF2B5EF4-FFF2-40B4-BE49-F238E27FC236}">
+                <a16:creationId xmlns:a16="http://schemas.microsoft.com/office/drawing/2014/main" id="{9C68A048-9431-42E2-B33A-7240A08CE941}"/>
+              </a:ext>
+            </a:extLst>
+          </p:cNvPr>
+          <p:cNvSpPr/>
+          <p:nvPr/>
+        </p:nvSpPr>
+        <p:spPr>
+          <a:xfrm>
+            <a:off x="1079006" y="3418162"/>
+            <a:ext cx="2299122" cy="249927"/>
+          </a:xfrm>
+          <a:prstGeom prst="rect">
+            <a:avLst/>
+          </a:prstGeom>
+          <a:solidFill>
+            <a:schemeClr val="bg1"/>
+          </a:solidFill>
+          <a:ln w="9525">
+            <a:solidFill>
+              <a:schemeClr val="bg1">
+                <a:lumMod val="85000"/>
+              </a:schemeClr>
+            </a:solidFill>
+          </a:ln>
+        </p:spPr>
+        <p:style>
+          <a:lnRef idx="2">
+            <a:schemeClr val="accent1">
+              <a:shade val="50000"/>
+            </a:schemeClr>
+          </a:lnRef>
+          <a:fillRef idx="1">
+            <a:schemeClr val="accent1"/>
+          </a:fillRef>
+          <a:effectRef idx="0">
+            <a:schemeClr val="accent1"/>
+          </a:effectRef>
+          <a:fontRef idx="minor">
+            <a:schemeClr val="lt1"/>
+          </a:fontRef>
+        </p:style>
+        <p:txBody>
+          <a:bodyPr rtlCol="0" anchor="ctr"/>
+          <a:lstStyle/>
+          <a:p>
+            <a:r>
+              <a:rPr lang="ko-KR" altLang="en-US" sz="1000">
+                <a:solidFill>
+                  <a:schemeClr val="bg2">
+                    <a:lumMod val="75000"/>
+                  </a:schemeClr>
+                </a:solidFill>
+                <a:latin typeface="Microsoft GothicNeo" panose="020B0500000101010101" pitchFamily="50" charset="-127"/>
+                <a:ea typeface="Microsoft GothicNeo" panose="020B0500000101010101" pitchFamily="50" charset="-127"/>
+                <a:cs typeface="Microsoft GothicNeo" panose="020B0500000101010101" pitchFamily="50" charset="-127"/>
+              </a:rPr>
+              <a:t>정확한 학교명을 입력해주세요</a:t>
+            </a:r>
+            <a:r>
+              <a:rPr lang="en-US" altLang="ko-KR" sz="1000">
+                <a:solidFill>
+                  <a:schemeClr val="bg2">
+                    <a:lumMod val="75000"/>
+                  </a:schemeClr>
+                </a:solidFill>
+                <a:latin typeface="Microsoft GothicNeo" panose="020B0500000101010101" pitchFamily="50" charset="-127"/>
+                <a:ea typeface="Microsoft GothicNeo" panose="020B0500000101010101" pitchFamily="50" charset="-127"/>
+                <a:cs typeface="Microsoft GothicNeo" panose="020B0500000101010101" pitchFamily="50" charset="-127"/>
+              </a:rPr>
+              <a:t>.</a:t>
+            </a:r>
+            <a:endParaRPr lang="ko-KR" altLang="en-US" sz="1000">
+              <a:solidFill>
+                <a:schemeClr val="bg2">
+                  <a:lumMod val="75000"/>
+                </a:schemeClr>
+              </a:solidFill>
+              <a:latin typeface="Microsoft GothicNeo" panose="020B0500000101010101" pitchFamily="50" charset="-127"/>
+              <a:ea typeface="Microsoft GothicNeo" panose="020B0500000101010101" pitchFamily="50" charset="-127"/>
+              <a:cs typeface="Microsoft GothicNeo" panose="020B0500000101010101" pitchFamily="50" charset="-127"/>
+            </a:endParaRPr>
+          </a:p>
+        </p:txBody>
+      </p:sp>
+      <p:sp>
+        <p:nvSpPr>
+          <p:cNvPr id="35" name="TextBox 34">
+            <a:extLst>
+              <a:ext uri="{FF2B5EF4-FFF2-40B4-BE49-F238E27FC236}">
+                <a16:creationId xmlns:a16="http://schemas.microsoft.com/office/drawing/2014/main" id="{C94B2845-3191-44F3-99CC-3008806E6D5D}"/>
+              </a:ext>
+            </a:extLst>
+          </p:cNvPr>
+          <p:cNvSpPr txBox="1"/>
+          <p:nvPr/>
+        </p:nvSpPr>
+        <p:spPr>
+          <a:xfrm>
+            <a:off x="1066232" y="3180142"/>
+            <a:ext cx="455574" cy="246221"/>
+          </a:xfrm>
+          <a:prstGeom prst="rect">
+            <a:avLst/>
+          </a:prstGeom>
+          <a:noFill/>
+        </p:spPr>
+        <p:txBody>
+          <a:bodyPr wrap="none" rtlCol="0">
+            <a:spAutoFit/>
+          </a:bodyPr>
+          <a:lstStyle/>
+          <a:p>
+            <a:r>
+              <a:rPr lang="ko-KR" altLang="en-US" sz="1000">
+                <a:latin typeface="Microsoft GothicNeo" panose="020B0500000101010101" pitchFamily="50" charset="-127"/>
+                <a:ea typeface="Microsoft GothicNeo" panose="020B0500000101010101" pitchFamily="50" charset="-127"/>
+                <a:cs typeface="Microsoft GothicNeo" panose="020B0500000101010101" pitchFamily="50" charset="-127"/>
+              </a:rPr>
+              <a:t>학교 </a:t>
+            </a:r>
+          </a:p>
+        </p:txBody>
+      </p:sp>
+      <p:sp>
+        <p:nvSpPr>
+          <p:cNvPr id="36" name="직사각형 35">
+            <a:extLst>
+              <a:ext uri="{FF2B5EF4-FFF2-40B4-BE49-F238E27FC236}">
+                <a16:creationId xmlns:a16="http://schemas.microsoft.com/office/drawing/2014/main" id="{0D23478B-CD87-4533-94E9-E480046C4EED}"/>
+              </a:ext>
+            </a:extLst>
+          </p:cNvPr>
+          <p:cNvSpPr/>
+          <p:nvPr/>
+        </p:nvSpPr>
+        <p:spPr>
+          <a:xfrm>
+            <a:off x="1091779" y="3913521"/>
+            <a:ext cx="2299122" cy="249927"/>
+          </a:xfrm>
+          <a:prstGeom prst="rect">
+            <a:avLst/>
+          </a:prstGeom>
+          <a:solidFill>
+            <a:schemeClr val="bg1"/>
+          </a:solidFill>
+          <a:ln w="9525">
+            <a:solidFill>
+              <a:schemeClr val="bg1">
+                <a:lumMod val="85000"/>
+              </a:schemeClr>
+            </a:solidFill>
+          </a:ln>
+        </p:spPr>
+        <p:style>
+          <a:lnRef idx="2">
+            <a:schemeClr val="accent1">
+              <a:shade val="50000"/>
+            </a:schemeClr>
+          </a:lnRef>
+          <a:fillRef idx="1">
+            <a:schemeClr val="accent1"/>
+          </a:fillRef>
+          <a:effectRef idx="0">
+            <a:schemeClr val="accent1"/>
+          </a:effectRef>
+          <a:fontRef idx="minor">
+            <a:schemeClr val="lt1"/>
+          </a:fontRef>
+        </p:style>
+        <p:txBody>
+          <a:bodyPr rtlCol="0" anchor="ctr"/>
+          <a:lstStyle/>
+          <a:p>
+            <a:r>
+              <a:rPr lang="ko-KR" altLang="en-US" sz="1000">
+                <a:solidFill>
+                  <a:schemeClr val="bg2">
+                    <a:lumMod val="75000"/>
+                  </a:schemeClr>
+                </a:solidFill>
+                <a:latin typeface="Microsoft GothicNeo" panose="020B0500000101010101" pitchFamily="50" charset="-127"/>
+                <a:ea typeface="Microsoft GothicNeo" panose="020B0500000101010101" pitchFamily="50" charset="-127"/>
+                <a:cs typeface="Microsoft GothicNeo" panose="020B0500000101010101" pitchFamily="50" charset="-127"/>
+              </a:rPr>
+              <a:t>비밀번호</a:t>
+            </a:r>
+          </a:p>
+        </p:txBody>
+      </p:sp>
+      <p:sp>
+        <p:nvSpPr>
+          <p:cNvPr id="37" name="TextBox 36">
+            <a:extLst>
+              <a:ext uri="{FF2B5EF4-FFF2-40B4-BE49-F238E27FC236}">
+                <a16:creationId xmlns:a16="http://schemas.microsoft.com/office/drawing/2014/main" id="{1FCE9CCD-CD49-4610-B276-4DEE3D646C2D}"/>
+              </a:ext>
+            </a:extLst>
+          </p:cNvPr>
+          <p:cNvSpPr txBox="1"/>
+          <p:nvPr/>
+        </p:nvSpPr>
+        <p:spPr>
+          <a:xfrm>
+            <a:off x="1079005" y="3675501"/>
+            <a:ext cx="745717" cy="246221"/>
+          </a:xfrm>
+          <a:prstGeom prst="rect">
+            <a:avLst/>
+          </a:prstGeom>
+          <a:noFill/>
+        </p:spPr>
+        <p:txBody>
+          <a:bodyPr wrap="none" rtlCol="0">
+            <a:spAutoFit/>
+          </a:bodyPr>
+          <a:lstStyle/>
+          <a:p>
+            <a:r>
+              <a:rPr lang="ko-KR" altLang="en-US" sz="1000">
+                <a:latin typeface="Microsoft GothicNeo" panose="020B0500000101010101" pitchFamily="50" charset="-127"/>
+                <a:ea typeface="Microsoft GothicNeo" panose="020B0500000101010101" pitchFamily="50" charset="-127"/>
+                <a:cs typeface="Microsoft GothicNeo" panose="020B0500000101010101" pitchFamily="50" charset="-127"/>
+              </a:rPr>
+              <a:t>비밀번호 </a:t>
+            </a:r>
+            <a:r>
+              <a:rPr lang="en-US" altLang="ko-KR" sz="1000">
+                <a:latin typeface="Microsoft GothicNeo" panose="020B0500000101010101" pitchFamily="50" charset="-127"/>
+                <a:ea typeface="Microsoft GothicNeo" panose="020B0500000101010101" pitchFamily="50" charset="-127"/>
+                <a:cs typeface="Microsoft GothicNeo" panose="020B0500000101010101" pitchFamily="50" charset="-127"/>
+              </a:rPr>
+              <a:t>*</a:t>
+            </a:r>
+            <a:endParaRPr lang="ko-KR" altLang="en-US" sz="1000">
+              <a:latin typeface="Microsoft GothicNeo" panose="020B0500000101010101" pitchFamily="50" charset="-127"/>
+              <a:ea typeface="Microsoft GothicNeo" panose="020B0500000101010101" pitchFamily="50" charset="-127"/>
+              <a:cs typeface="Microsoft GothicNeo" panose="020B0500000101010101" pitchFamily="50" charset="-127"/>
+            </a:endParaRPr>
+          </a:p>
+        </p:txBody>
+      </p:sp>
+      <p:sp>
+        <p:nvSpPr>
+          <p:cNvPr id="38" name="직사각형 37">
+            <a:extLst>
+              <a:ext uri="{FF2B5EF4-FFF2-40B4-BE49-F238E27FC236}">
+                <a16:creationId xmlns:a16="http://schemas.microsoft.com/office/drawing/2014/main" id="{F8DD150C-CF31-4C61-B831-7DB65CBBEAA9}"/>
+              </a:ext>
+            </a:extLst>
+          </p:cNvPr>
+          <p:cNvSpPr/>
+          <p:nvPr/>
+        </p:nvSpPr>
+        <p:spPr>
+          <a:xfrm>
+            <a:off x="1091779" y="4408880"/>
+            <a:ext cx="2299122" cy="249927"/>
+          </a:xfrm>
+          <a:prstGeom prst="rect">
+            <a:avLst/>
+          </a:prstGeom>
+          <a:solidFill>
+            <a:schemeClr val="bg1"/>
+          </a:solidFill>
+          <a:ln w="9525">
+            <a:solidFill>
+              <a:schemeClr val="bg1">
+                <a:lumMod val="85000"/>
+              </a:schemeClr>
+            </a:solidFill>
+          </a:ln>
+        </p:spPr>
+        <p:style>
+          <a:lnRef idx="2">
+            <a:schemeClr val="accent1">
+              <a:shade val="50000"/>
+            </a:schemeClr>
+          </a:lnRef>
+          <a:fillRef idx="1">
+            <a:schemeClr val="accent1"/>
+          </a:fillRef>
+          <a:effectRef idx="0">
+            <a:schemeClr val="accent1"/>
+          </a:effectRef>
+          <a:fontRef idx="minor">
+            <a:schemeClr val="lt1"/>
+          </a:fontRef>
+        </p:style>
+        <p:txBody>
+          <a:bodyPr rtlCol="0" anchor="ctr"/>
+          <a:lstStyle/>
+          <a:p>
+            <a:r>
+              <a:rPr lang="ko-KR" altLang="en-US" sz="1000">
+                <a:solidFill>
+                  <a:schemeClr val="bg2">
+                    <a:lumMod val="75000"/>
+                  </a:schemeClr>
+                </a:solidFill>
+                <a:latin typeface="Microsoft GothicNeo" panose="020B0500000101010101" pitchFamily="50" charset="-127"/>
+                <a:ea typeface="Microsoft GothicNeo" panose="020B0500000101010101" pitchFamily="50" charset="-127"/>
+                <a:cs typeface="Microsoft GothicNeo" panose="020B0500000101010101" pitchFamily="50" charset="-127"/>
+              </a:rPr>
+              <a:t>비밀번호 확인</a:t>
+            </a:r>
+          </a:p>
+        </p:txBody>
+      </p:sp>
+      <p:sp>
+        <p:nvSpPr>
+          <p:cNvPr id="39" name="TextBox 38">
+            <a:extLst>
+              <a:ext uri="{FF2B5EF4-FFF2-40B4-BE49-F238E27FC236}">
+                <a16:creationId xmlns:a16="http://schemas.microsoft.com/office/drawing/2014/main" id="{F6D1FE15-D32D-456D-9A91-C1D3D5F39028}"/>
+              </a:ext>
+            </a:extLst>
+          </p:cNvPr>
+          <p:cNvSpPr txBox="1"/>
+          <p:nvPr/>
+        </p:nvSpPr>
+        <p:spPr>
+          <a:xfrm>
+            <a:off x="1079005" y="4170860"/>
+            <a:ext cx="1016625" cy="246221"/>
+          </a:xfrm>
+          <a:prstGeom prst="rect">
+            <a:avLst/>
+          </a:prstGeom>
+          <a:noFill/>
+        </p:spPr>
+        <p:txBody>
+          <a:bodyPr wrap="none" rtlCol="0">
+            <a:spAutoFit/>
+          </a:bodyPr>
+          <a:lstStyle/>
+          <a:p>
+            <a:r>
+              <a:rPr lang="ko-KR" altLang="en-US" sz="1000">
+                <a:latin typeface="Microsoft GothicNeo" panose="020B0500000101010101" pitchFamily="50" charset="-127"/>
+                <a:ea typeface="Microsoft GothicNeo" panose="020B0500000101010101" pitchFamily="50" charset="-127"/>
+                <a:cs typeface="Microsoft GothicNeo" panose="020B0500000101010101" pitchFamily="50" charset="-127"/>
+              </a:rPr>
+              <a:t>비밀번호 확인 </a:t>
+            </a:r>
+            <a:r>
+              <a:rPr lang="en-US" altLang="ko-KR" sz="1000">
+                <a:latin typeface="Microsoft GothicNeo" panose="020B0500000101010101" pitchFamily="50" charset="-127"/>
+                <a:ea typeface="Microsoft GothicNeo" panose="020B0500000101010101" pitchFamily="50" charset="-127"/>
+                <a:cs typeface="Microsoft GothicNeo" panose="020B0500000101010101" pitchFamily="50" charset="-127"/>
+              </a:rPr>
+              <a:t>*</a:t>
+            </a:r>
+            <a:endParaRPr lang="ko-KR" altLang="en-US" sz="1000">
+              <a:latin typeface="Microsoft GothicNeo" panose="020B0500000101010101" pitchFamily="50" charset="-127"/>
+              <a:ea typeface="Microsoft GothicNeo" panose="020B0500000101010101" pitchFamily="50" charset="-127"/>
+              <a:cs typeface="Microsoft GothicNeo" panose="020B0500000101010101" pitchFamily="50" charset="-127"/>
+            </a:endParaRPr>
+          </a:p>
+        </p:txBody>
+      </p:sp>
+      <p:sp>
+        <p:nvSpPr>
+          <p:cNvPr id="43" name="직사각형 42">
+            <a:extLst>
+              <a:ext uri="{FF2B5EF4-FFF2-40B4-BE49-F238E27FC236}">
+                <a16:creationId xmlns:a16="http://schemas.microsoft.com/office/drawing/2014/main" id="{CCF495D8-4D6C-47E9-8A4B-7EC76ECA7758}"/>
+              </a:ext>
+            </a:extLst>
+          </p:cNvPr>
+          <p:cNvSpPr/>
+          <p:nvPr/>
+        </p:nvSpPr>
+        <p:spPr>
+          <a:xfrm>
+            <a:off x="1034693" y="4872327"/>
+            <a:ext cx="2362200" cy="307778"/>
+          </a:xfrm>
+          <a:prstGeom prst="rect">
+            <a:avLst/>
+          </a:prstGeom>
+          <a:solidFill>
+            <a:schemeClr val="accent1">
+              <a:lumMod val="75000"/>
+            </a:schemeClr>
+          </a:solidFill>
+          <a:ln>
+            <a:noFill/>
+          </a:ln>
+        </p:spPr>
+        <p:style>
+          <a:lnRef idx="2">
+            <a:schemeClr val="accent1">
+              <a:shade val="50000"/>
+            </a:schemeClr>
+          </a:lnRef>
+          <a:fillRef idx="1">
+            <a:schemeClr val="accent1"/>
+          </a:fillRef>
+          <a:effectRef idx="0">
+            <a:schemeClr val="accent1"/>
+          </a:effectRef>
+          <a:fontRef idx="minor">
+            <a:schemeClr val="lt1"/>
+          </a:fontRef>
+        </p:style>
+        <p:txBody>
+          <a:bodyPr rtlCol="0" anchor="ctr"/>
+          <a:lstStyle/>
+          <a:p>
+            <a:pPr algn="ctr"/>
+            <a:r>
+              <a:rPr lang="ko-KR" altLang="en-US" sz="1100">
+                <a:latin typeface="Microsoft GothicNeo" panose="020B0500000101010101" pitchFamily="50" charset="-127"/>
+                <a:ea typeface="Microsoft GothicNeo" panose="020B0500000101010101" pitchFamily="50" charset="-127"/>
+                <a:cs typeface="Microsoft GothicNeo" panose="020B0500000101010101" pitchFamily="50" charset="-127"/>
+              </a:rPr>
+              <a:t>회원가입</a:t>
+            </a:r>
+          </a:p>
+        </p:txBody>
+      </p:sp>
+      <p:sp>
+        <p:nvSpPr>
+          <p:cNvPr id="21" name="직사각형 20">
+            <a:extLst>
+              <a:ext uri="{FF2B5EF4-FFF2-40B4-BE49-F238E27FC236}">
+                <a16:creationId xmlns:a16="http://schemas.microsoft.com/office/drawing/2014/main" id="{6AC0B5EB-AE57-48D6-B9E3-F8FF03BB9017}"/>
+              </a:ext>
+            </a:extLst>
+          </p:cNvPr>
+          <p:cNvSpPr/>
+          <p:nvPr/>
+        </p:nvSpPr>
+        <p:spPr>
+          <a:xfrm>
+            <a:off x="4388840" y="3053325"/>
+            <a:ext cx="2299122" cy="249927"/>
+          </a:xfrm>
+          <a:prstGeom prst="rect">
+            <a:avLst/>
+          </a:prstGeom>
+          <a:solidFill>
+            <a:schemeClr val="bg1"/>
+          </a:solidFill>
+          <a:ln w="9525">
+            <a:solidFill>
+              <a:schemeClr val="bg1">
+                <a:lumMod val="85000"/>
+              </a:schemeClr>
+            </a:solidFill>
+          </a:ln>
+        </p:spPr>
+        <p:style>
+          <a:lnRef idx="2">
+            <a:schemeClr val="accent1">
+              <a:shade val="50000"/>
+            </a:schemeClr>
+          </a:lnRef>
+          <a:fillRef idx="1">
+            <a:schemeClr val="accent1"/>
+          </a:fillRef>
+          <a:effectRef idx="0">
+            <a:schemeClr val="accent1"/>
+          </a:effectRef>
+          <a:fontRef idx="minor">
+            <a:schemeClr val="lt1"/>
+          </a:fontRef>
+        </p:style>
+        <p:txBody>
+          <a:bodyPr rtlCol="0" anchor="ctr"/>
+          <a:lstStyle/>
+          <a:p>
+            <a:endParaRPr lang="ko-KR" altLang="en-US" sz="1000">
+              <a:solidFill>
+                <a:schemeClr val="bg2">
+                  <a:lumMod val="75000"/>
+                </a:schemeClr>
+              </a:solidFill>
+              <a:latin typeface="Microsoft GothicNeo" panose="020B0500000101010101" pitchFamily="50" charset="-127"/>
+              <a:ea typeface="Microsoft GothicNeo" panose="020B0500000101010101" pitchFamily="50" charset="-127"/>
+              <a:cs typeface="Microsoft GothicNeo" panose="020B0500000101010101" pitchFamily="50" charset="-127"/>
+            </a:endParaRPr>
+          </a:p>
+        </p:txBody>
+      </p:sp>
+      <p:grpSp>
+        <p:nvGrpSpPr>
+          <p:cNvPr id="22" name="그룹 21">
+            <a:extLst>
+              <a:ext uri="{FF2B5EF4-FFF2-40B4-BE49-F238E27FC236}">
+                <a16:creationId xmlns:a16="http://schemas.microsoft.com/office/drawing/2014/main" id="{663D610C-8214-4B1A-895D-C3116CA6135E}"/>
+              </a:ext>
+            </a:extLst>
+          </p:cNvPr>
+          <p:cNvGrpSpPr/>
+          <p:nvPr/>
+        </p:nvGrpSpPr>
+        <p:grpSpPr>
+          <a:xfrm>
+            <a:off x="4721542" y="1073178"/>
+            <a:ext cx="2748915" cy="307777"/>
+            <a:chOff x="840105" y="1300460"/>
+            <a:chExt cx="2748915" cy="307777"/>
+          </a:xfrm>
+        </p:grpSpPr>
+        <p:sp>
+          <p:nvSpPr>
+            <p:cNvPr id="24" name="직사각형 23">
+              <a:extLst>
+                <a:ext uri="{FF2B5EF4-FFF2-40B4-BE49-F238E27FC236}">
+                  <a16:creationId xmlns:a16="http://schemas.microsoft.com/office/drawing/2014/main" id="{88432758-01AE-483C-883C-FB7B71BE0E2D}"/>
+                </a:ext>
+              </a:extLst>
+            </p:cNvPr>
+            <p:cNvSpPr/>
+            <p:nvPr/>
+          </p:nvSpPr>
+          <p:spPr>
+            <a:xfrm>
+              <a:off x="840105" y="1300460"/>
+              <a:ext cx="2748915" cy="307777"/>
+            </a:xfrm>
+            <a:prstGeom prst="rect">
+              <a:avLst/>
+            </a:prstGeom>
+            <a:solidFill>
+              <a:srgbClr val="FFFFFF"/>
+            </a:solidFill>
+            <a:ln>
+              <a:solidFill>
+                <a:schemeClr val="accent3">
+                  <a:lumMod val="60000"/>
+                  <a:lumOff val="40000"/>
+                </a:schemeClr>
+              </a:solidFill>
+            </a:ln>
+          </p:spPr>
+          <p:txBody>
+            <a:bodyPr wrap="square" lIns="91440" tIns="45720" rIns="91440" bIns="45720">
+              <a:spAutoFit/>
+            </a:bodyPr>
+            <a:lstStyle/>
+            <a:p>
               <a:r>
-                <a:rPr lang="ko-KR" altLang="en-US" sz="1100">
+                <a:rPr lang="ko-KR" altLang="en-US" sz="1400">
+                  <a:latin typeface="Microsoft GothicNeo" panose="020B0500000101010101" pitchFamily="50" charset="-127"/>
+                  <a:ea typeface="Microsoft GothicNeo" panose="020B0500000101010101" pitchFamily="50" charset="-127"/>
+                  <a:cs typeface="Microsoft GothicNeo" panose="020B0500000101010101" pitchFamily="50" charset="-127"/>
+                </a:rPr>
+                <a:t>  </a:t>
+              </a:r>
+              <a:r>
+                <a:rPr lang="en-US" altLang="ko-KR" sz="1400">
+                  <a:latin typeface="Microsoft GothicNeo" panose="020B0500000101010101" pitchFamily="50" charset="-127"/>
+                  <a:ea typeface="Microsoft GothicNeo" panose="020B0500000101010101" pitchFamily="50" charset="-127"/>
+                  <a:cs typeface="Microsoft GothicNeo" panose="020B0500000101010101" pitchFamily="50" charset="-127"/>
+                </a:rPr>
+                <a:t>  </a:t>
+              </a:r>
+              <a:r>
+                <a:rPr lang="ko-KR" altLang="en-US" sz="1200" b="0" cap="none" spc="0">
+                  <a:ln w="0"/>
+                  <a:effectLst>
+                    <a:outerShdw blurRad="38100" dist="25400" dir="5400000" algn="ctr" rotWithShape="0">
+                      <a:srgbClr val="6E747A">
+                        <a:alpha val="43000"/>
+                      </a:srgbClr>
+                    </a:outerShdw>
+                  </a:effectLst>
                   <a:latin typeface="Microsoft GothicNeo" panose="020B0500000101010101" pitchFamily="50" charset="-127"/>
                   <a:ea typeface="Microsoft GothicNeo" panose="020B0500000101010101" pitchFamily="50" charset="-127"/>
                   <a:cs typeface="Microsoft GothicNeo" panose="020B0500000101010101" pitchFamily="50" charset="-127"/>
                 </a:rPr>
                 <a:t>회원가입</a:t>
               </a:r>
+              <a:endParaRPr lang="en-US" altLang="ko-KR" sz="1200" b="0" cap="none" spc="0">
+                <a:ln w="0"/>
+                <a:effectLst>
+                  <a:outerShdw blurRad="38100" dist="25400" dir="5400000" algn="ctr" rotWithShape="0">
+                    <a:srgbClr val="6E747A">
+                      <a:alpha val="43000"/>
+                    </a:srgbClr>
+                  </a:outerShdw>
+                </a:effectLst>
+                <a:latin typeface="Microsoft GothicNeo" panose="020B0500000101010101" pitchFamily="50" charset="-127"/>
+                <a:ea typeface="Microsoft GothicNeo" panose="020B0500000101010101" pitchFamily="50" charset="-127"/>
+                <a:cs typeface="Microsoft GothicNeo" panose="020B0500000101010101" pitchFamily="50" charset="-127"/>
+              </a:endParaRPr>
+            </a:p>
+          </p:txBody>
+        </p:sp>
+        <p:sp>
+          <p:nvSpPr>
+            <p:cNvPr id="25" name="L 도형 24">
+              <a:extLst>
+                <a:ext uri="{FF2B5EF4-FFF2-40B4-BE49-F238E27FC236}">
+                  <a16:creationId xmlns:a16="http://schemas.microsoft.com/office/drawing/2014/main" id="{C58DF396-DAA5-4EC9-9D13-72AA8B12BA24}"/>
+                </a:ext>
+              </a:extLst>
+            </p:cNvPr>
+            <p:cNvSpPr/>
+            <p:nvPr/>
+          </p:nvSpPr>
+          <p:spPr>
+            <a:xfrm rot="2866156">
+              <a:off x="962701" y="1429332"/>
+              <a:ext cx="97518" cy="93924"/>
+            </a:xfrm>
+            <a:prstGeom prst="corner">
+              <a:avLst>
+                <a:gd name="adj1" fmla="val 24685"/>
+                <a:gd name="adj2" fmla="val 22022"/>
+              </a:avLst>
+            </a:prstGeom>
+            <a:solidFill>
+              <a:schemeClr val="tx1"/>
+            </a:solidFill>
+            <a:ln>
+              <a:noFill/>
+            </a:ln>
+          </p:spPr>
+          <p:style>
+            <a:lnRef idx="2">
+              <a:schemeClr val="accent1">
+                <a:shade val="50000"/>
+              </a:schemeClr>
+            </a:lnRef>
+            <a:fillRef idx="1">
+              <a:schemeClr val="accent1"/>
+            </a:fillRef>
+            <a:effectRef idx="0">
+              <a:schemeClr val="accent1"/>
+            </a:effectRef>
+            <a:fontRef idx="minor">
+              <a:schemeClr val="lt1"/>
+            </a:fontRef>
+          </p:style>
+          <p:txBody>
+            <a:bodyPr rtlCol="0" anchor="ctr"/>
+            <a:lstStyle/>
+            <a:p>
+              <a:pPr algn="ctr"/>
+              <a:endParaRPr lang="ko-KR" altLang="en-US"/>
             </a:p>
           </p:txBody>
         </p:sp>
@@ -9987,7 +10192,7 @@
         </p:nvGrpSpPr>
         <p:grpSpPr>
           <a:xfrm>
-            <a:off x="886142" y="1503660"/>
+            <a:off x="3972242" y="2122785"/>
             <a:ext cx="2748915" cy="307777"/>
             <a:chOff x="840105" y="1300460"/>
             <a:chExt cx="2748915" cy="307777"/>

</xml_diff>

<commit_message>
add other languages screens
</commit_message>
<xml_diff>
--- a/화면디자인.pptx
+++ b/화면디자인.pptx
@@ -270,7 +270,7 @@
           <a:p>
             <a:fld id="{9C821A5F-709B-4F3C-8FB8-505B675E4AE3}" type="datetimeFigureOut">
               <a:rPr lang="ko-KR" altLang="en-US" smtClean="0"/>
-              <a:t>2020-09-09</a:t>
+              <a:t>2020-11-02</a:t>
             </a:fld>
             <a:endParaRPr lang="ko-KR" altLang="en-US"/>
           </a:p>
@@ -468,7 +468,7 @@
           <a:p>
             <a:fld id="{9C821A5F-709B-4F3C-8FB8-505B675E4AE3}" type="datetimeFigureOut">
               <a:rPr lang="ko-KR" altLang="en-US" smtClean="0"/>
-              <a:t>2020-09-09</a:t>
+              <a:t>2020-11-02</a:t>
             </a:fld>
             <a:endParaRPr lang="ko-KR" altLang="en-US"/>
           </a:p>
@@ -676,7 +676,7 @@
           <a:p>
             <a:fld id="{9C821A5F-709B-4F3C-8FB8-505B675E4AE3}" type="datetimeFigureOut">
               <a:rPr lang="ko-KR" altLang="en-US" smtClean="0"/>
-              <a:t>2020-09-09</a:t>
+              <a:t>2020-11-02</a:t>
             </a:fld>
             <a:endParaRPr lang="ko-KR" altLang="en-US"/>
           </a:p>
@@ -874,7 +874,7 @@
           <a:p>
             <a:fld id="{9C821A5F-709B-4F3C-8FB8-505B675E4AE3}" type="datetimeFigureOut">
               <a:rPr lang="ko-KR" altLang="en-US" smtClean="0"/>
-              <a:t>2020-09-09</a:t>
+              <a:t>2020-11-02</a:t>
             </a:fld>
             <a:endParaRPr lang="ko-KR" altLang="en-US"/>
           </a:p>
@@ -1149,7 +1149,7 @@
           <a:p>
             <a:fld id="{9C821A5F-709B-4F3C-8FB8-505B675E4AE3}" type="datetimeFigureOut">
               <a:rPr lang="ko-KR" altLang="en-US" smtClean="0"/>
-              <a:t>2020-09-09</a:t>
+              <a:t>2020-11-02</a:t>
             </a:fld>
             <a:endParaRPr lang="ko-KR" altLang="en-US"/>
           </a:p>
@@ -1414,7 +1414,7 @@
           <a:p>
             <a:fld id="{9C821A5F-709B-4F3C-8FB8-505B675E4AE3}" type="datetimeFigureOut">
               <a:rPr lang="ko-KR" altLang="en-US" smtClean="0"/>
-              <a:t>2020-09-09</a:t>
+              <a:t>2020-11-02</a:t>
             </a:fld>
             <a:endParaRPr lang="ko-KR" altLang="en-US"/>
           </a:p>
@@ -1826,7 +1826,7 @@
           <a:p>
             <a:fld id="{9C821A5F-709B-4F3C-8FB8-505B675E4AE3}" type="datetimeFigureOut">
               <a:rPr lang="ko-KR" altLang="en-US" smtClean="0"/>
-              <a:t>2020-09-09</a:t>
+              <a:t>2020-11-02</a:t>
             </a:fld>
             <a:endParaRPr lang="ko-KR" altLang="en-US"/>
           </a:p>
@@ -1967,7 +1967,7 @@
           <a:p>
             <a:fld id="{9C821A5F-709B-4F3C-8FB8-505B675E4AE3}" type="datetimeFigureOut">
               <a:rPr lang="ko-KR" altLang="en-US" smtClean="0"/>
-              <a:t>2020-09-09</a:t>
+              <a:t>2020-11-02</a:t>
             </a:fld>
             <a:endParaRPr lang="ko-KR" altLang="en-US"/>
           </a:p>
@@ -2080,7 +2080,7 @@
           <a:p>
             <a:fld id="{9C821A5F-709B-4F3C-8FB8-505B675E4AE3}" type="datetimeFigureOut">
               <a:rPr lang="ko-KR" altLang="en-US" smtClean="0"/>
-              <a:t>2020-09-09</a:t>
+              <a:t>2020-11-02</a:t>
             </a:fld>
             <a:endParaRPr lang="ko-KR" altLang="en-US"/>
           </a:p>
@@ -2391,7 +2391,7 @@
           <a:p>
             <a:fld id="{9C821A5F-709B-4F3C-8FB8-505B675E4AE3}" type="datetimeFigureOut">
               <a:rPr lang="ko-KR" altLang="en-US" smtClean="0"/>
-              <a:t>2020-09-09</a:t>
+              <a:t>2020-11-02</a:t>
             </a:fld>
             <a:endParaRPr lang="ko-KR" altLang="en-US"/>
           </a:p>
@@ -2679,7 +2679,7 @@
           <a:p>
             <a:fld id="{9C821A5F-709B-4F3C-8FB8-505B675E4AE3}" type="datetimeFigureOut">
               <a:rPr lang="ko-KR" altLang="en-US" smtClean="0"/>
-              <a:t>2020-09-09</a:t>
+              <a:t>2020-11-02</a:t>
             </a:fld>
             <a:endParaRPr lang="ko-KR" altLang="en-US"/>
           </a:p>
@@ -2920,7 +2920,7 @@
           <a:p>
             <a:fld id="{9C821A5F-709B-4F3C-8FB8-505B675E4AE3}" type="datetimeFigureOut">
               <a:rPr lang="ko-KR" altLang="en-US" smtClean="0"/>
-              <a:t>2020-09-09</a:t>
+              <a:t>2020-11-02</a:t>
             </a:fld>
             <a:endParaRPr lang="ko-KR" altLang="en-US"/>
           </a:p>
@@ -8883,154 +8883,116 @@
           <a:chExt cx="0" cy="0"/>
         </a:xfrm>
       </p:grpSpPr>
-      <p:grpSp>
-        <p:nvGrpSpPr>
-          <p:cNvPr id="21" name="그룹 20">
-            <a:extLst>
-              <a:ext uri="{FF2B5EF4-FFF2-40B4-BE49-F238E27FC236}">
-                <a16:creationId xmlns:a16="http://schemas.microsoft.com/office/drawing/2014/main" id="{FB3AD21A-C404-4C27-96A2-1CEA628E7015}"/>
-              </a:ext>
-            </a:extLst>
-          </p:cNvPr>
-          <p:cNvGrpSpPr/>
+      <p:pic>
+        <p:nvPicPr>
+          <p:cNvPr id="4" name="그림 3">
+            <a:extLst>
+              <a:ext uri="{FF2B5EF4-FFF2-40B4-BE49-F238E27FC236}">
+                <a16:creationId xmlns:a16="http://schemas.microsoft.com/office/drawing/2014/main" id="{0F4D1BCF-A9D4-4D0C-9B5E-0B48E082039B}"/>
+              </a:ext>
+            </a:extLst>
+          </p:cNvPr>
+          <p:cNvPicPr>
+            <a:picLocks noChangeAspect="1"/>
+          </p:cNvPicPr>
           <p:nvPr/>
-        </p:nvGrpSpPr>
-        <p:grpSpPr>
+        </p:nvPicPr>
+        <p:blipFill>
+          <a:blip r:embed="rId2">
+            <a:extLst>
+              <a:ext uri="{28A0092B-C50C-407E-A947-70E740481C1C}">
+                <a14:useLocalDpi xmlns:a14="http://schemas.microsoft.com/office/drawing/2010/main" val="0"/>
+              </a:ext>
+            </a:extLst>
+          </a:blip>
+          <a:stretch>
+            <a:fillRect/>
+          </a:stretch>
+        </p:blipFill>
+        <p:spPr>
           <a:xfrm>
             <a:off x="1534016" y="786155"/>
             <a:ext cx="3322608" cy="5285690"/>
-            <a:chOff x="1534016" y="786155"/>
-            <a:chExt cx="3322608" cy="5285690"/>
           </a:xfrm>
-        </p:grpSpPr>
-        <p:pic>
-          <p:nvPicPr>
-            <p:cNvPr id="4" name="그림 3">
-              <a:extLst>
-                <a:ext uri="{FF2B5EF4-FFF2-40B4-BE49-F238E27FC236}">
-                  <a16:creationId xmlns:a16="http://schemas.microsoft.com/office/drawing/2014/main" id="{0F4D1BCF-A9D4-4D0C-9B5E-0B48E082039B}"/>
-                </a:ext>
-              </a:extLst>
-            </p:cNvPr>
-            <p:cNvPicPr>
-              <a:picLocks noChangeAspect="1"/>
-            </p:cNvPicPr>
-            <p:nvPr/>
-          </p:nvPicPr>
-          <p:blipFill>
-            <a:blip r:embed="rId2">
-              <a:extLst>
-                <a:ext uri="{28A0092B-C50C-407E-A947-70E740481C1C}">
-                  <a14:useLocalDpi xmlns:a14="http://schemas.microsoft.com/office/drawing/2010/main" val="0"/>
-                </a:ext>
-              </a:extLst>
-            </a:blip>
-            <a:stretch>
-              <a:fillRect/>
-            </a:stretch>
-          </p:blipFill>
-          <p:spPr>
-            <a:xfrm>
-              <a:off x="1534016" y="786155"/>
-              <a:ext cx="3322608" cy="5285690"/>
-            </a:xfrm>
-            <a:prstGeom prst="rect">
-              <a:avLst/>
-            </a:prstGeom>
-          </p:spPr>
-        </p:pic>
-        <p:pic>
-          <p:nvPicPr>
-            <p:cNvPr id="8" name="그림 7">
-              <a:extLst>
-                <a:ext uri="{FF2B5EF4-FFF2-40B4-BE49-F238E27FC236}">
-                  <a16:creationId xmlns:a16="http://schemas.microsoft.com/office/drawing/2014/main" id="{7C638CE0-8842-4660-8610-E32E3580B947}"/>
-                </a:ext>
-              </a:extLst>
-            </p:cNvPr>
-            <p:cNvPicPr>
-              <a:picLocks noChangeAspect="1"/>
-            </p:cNvPicPr>
-            <p:nvPr/>
-          </p:nvPicPr>
-          <p:blipFill rotWithShape="1">
-            <a:blip r:embed="rId3"/>
-            <a:srcRect l="3582" r="4326"/>
-            <a:stretch/>
-          </p:blipFill>
-          <p:spPr>
-            <a:xfrm>
-              <a:off x="1847850" y="1496695"/>
-              <a:ext cx="2754630" cy="652145"/>
-            </a:xfrm>
-            <a:prstGeom prst="roundRect">
-              <a:avLst>
-                <a:gd name="adj" fmla="val 8594"/>
-              </a:avLst>
-            </a:prstGeom>
+          <a:prstGeom prst="rect">
+            <a:avLst/>
+          </a:prstGeom>
+        </p:spPr>
+      </p:pic>
+      <p:pic>
+        <p:nvPicPr>
+          <p:cNvPr id="8" name="그림 7">
+            <a:extLst>
+              <a:ext uri="{FF2B5EF4-FFF2-40B4-BE49-F238E27FC236}">
+                <a16:creationId xmlns:a16="http://schemas.microsoft.com/office/drawing/2014/main" id="{7C638CE0-8842-4660-8610-E32E3580B947}"/>
+              </a:ext>
+            </a:extLst>
+          </p:cNvPr>
+          <p:cNvPicPr>
+            <a:picLocks noChangeAspect="1"/>
+          </p:cNvPicPr>
+          <p:nvPr/>
+        </p:nvPicPr>
+        <p:blipFill rotWithShape="1">
+          <a:blip r:embed="rId3"/>
+          <a:srcRect l="3582" r="4326"/>
+          <a:stretch/>
+        </p:blipFill>
+        <p:spPr>
+          <a:xfrm>
+            <a:off x="1847850" y="1496695"/>
+            <a:ext cx="2754630" cy="652145"/>
+          </a:xfrm>
+          <a:prstGeom prst="roundRect">
+            <a:avLst>
+              <a:gd name="adj" fmla="val 8594"/>
+            </a:avLst>
+          </a:prstGeom>
+          <a:solidFill>
+            <a:schemeClr val="bg2">
+              <a:lumMod val="90000"/>
+            </a:schemeClr>
+          </a:solidFill>
+          <a:ln>
             <a:solidFill>
               <a:schemeClr val="bg2">
                 <a:lumMod val="90000"/>
               </a:schemeClr>
             </a:solidFill>
-            <a:ln>
-              <a:solidFill>
-                <a:schemeClr val="bg2">
-                  <a:lumMod val="90000"/>
-                </a:schemeClr>
-              </a:solidFill>
-            </a:ln>
-            <a:effectLst/>
-          </p:spPr>
-        </p:pic>
-        <p:sp>
-          <p:nvSpPr>
-            <p:cNvPr id="9" name="직사각형 8">
-              <a:extLst>
-                <a:ext uri="{FF2B5EF4-FFF2-40B4-BE49-F238E27FC236}">
-                  <a16:creationId xmlns:a16="http://schemas.microsoft.com/office/drawing/2014/main" id="{E7F5CCD0-AFC2-458A-9CAA-E68BE76040F7}"/>
-                </a:ext>
-              </a:extLst>
-            </p:cNvPr>
-            <p:cNvSpPr/>
-            <p:nvPr/>
-          </p:nvSpPr>
-          <p:spPr>
-            <a:xfrm>
-              <a:off x="2413000" y="2229311"/>
-              <a:ext cx="1564640" cy="430887"/>
-            </a:xfrm>
-            <a:prstGeom prst="rect">
-              <a:avLst/>
-            </a:prstGeom>
-          </p:spPr>
-          <p:txBody>
-            <a:bodyPr wrap="square">
-              <a:spAutoFit/>
-            </a:bodyPr>
-            <a:lstStyle/>
-            <a:p>
-              <a:pPr algn="ctr"/>
-              <a:r>
-                <a:rPr lang="ko-KR" altLang="en-US" sz="1100">
-                  <a:ln w="0"/>
-                  <a:solidFill>
-                    <a:schemeClr val="accent1"/>
-                  </a:solidFill>
-                  <a:effectLst>
-                    <a:outerShdw blurRad="38100" dist="25400" dir="5400000" algn="ctr" rotWithShape="0">
-                      <a:srgbClr val="6E747A">
-                        <a:alpha val="43000"/>
-                      </a:srgbClr>
-                    </a:outerShdw>
-                  </a:effectLst>
-                  <a:latin typeface="Microsoft GothicNeo" panose="020B0500000101010101" pitchFamily="50" charset="-127"/>
-                  <a:ea typeface="Microsoft GothicNeo" panose="020B0500000101010101" pitchFamily="50" charset="-127"/>
-                  <a:cs typeface="Microsoft GothicNeo" panose="020B0500000101010101" pitchFamily="50" charset="-127"/>
-                </a:rPr>
-                <a:t>코로나바이러스 대응 앱</a:t>
-              </a:r>
-              <a:endParaRPr lang="en-US" altLang="ko-KR" sz="1100">
+          </a:ln>
+          <a:effectLst/>
+        </p:spPr>
+      </p:pic>
+      <p:sp>
+        <p:nvSpPr>
+          <p:cNvPr id="9" name="직사각형 8">
+            <a:extLst>
+              <a:ext uri="{FF2B5EF4-FFF2-40B4-BE49-F238E27FC236}">
+                <a16:creationId xmlns:a16="http://schemas.microsoft.com/office/drawing/2014/main" id="{E7F5CCD0-AFC2-458A-9CAA-E68BE76040F7}"/>
+              </a:ext>
+            </a:extLst>
+          </p:cNvPr>
+          <p:cNvSpPr/>
+          <p:nvPr/>
+        </p:nvSpPr>
+        <p:spPr>
+          <a:xfrm>
+            <a:off x="2413000" y="2229311"/>
+            <a:ext cx="1564640" cy="430887"/>
+          </a:xfrm>
+          <a:prstGeom prst="rect">
+            <a:avLst/>
+          </a:prstGeom>
+        </p:spPr>
+        <p:txBody>
+          <a:bodyPr wrap="square">
+            <a:spAutoFit/>
+          </a:bodyPr>
+          <a:lstStyle/>
+          <a:p>
+            <a:pPr algn="ctr"/>
+            <a:r>
+              <a:rPr lang="ko-KR" altLang="en-US" sz="1100">
                 <a:ln w="0"/>
                 <a:solidFill>
                   <a:schemeClr val="accent1"/>
@@ -9045,604 +9007,613 @@
                 <a:latin typeface="Microsoft GothicNeo" panose="020B0500000101010101" pitchFamily="50" charset="-127"/>
                 <a:ea typeface="Microsoft GothicNeo" panose="020B0500000101010101" pitchFamily="50" charset="-127"/>
                 <a:cs typeface="Microsoft GothicNeo" panose="020B0500000101010101" pitchFamily="50" charset="-127"/>
-              </a:endParaRPr>
-            </a:p>
-            <a:p>
-              <a:pPr algn="ctr"/>
-              <a:r>
-                <a:rPr lang="en-US" altLang="ko-KR" sz="1100">
-                  <a:ln w="0"/>
-                  <a:solidFill>
-                    <a:schemeClr val="accent1"/>
-                  </a:solidFill>
-                  <a:effectLst>
-                    <a:outerShdw blurRad="38100" dist="25400" dir="5400000" algn="ctr" rotWithShape="0">
-                      <a:srgbClr val="6E747A">
-                        <a:alpha val="43000"/>
-                      </a:srgbClr>
-                    </a:outerShdw>
-                  </a:effectLst>
-                  <a:latin typeface="Microsoft GothicNeo" panose="020B0500000101010101" pitchFamily="50" charset="-127"/>
-                  <a:ea typeface="Microsoft GothicNeo" panose="020B0500000101010101" pitchFamily="50" charset="-127"/>
-                  <a:cs typeface="Microsoft GothicNeo" panose="020B0500000101010101" pitchFamily="50" charset="-127"/>
-                </a:rPr>
-                <a:t>COVID19 HELPER</a:t>
-              </a:r>
-              <a:endParaRPr lang="ko-KR" altLang="en-US" sz="1100"/>
-            </a:p>
-          </p:txBody>
-        </p:sp>
-        <p:sp>
-          <p:nvSpPr>
-            <p:cNvPr id="11" name="직사각형 10">
-              <a:extLst>
-                <a:ext uri="{FF2B5EF4-FFF2-40B4-BE49-F238E27FC236}">
-                  <a16:creationId xmlns:a16="http://schemas.microsoft.com/office/drawing/2014/main" id="{28800BB8-F27B-4A8F-A771-2634241057D7}"/>
-                </a:ext>
-              </a:extLst>
-            </p:cNvPr>
-            <p:cNvSpPr/>
-            <p:nvPr/>
-          </p:nvSpPr>
-          <p:spPr>
-            <a:xfrm>
-              <a:off x="2014220" y="3085422"/>
-              <a:ext cx="2362200" cy="380076"/>
-            </a:xfrm>
-            <a:prstGeom prst="rect">
-              <a:avLst/>
-            </a:prstGeom>
-            <a:solidFill>
-              <a:srgbClr val="E74023"/>
-            </a:solidFill>
-            <a:ln>
-              <a:noFill/>
-            </a:ln>
-            <a:effectLst/>
-            <a:scene3d>
-              <a:camera prst="orthographicFront">
-                <a:rot lat="0" lon="0" rev="0"/>
-              </a:camera>
-              <a:lightRig rig="contrasting" dir="t">
-                <a:rot lat="0" lon="0" rev="7800000"/>
-              </a:lightRig>
-            </a:scene3d>
-            <a:sp3d>
-              <a:bevelT w="139700" h="139700"/>
-            </a:sp3d>
-          </p:spPr>
-          <p:style>
-            <a:lnRef idx="2">
-              <a:schemeClr val="accent1">
-                <a:shade val="50000"/>
-              </a:schemeClr>
-            </a:lnRef>
-            <a:fillRef idx="1">
-              <a:schemeClr val="accent1"/>
-            </a:fillRef>
-            <a:effectRef idx="0">
-              <a:schemeClr val="accent1"/>
-            </a:effectRef>
-            <a:fontRef idx="minor">
-              <a:schemeClr val="lt1"/>
-            </a:fontRef>
-          </p:style>
-          <p:txBody>
-            <a:bodyPr rtlCol="0" anchor="ctr"/>
-            <a:lstStyle/>
-            <a:p>
-              <a:pPr algn="ctr"/>
-              <a:r>
-                <a:rPr lang="ko-KR" altLang="en-US" sz="1100">
-                  <a:latin typeface="Microsoft GothicNeo" panose="020B0500000101010101" pitchFamily="50" charset="-127"/>
-                  <a:ea typeface="Microsoft GothicNeo" panose="020B0500000101010101" pitchFamily="50" charset="-127"/>
-                  <a:cs typeface="Microsoft GothicNeo" panose="020B0500000101010101" pitchFamily="50" charset="-127"/>
-                </a:rPr>
-                <a:t>자가진단 </a:t>
-              </a:r>
-              <a:r>
-                <a:rPr lang="en-US" altLang="ko-KR" sz="1100">
-                  <a:latin typeface="Microsoft GothicNeo" panose="020B0500000101010101" pitchFamily="50" charset="-127"/>
-                  <a:ea typeface="Microsoft GothicNeo" panose="020B0500000101010101" pitchFamily="50" charset="-127"/>
-                  <a:cs typeface="Microsoft GothicNeo" panose="020B0500000101010101" pitchFamily="50" charset="-127"/>
-                </a:rPr>
-                <a:t>+</a:t>
-              </a:r>
-              <a:endParaRPr lang="ko-KR" altLang="en-US" sz="1100">
+              </a:rPr>
+              <a:t>코로나바이러스 대응 앱</a:t>
+            </a:r>
+            <a:endParaRPr lang="en-US" altLang="ko-KR" sz="1100">
+              <a:ln w="0"/>
+              <a:solidFill>
+                <a:schemeClr val="accent1"/>
+              </a:solidFill>
+              <a:effectLst>
+                <a:outerShdw blurRad="38100" dist="25400" dir="5400000" algn="ctr" rotWithShape="0">
+                  <a:srgbClr val="6E747A">
+                    <a:alpha val="43000"/>
+                  </a:srgbClr>
+                </a:outerShdw>
+              </a:effectLst>
+              <a:latin typeface="Microsoft GothicNeo" panose="020B0500000101010101" pitchFamily="50" charset="-127"/>
+              <a:ea typeface="Microsoft GothicNeo" panose="020B0500000101010101" pitchFamily="50" charset="-127"/>
+              <a:cs typeface="Microsoft GothicNeo" panose="020B0500000101010101" pitchFamily="50" charset="-127"/>
+            </a:endParaRPr>
+          </a:p>
+          <a:p>
+            <a:pPr algn="ctr"/>
+            <a:r>
+              <a:rPr lang="en-US" altLang="ko-KR" sz="1100">
+                <a:ln w="0"/>
+                <a:solidFill>
+                  <a:schemeClr val="accent1"/>
+                </a:solidFill>
+                <a:effectLst>
+                  <a:outerShdw blurRad="38100" dist="25400" dir="5400000" algn="ctr" rotWithShape="0">
+                    <a:srgbClr val="6E747A">
+                      <a:alpha val="43000"/>
+                    </a:srgbClr>
+                  </a:outerShdw>
+                </a:effectLst>
                 <a:latin typeface="Microsoft GothicNeo" panose="020B0500000101010101" pitchFamily="50" charset="-127"/>
                 <a:ea typeface="Microsoft GothicNeo" panose="020B0500000101010101" pitchFamily="50" charset="-127"/>
                 <a:cs typeface="Microsoft GothicNeo" panose="020B0500000101010101" pitchFamily="50" charset="-127"/>
-              </a:endParaRPr>
-            </a:p>
-          </p:txBody>
-        </p:sp>
-        <p:sp>
-          <p:nvSpPr>
-            <p:cNvPr id="12" name="직사각형 11">
-              <a:extLst>
-                <a:ext uri="{FF2B5EF4-FFF2-40B4-BE49-F238E27FC236}">
-                  <a16:creationId xmlns:a16="http://schemas.microsoft.com/office/drawing/2014/main" id="{59FF9B6D-31FD-4EAB-BAB4-AE2302CADB66}"/>
-                </a:ext>
-              </a:extLst>
-            </p:cNvPr>
-            <p:cNvSpPr/>
-            <p:nvPr/>
-          </p:nvSpPr>
-          <p:spPr>
-            <a:xfrm>
-              <a:off x="2014220" y="3655783"/>
-              <a:ext cx="2362200" cy="380076"/>
-            </a:xfrm>
-            <a:prstGeom prst="rect">
-              <a:avLst/>
-            </a:prstGeom>
-            <a:solidFill>
-              <a:srgbClr val="EF9226"/>
-            </a:solidFill>
-            <a:ln>
-              <a:noFill/>
-            </a:ln>
-            <a:effectLst/>
-            <a:scene3d>
-              <a:camera prst="orthographicFront">
-                <a:rot lat="0" lon="0" rev="0"/>
-              </a:camera>
-              <a:lightRig rig="contrasting" dir="t">
-                <a:rot lat="0" lon="0" rev="7800000"/>
-              </a:lightRig>
-            </a:scene3d>
-            <a:sp3d>
-              <a:bevelT w="139700" h="139700"/>
-            </a:sp3d>
-          </p:spPr>
-          <p:style>
-            <a:lnRef idx="2">
-              <a:schemeClr val="accent1">
-                <a:shade val="50000"/>
-              </a:schemeClr>
-            </a:lnRef>
-            <a:fillRef idx="1">
-              <a:schemeClr val="accent1"/>
-            </a:fillRef>
-            <a:effectRef idx="0">
-              <a:schemeClr val="accent1"/>
-            </a:effectRef>
-            <a:fontRef idx="minor">
-              <a:schemeClr val="lt1"/>
-            </a:fontRef>
-          </p:style>
-          <p:txBody>
-            <a:bodyPr rtlCol="0" anchor="ctr"/>
-            <a:lstStyle/>
-            <a:p>
-              <a:pPr algn="ctr"/>
-              <a:r>
-                <a:rPr lang="ko-KR" altLang="en-US" sz="1100">
-                  <a:latin typeface="Microsoft GothicNeo" panose="020B0500000101010101" pitchFamily="50" charset="-127"/>
-                  <a:ea typeface="Microsoft GothicNeo" panose="020B0500000101010101" pitchFamily="50" charset="-127"/>
-                  <a:cs typeface="Microsoft GothicNeo" panose="020B0500000101010101" pitchFamily="50" charset="-127"/>
-                </a:rPr>
-                <a:t>전자출입명부 </a:t>
-              </a:r>
-              <a:r>
-                <a:rPr lang="en-US" altLang="ko-KR" sz="1100">
-                  <a:latin typeface="Microsoft GothicNeo" panose="020B0500000101010101" pitchFamily="50" charset="-127"/>
-                  <a:ea typeface="Microsoft GothicNeo" panose="020B0500000101010101" pitchFamily="50" charset="-127"/>
-                  <a:cs typeface="Microsoft GothicNeo" panose="020B0500000101010101" pitchFamily="50" charset="-127"/>
-                </a:rPr>
-                <a:t>+ </a:t>
-              </a:r>
-              <a:endParaRPr lang="ko-KR" altLang="en-US" sz="1100">
+              </a:rPr>
+              <a:t>COVID19 HELPER</a:t>
+            </a:r>
+            <a:endParaRPr lang="ko-KR" altLang="en-US" sz="1100"/>
+          </a:p>
+        </p:txBody>
+      </p:sp>
+      <p:sp>
+        <p:nvSpPr>
+          <p:cNvPr id="11" name="직사각형 10">
+            <a:extLst>
+              <a:ext uri="{FF2B5EF4-FFF2-40B4-BE49-F238E27FC236}">
+                <a16:creationId xmlns:a16="http://schemas.microsoft.com/office/drawing/2014/main" id="{28800BB8-F27B-4A8F-A771-2634241057D7}"/>
+              </a:ext>
+            </a:extLst>
+          </p:cNvPr>
+          <p:cNvSpPr/>
+          <p:nvPr/>
+        </p:nvSpPr>
+        <p:spPr>
+          <a:xfrm>
+            <a:off x="2014220" y="3085422"/>
+            <a:ext cx="2362200" cy="380076"/>
+          </a:xfrm>
+          <a:prstGeom prst="rect">
+            <a:avLst/>
+          </a:prstGeom>
+          <a:solidFill>
+            <a:srgbClr val="E74023"/>
+          </a:solidFill>
+          <a:ln>
+            <a:noFill/>
+          </a:ln>
+          <a:effectLst/>
+          <a:scene3d>
+            <a:camera prst="orthographicFront">
+              <a:rot lat="0" lon="0" rev="0"/>
+            </a:camera>
+            <a:lightRig rig="contrasting" dir="t">
+              <a:rot lat="0" lon="0" rev="7800000"/>
+            </a:lightRig>
+          </a:scene3d>
+          <a:sp3d>
+            <a:bevelT w="139700" h="139700"/>
+          </a:sp3d>
+        </p:spPr>
+        <p:style>
+          <a:lnRef idx="2">
+            <a:schemeClr val="accent1">
+              <a:shade val="50000"/>
+            </a:schemeClr>
+          </a:lnRef>
+          <a:fillRef idx="1">
+            <a:schemeClr val="accent1"/>
+          </a:fillRef>
+          <a:effectRef idx="0">
+            <a:schemeClr val="accent1"/>
+          </a:effectRef>
+          <a:fontRef idx="minor">
+            <a:schemeClr val="lt1"/>
+          </a:fontRef>
+        </p:style>
+        <p:txBody>
+          <a:bodyPr rtlCol="0" anchor="ctr"/>
+          <a:lstStyle/>
+          <a:p>
+            <a:pPr algn="ctr"/>
+            <a:r>
+              <a:rPr lang="ko-KR" altLang="en-US" sz="1100">
                 <a:latin typeface="Microsoft GothicNeo" panose="020B0500000101010101" pitchFamily="50" charset="-127"/>
                 <a:ea typeface="Microsoft GothicNeo" panose="020B0500000101010101" pitchFamily="50" charset="-127"/>
                 <a:cs typeface="Microsoft GothicNeo" panose="020B0500000101010101" pitchFamily="50" charset="-127"/>
-              </a:endParaRPr>
-            </a:p>
-          </p:txBody>
-        </p:sp>
-        <p:sp>
-          <p:nvSpPr>
-            <p:cNvPr id="13" name="직사각형 12">
-              <a:extLst>
-                <a:ext uri="{FF2B5EF4-FFF2-40B4-BE49-F238E27FC236}">
-                  <a16:creationId xmlns:a16="http://schemas.microsoft.com/office/drawing/2014/main" id="{31FAA19A-3DEE-4D57-A1B1-C3668958D435}"/>
-                </a:ext>
-              </a:extLst>
-            </p:cNvPr>
-            <p:cNvSpPr/>
-            <p:nvPr/>
-          </p:nvSpPr>
-          <p:spPr>
-            <a:xfrm>
-              <a:off x="2014220" y="4216244"/>
-              <a:ext cx="2362200" cy="380076"/>
-            </a:xfrm>
-            <a:prstGeom prst="rect">
-              <a:avLst/>
-            </a:prstGeom>
-            <a:solidFill>
-              <a:srgbClr val="4372E2"/>
-            </a:solidFill>
-            <a:ln>
-              <a:noFill/>
-            </a:ln>
-            <a:effectLst/>
-            <a:scene3d>
-              <a:camera prst="orthographicFront">
-                <a:rot lat="0" lon="0" rev="0"/>
-              </a:camera>
-              <a:lightRig rig="contrasting" dir="t">
-                <a:rot lat="0" lon="0" rev="7800000"/>
-              </a:lightRig>
-            </a:scene3d>
-            <a:sp3d>
-              <a:bevelT w="139700" h="139700"/>
-            </a:sp3d>
-          </p:spPr>
-          <p:style>
-            <a:lnRef idx="2">
-              <a:schemeClr val="accent1">
-                <a:shade val="50000"/>
-              </a:schemeClr>
-            </a:lnRef>
-            <a:fillRef idx="1">
-              <a:schemeClr val="accent1"/>
-            </a:fillRef>
-            <a:effectRef idx="0">
-              <a:schemeClr val="accent1"/>
-            </a:effectRef>
-            <a:fontRef idx="minor">
-              <a:schemeClr val="lt1"/>
-            </a:fontRef>
-          </p:style>
-          <p:txBody>
-            <a:bodyPr rtlCol="0" anchor="ctr"/>
-            <a:lstStyle/>
-            <a:p>
-              <a:pPr algn="ctr"/>
-              <a:r>
-                <a:rPr lang="ko-KR" altLang="en-US" sz="1100">
-                  <a:latin typeface="Microsoft GothicNeo" panose="020B0500000101010101" pitchFamily="50" charset="-127"/>
-                  <a:ea typeface="Microsoft GothicNeo" panose="020B0500000101010101" pitchFamily="50" charset="-127"/>
-                  <a:cs typeface="Microsoft GothicNeo" panose="020B0500000101010101" pitchFamily="50" charset="-127"/>
-                </a:rPr>
-                <a:t>마스크 </a:t>
-              </a:r>
-              <a:r>
-                <a:rPr lang="en-US" altLang="ko-KR" sz="1100">
-                  <a:latin typeface="Microsoft GothicNeo" panose="020B0500000101010101" pitchFamily="50" charset="-127"/>
-                  <a:ea typeface="Microsoft GothicNeo" panose="020B0500000101010101" pitchFamily="50" charset="-127"/>
-                  <a:cs typeface="Microsoft GothicNeo" panose="020B0500000101010101" pitchFamily="50" charset="-127"/>
-                </a:rPr>
-                <a:t>&amp; </a:t>
-              </a:r>
-              <a:r>
-                <a:rPr lang="ko-KR" altLang="en-US" sz="1100">
-                  <a:latin typeface="Microsoft GothicNeo" panose="020B0500000101010101" pitchFamily="50" charset="-127"/>
-                  <a:ea typeface="Microsoft GothicNeo" panose="020B0500000101010101" pitchFamily="50" charset="-127"/>
-                  <a:cs typeface="Microsoft GothicNeo" panose="020B0500000101010101" pitchFamily="50" charset="-127"/>
-                </a:rPr>
-                <a:t>자가진단 알리미 </a:t>
-              </a:r>
-              <a:r>
-                <a:rPr lang="en-US" altLang="ko-KR" sz="1100">
-                  <a:latin typeface="Microsoft GothicNeo" panose="020B0500000101010101" pitchFamily="50" charset="-127"/>
-                  <a:ea typeface="Microsoft GothicNeo" panose="020B0500000101010101" pitchFamily="50" charset="-127"/>
-                  <a:cs typeface="Microsoft GothicNeo" panose="020B0500000101010101" pitchFamily="50" charset="-127"/>
-                </a:rPr>
-                <a:t>+</a:t>
-              </a:r>
-              <a:endParaRPr lang="ko-KR" altLang="en-US" sz="1100">
+              </a:rPr>
+              <a:t>자가진단 </a:t>
+            </a:r>
+            <a:r>
+              <a:rPr lang="en-US" altLang="ko-KR" sz="1100">
                 <a:latin typeface="Microsoft GothicNeo" panose="020B0500000101010101" pitchFamily="50" charset="-127"/>
                 <a:ea typeface="Microsoft GothicNeo" panose="020B0500000101010101" pitchFamily="50" charset="-127"/>
                 <a:cs typeface="Microsoft GothicNeo" panose="020B0500000101010101" pitchFamily="50" charset="-127"/>
-              </a:endParaRPr>
-            </a:p>
-          </p:txBody>
-        </p:sp>
-        <p:sp>
-          <p:nvSpPr>
-            <p:cNvPr id="14" name="직사각형 13">
-              <a:extLst>
-                <a:ext uri="{FF2B5EF4-FFF2-40B4-BE49-F238E27FC236}">
-                  <a16:creationId xmlns:a16="http://schemas.microsoft.com/office/drawing/2014/main" id="{0924A621-177D-4C5E-BDE7-59E0731AD7A5}"/>
-                </a:ext>
-              </a:extLst>
-            </p:cNvPr>
-            <p:cNvSpPr/>
-            <p:nvPr/>
-          </p:nvSpPr>
-          <p:spPr>
-            <a:xfrm>
-              <a:off x="2014220" y="4776705"/>
-              <a:ext cx="2362200" cy="380076"/>
-            </a:xfrm>
-            <a:prstGeom prst="rect">
-              <a:avLst/>
-            </a:prstGeom>
-            <a:solidFill>
-              <a:srgbClr val="696969"/>
-            </a:solidFill>
-            <a:ln>
-              <a:noFill/>
-            </a:ln>
-            <a:effectLst/>
-            <a:scene3d>
-              <a:camera prst="orthographicFront">
-                <a:rot lat="0" lon="0" rev="0"/>
-              </a:camera>
-              <a:lightRig rig="contrasting" dir="t">
-                <a:rot lat="0" lon="0" rev="7800000"/>
-              </a:lightRig>
-            </a:scene3d>
-            <a:sp3d>
-              <a:bevelT w="139700" h="139700"/>
-            </a:sp3d>
-          </p:spPr>
-          <p:style>
-            <a:lnRef idx="2">
-              <a:schemeClr val="accent1">
-                <a:shade val="50000"/>
-              </a:schemeClr>
-            </a:lnRef>
-            <a:fillRef idx="1">
-              <a:schemeClr val="accent1"/>
-            </a:fillRef>
-            <a:effectRef idx="0">
-              <a:schemeClr val="accent1"/>
-            </a:effectRef>
-            <a:fontRef idx="minor">
-              <a:schemeClr val="lt1"/>
-            </a:fontRef>
-          </p:style>
-          <p:txBody>
-            <a:bodyPr rtlCol="0" anchor="ctr"/>
-            <a:lstStyle/>
-            <a:p>
-              <a:pPr algn="ctr"/>
-              <a:r>
-                <a:rPr lang="ko-KR" altLang="en-US" sz="1100">
-                  <a:latin typeface="Microsoft GothicNeo" panose="020B0500000101010101" pitchFamily="50" charset="-127"/>
-                  <a:ea typeface="Microsoft GothicNeo" panose="020B0500000101010101" pitchFamily="50" charset="-127"/>
-                  <a:cs typeface="Microsoft GothicNeo" panose="020B0500000101010101" pitchFamily="50" charset="-127"/>
-                </a:rPr>
-                <a:t>코로나</a:t>
-              </a:r>
-              <a:r>
-                <a:rPr lang="en-US" altLang="ko-KR" sz="1100">
-                  <a:latin typeface="Microsoft GothicNeo" panose="020B0500000101010101" pitchFamily="50" charset="-127"/>
-                  <a:ea typeface="Microsoft GothicNeo" panose="020B0500000101010101" pitchFamily="50" charset="-127"/>
-                  <a:cs typeface="Microsoft GothicNeo" panose="020B0500000101010101" pitchFamily="50" charset="-127"/>
-                </a:rPr>
-                <a:t>19 </a:t>
-              </a:r>
-              <a:r>
-                <a:rPr lang="ko-KR" altLang="en-US" sz="1100">
-                  <a:latin typeface="Microsoft GothicNeo" panose="020B0500000101010101" pitchFamily="50" charset="-127"/>
-                  <a:ea typeface="Microsoft GothicNeo" panose="020B0500000101010101" pitchFamily="50" charset="-127"/>
-                  <a:cs typeface="Microsoft GothicNeo" panose="020B0500000101010101" pitchFamily="50" charset="-127"/>
-                </a:rPr>
-                <a:t>증상 및 예방수칙 </a:t>
-              </a:r>
-              <a:r>
-                <a:rPr lang="en-US" altLang="ko-KR" sz="1100">
-                  <a:latin typeface="Microsoft GothicNeo" panose="020B0500000101010101" pitchFamily="50" charset="-127"/>
-                  <a:ea typeface="Microsoft GothicNeo" panose="020B0500000101010101" pitchFamily="50" charset="-127"/>
-                  <a:cs typeface="Microsoft GothicNeo" panose="020B0500000101010101" pitchFamily="50" charset="-127"/>
-                </a:rPr>
-                <a:t>+</a:t>
-              </a:r>
-              <a:endParaRPr lang="ko-KR" altLang="en-US" sz="1100">
+              </a:rPr>
+              <a:t>+</a:t>
+            </a:r>
+            <a:endParaRPr lang="ko-KR" altLang="en-US" sz="1100">
+              <a:latin typeface="Microsoft GothicNeo" panose="020B0500000101010101" pitchFamily="50" charset="-127"/>
+              <a:ea typeface="Microsoft GothicNeo" panose="020B0500000101010101" pitchFamily="50" charset="-127"/>
+              <a:cs typeface="Microsoft GothicNeo" panose="020B0500000101010101" pitchFamily="50" charset="-127"/>
+            </a:endParaRPr>
+          </a:p>
+        </p:txBody>
+      </p:sp>
+      <p:sp>
+        <p:nvSpPr>
+          <p:cNvPr id="12" name="직사각형 11">
+            <a:extLst>
+              <a:ext uri="{FF2B5EF4-FFF2-40B4-BE49-F238E27FC236}">
+                <a16:creationId xmlns:a16="http://schemas.microsoft.com/office/drawing/2014/main" id="{59FF9B6D-31FD-4EAB-BAB4-AE2302CADB66}"/>
+              </a:ext>
+            </a:extLst>
+          </p:cNvPr>
+          <p:cNvSpPr/>
+          <p:nvPr/>
+        </p:nvSpPr>
+        <p:spPr>
+          <a:xfrm>
+            <a:off x="2014220" y="3655783"/>
+            <a:ext cx="2362200" cy="380076"/>
+          </a:xfrm>
+          <a:prstGeom prst="rect">
+            <a:avLst/>
+          </a:prstGeom>
+          <a:solidFill>
+            <a:srgbClr val="EF9226"/>
+          </a:solidFill>
+          <a:ln>
+            <a:noFill/>
+          </a:ln>
+          <a:effectLst/>
+          <a:scene3d>
+            <a:camera prst="orthographicFront">
+              <a:rot lat="0" lon="0" rev="0"/>
+            </a:camera>
+            <a:lightRig rig="contrasting" dir="t">
+              <a:rot lat="0" lon="0" rev="7800000"/>
+            </a:lightRig>
+          </a:scene3d>
+          <a:sp3d>
+            <a:bevelT w="139700" h="139700"/>
+          </a:sp3d>
+        </p:spPr>
+        <p:style>
+          <a:lnRef idx="2">
+            <a:schemeClr val="accent1">
+              <a:shade val="50000"/>
+            </a:schemeClr>
+          </a:lnRef>
+          <a:fillRef idx="1">
+            <a:schemeClr val="accent1"/>
+          </a:fillRef>
+          <a:effectRef idx="0">
+            <a:schemeClr val="accent1"/>
+          </a:effectRef>
+          <a:fontRef idx="minor">
+            <a:schemeClr val="lt1"/>
+          </a:fontRef>
+        </p:style>
+        <p:txBody>
+          <a:bodyPr rtlCol="0" anchor="ctr"/>
+          <a:lstStyle/>
+          <a:p>
+            <a:pPr algn="ctr"/>
+            <a:r>
+              <a:rPr lang="ko-KR" altLang="en-US" sz="1100">
                 <a:latin typeface="Microsoft GothicNeo" panose="020B0500000101010101" pitchFamily="50" charset="-127"/>
                 <a:ea typeface="Microsoft GothicNeo" panose="020B0500000101010101" pitchFamily="50" charset="-127"/>
                 <a:cs typeface="Microsoft GothicNeo" panose="020B0500000101010101" pitchFamily="50" charset="-127"/>
-              </a:endParaRPr>
-            </a:p>
-          </p:txBody>
-        </p:sp>
-        <p:sp>
-          <p:nvSpPr>
-            <p:cNvPr id="18" name="사각형: 둥근 모서리 17">
-              <a:extLst>
-                <a:ext uri="{FF2B5EF4-FFF2-40B4-BE49-F238E27FC236}">
-                  <a16:creationId xmlns:a16="http://schemas.microsoft.com/office/drawing/2014/main" id="{F605DAD8-B74E-4E49-9BE6-BE6C8CE40AD0}"/>
-                </a:ext>
-              </a:extLst>
-            </p:cNvPr>
-            <p:cNvSpPr/>
-            <p:nvPr/>
-          </p:nvSpPr>
-          <p:spPr>
-            <a:xfrm>
-              <a:off x="2794838" y="2767780"/>
-              <a:ext cx="461154" cy="160020"/>
-            </a:xfrm>
-            <a:prstGeom prst="roundRect">
-              <a:avLst/>
-            </a:prstGeom>
-            <a:solidFill>
-              <a:schemeClr val="accent1">
-                <a:alpha val="50000"/>
-              </a:schemeClr>
-            </a:solidFill>
-            <a:ln>
-              <a:noFill/>
-            </a:ln>
-          </p:spPr>
-          <p:style>
-            <a:lnRef idx="0">
-              <a:scrgbClr r="0" g="0" b="0"/>
-            </a:lnRef>
-            <a:fillRef idx="0">
-              <a:scrgbClr r="0" g="0" b="0"/>
-            </a:fillRef>
-            <a:effectRef idx="0">
-              <a:scrgbClr r="0" g="0" b="0"/>
-            </a:effectRef>
-            <a:fontRef idx="minor">
-              <a:schemeClr val="lt1"/>
-            </a:fontRef>
-          </p:style>
-          <p:txBody>
-            <a:bodyPr rtlCol="0" anchor="ctr"/>
-            <a:lstStyle/>
-            <a:p>
-              <a:pPr algn="ctr"/>
-              <a:r>
-                <a:rPr lang="en-US" altLang="ko-KR" sz="600">
-                  <a:solidFill>
-                    <a:schemeClr val="tx1"/>
-                  </a:solidFill>
-                  <a:latin typeface="Microsoft GothicNeo" panose="020B0500000101010101" pitchFamily="50" charset="-127"/>
-                  <a:ea typeface="Microsoft GothicNeo" panose="020B0500000101010101" pitchFamily="50" charset="-127"/>
-                  <a:cs typeface="Microsoft GothicNeo" panose="020B0500000101010101" pitchFamily="50" charset="-127"/>
-                </a:rPr>
-                <a:t>English</a:t>
-              </a:r>
-              <a:endParaRPr lang="ko-KR" altLang="en-US" sz="600">
+              </a:rPr>
+              <a:t>전자출입명부 </a:t>
+            </a:r>
+            <a:r>
+              <a:rPr lang="en-US" altLang="ko-KR" sz="1100">
+                <a:latin typeface="Microsoft GothicNeo" panose="020B0500000101010101" pitchFamily="50" charset="-127"/>
+                <a:ea typeface="Microsoft GothicNeo" panose="020B0500000101010101" pitchFamily="50" charset="-127"/>
+                <a:cs typeface="Microsoft GothicNeo" panose="020B0500000101010101" pitchFamily="50" charset="-127"/>
+              </a:rPr>
+              <a:t>+ </a:t>
+            </a:r>
+            <a:endParaRPr lang="ko-KR" altLang="en-US" sz="1100">
+              <a:latin typeface="Microsoft GothicNeo" panose="020B0500000101010101" pitchFamily="50" charset="-127"/>
+              <a:ea typeface="Microsoft GothicNeo" panose="020B0500000101010101" pitchFamily="50" charset="-127"/>
+              <a:cs typeface="Microsoft GothicNeo" panose="020B0500000101010101" pitchFamily="50" charset="-127"/>
+            </a:endParaRPr>
+          </a:p>
+        </p:txBody>
+      </p:sp>
+      <p:sp>
+        <p:nvSpPr>
+          <p:cNvPr id="13" name="직사각형 12">
+            <a:extLst>
+              <a:ext uri="{FF2B5EF4-FFF2-40B4-BE49-F238E27FC236}">
+                <a16:creationId xmlns:a16="http://schemas.microsoft.com/office/drawing/2014/main" id="{31FAA19A-3DEE-4D57-A1B1-C3668958D435}"/>
+              </a:ext>
+            </a:extLst>
+          </p:cNvPr>
+          <p:cNvSpPr/>
+          <p:nvPr/>
+        </p:nvSpPr>
+        <p:spPr>
+          <a:xfrm>
+            <a:off x="2014220" y="4216244"/>
+            <a:ext cx="2362200" cy="380076"/>
+          </a:xfrm>
+          <a:prstGeom prst="rect">
+            <a:avLst/>
+          </a:prstGeom>
+          <a:solidFill>
+            <a:srgbClr val="4372E2"/>
+          </a:solidFill>
+          <a:ln>
+            <a:noFill/>
+          </a:ln>
+          <a:effectLst/>
+          <a:scene3d>
+            <a:camera prst="orthographicFront">
+              <a:rot lat="0" lon="0" rev="0"/>
+            </a:camera>
+            <a:lightRig rig="contrasting" dir="t">
+              <a:rot lat="0" lon="0" rev="7800000"/>
+            </a:lightRig>
+          </a:scene3d>
+          <a:sp3d>
+            <a:bevelT w="139700" h="139700"/>
+          </a:sp3d>
+        </p:spPr>
+        <p:style>
+          <a:lnRef idx="2">
+            <a:schemeClr val="accent1">
+              <a:shade val="50000"/>
+            </a:schemeClr>
+          </a:lnRef>
+          <a:fillRef idx="1">
+            <a:schemeClr val="accent1"/>
+          </a:fillRef>
+          <a:effectRef idx="0">
+            <a:schemeClr val="accent1"/>
+          </a:effectRef>
+          <a:fontRef idx="minor">
+            <a:schemeClr val="lt1"/>
+          </a:fontRef>
+        </p:style>
+        <p:txBody>
+          <a:bodyPr rtlCol="0" anchor="ctr"/>
+          <a:lstStyle/>
+          <a:p>
+            <a:pPr algn="ctr"/>
+            <a:r>
+              <a:rPr lang="ko-KR" altLang="en-US" sz="1100">
+                <a:latin typeface="Microsoft GothicNeo" panose="020B0500000101010101" pitchFamily="50" charset="-127"/>
+                <a:ea typeface="Microsoft GothicNeo" panose="020B0500000101010101" pitchFamily="50" charset="-127"/>
+                <a:cs typeface="Microsoft GothicNeo" panose="020B0500000101010101" pitchFamily="50" charset="-127"/>
+              </a:rPr>
+              <a:t>마스크 </a:t>
+            </a:r>
+            <a:r>
+              <a:rPr lang="en-US" altLang="ko-KR" sz="1100">
+                <a:latin typeface="Microsoft GothicNeo" panose="020B0500000101010101" pitchFamily="50" charset="-127"/>
+                <a:ea typeface="Microsoft GothicNeo" panose="020B0500000101010101" pitchFamily="50" charset="-127"/>
+                <a:cs typeface="Microsoft GothicNeo" panose="020B0500000101010101" pitchFamily="50" charset="-127"/>
+              </a:rPr>
+              <a:t>&amp; </a:t>
+            </a:r>
+            <a:r>
+              <a:rPr lang="ko-KR" altLang="en-US" sz="1100">
+                <a:latin typeface="Microsoft GothicNeo" panose="020B0500000101010101" pitchFamily="50" charset="-127"/>
+                <a:ea typeface="Microsoft GothicNeo" panose="020B0500000101010101" pitchFamily="50" charset="-127"/>
+                <a:cs typeface="Microsoft GothicNeo" panose="020B0500000101010101" pitchFamily="50" charset="-127"/>
+              </a:rPr>
+              <a:t>자가진단 알리미 </a:t>
+            </a:r>
+            <a:r>
+              <a:rPr lang="en-US" altLang="ko-KR" sz="1100">
+                <a:latin typeface="Microsoft GothicNeo" panose="020B0500000101010101" pitchFamily="50" charset="-127"/>
+                <a:ea typeface="Microsoft GothicNeo" panose="020B0500000101010101" pitchFamily="50" charset="-127"/>
+                <a:cs typeface="Microsoft GothicNeo" panose="020B0500000101010101" pitchFamily="50" charset="-127"/>
+              </a:rPr>
+              <a:t>+</a:t>
+            </a:r>
+            <a:endParaRPr lang="ko-KR" altLang="en-US" sz="1100">
+              <a:latin typeface="Microsoft GothicNeo" panose="020B0500000101010101" pitchFamily="50" charset="-127"/>
+              <a:ea typeface="Microsoft GothicNeo" panose="020B0500000101010101" pitchFamily="50" charset="-127"/>
+              <a:cs typeface="Microsoft GothicNeo" panose="020B0500000101010101" pitchFamily="50" charset="-127"/>
+            </a:endParaRPr>
+          </a:p>
+        </p:txBody>
+      </p:sp>
+      <p:sp>
+        <p:nvSpPr>
+          <p:cNvPr id="14" name="직사각형 13">
+            <a:extLst>
+              <a:ext uri="{FF2B5EF4-FFF2-40B4-BE49-F238E27FC236}">
+                <a16:creationId xmlns:a16="http://schemas.microsoft.com/office/drawing/2014/main" id="{0924A621-177D-4C5E-BDE7-59E0731AD7A5}"/>
+              </a:ext>
+            </a:extLst>
+          </p:cNvPr>
+          <p:cNvSpPr/>
+          <p:nvPr/>
+        </p:nvSpPr>
+        <p:spPr>
+          <a:xfrm>
+            <a:off x="2014220" y="4776705"/>
+            <a:ext cx="2362200" cy="380076"/>
+          </a:xfrm>
+          <a:prstGeom prst="rect">
+            <a:avLst/>
+          </a:prstGeom>
+          <a:solidFill>
+            <a:srgbClr val="696969"/>
+          </a:solidFill>
+          <a:ln>
+            <a:noFill/>
+          </a:ln>
+          <a:effectLst/>
+          <a:scene3d>
+            <a:camera prst="orthographicFront">
+              <a:rot lat="0" lon="0" rev="0"/>
+            </a:camera>
+            <a:lightRig rig="contrasting" dir="t">
+              <a:rot lat="0" lon="0" rev="7800000"/>
+            </a:lightRig>
+          </a:scene3d>
+          <a:sp3d>
+            <a:bevelT w="139700" h="139700"/>
+          </a:sp3d>
+        </p:spPr>
+        <p:style>
+          <a:lnRef idx="2">
+            <a:schemeClr val="accent1">
+              <a:shade val="50000"/>
+            </a:schemeClr>
+          </a:lnRef>
+          <a:fillRef idx="1">
+            <a:schemeClr val="accent1"/>
+          </a:fillRef>
+          <a:effectRef idx="0">
+            <a:schemeClr val="accent1"/>
+          </a:effectRef>
+          <a:fontRef idx="minor">
+            <a:schemeClr val="lt1"/>
+          </a:fontRef>
+        </p:style>
+        <p:txBody>
+          <a:bodyPr rtlCol="0" anchor="ctr"/>
+          <a:lstStyle/>
+          <a:p>
+            <a:pPr algn="ctr"/>
+            <a:r>
+              <a:rPr lang="ko-KR" altLang="en-US" sz="1100">
+                <a:latin typeface="Microsoft GothicNeo" panose="020B0500000101010101" pitchFamily="50" charset="-127"/>
+                <a:ea typeface="Microsoft GothicNeo" panose="020B0500000101010101" pitchFamily="50" charset="-127"/>
+                <a:cs typeface="Microsoft GothicNeo" panose="020B0500000101010101" pitchFamily="50" charset="-127"/>
+              </a:rPr>
+              <a:t>코로나</a:t>
+            </a:r>
+            <a:r>
+              <a:rPr lang="en-US" altLang="ko-KR" sz="1100">
+                <a:latin typeface="Microsoft GothicNeo" panose="020B0500000101010101" pitchFamily="50" charset="-127"/>
+                <a:ea typeface="Microsoft GothicNeo" panose="020B0500000101010101" pitchFamily="50" charset="-127"/>
+                <a:cs typeface="Microsoft GothicNeo" panose="020B0500000101010101" pitchFamily="50" charset="-127"/>
+              </a:rPr>
+              <a:t>19 </a:t>
+            </a:r>
+            <a:r>
+              <a:rPr lang="ko-KR" altLang="en-US" sz="1100">
+                <a:latin typeface="Microsoft GothicNeo" panose="020B0500000101010101" pitchFamily="50" charset="-127"/>
+                <a:ea typeface="Microsoft GothicNeo" panose="020B0500000101010101" pitchFamily="50" charset="-127"/>
+                <a:cs typeface="Microsoft GothicNeo" panose="020B0500000101010101" pitchFamily="50" charset="-127"/>
+              </a:rPr>
+              <a:t>증상 및 예방수칙 </a:t>
+            </a:r>
+            <a:r>
+              <a:rPr lang="en-US" altLang="ko-KR" sz="1100">
+                <a:latin typeface="Microsoft GothicNeo" panose="020B0500000101010101" pitchFamily="50" charset="-127"/>
+                <a:ea typeface="Microsoft GothicNeo" panose="020B0500000101010101" pitchFamily="50" charset="-127"/>
+                <a:cs typeface="Microsoft GothicNeo" panose="020B0500000101010101" pitchFamily="50" charset="-127"/>
+              </a:rPr>
+              <a:t>+</a:t>
+            </a:r>
+            <a:endParaRPr lang="ko-KR" altLang="en-US" sz="1100">
+              <a:latin typeface="Microsoft GothicNeo" panose="020B0500000101010101" pitchFamily="50" charset="-127"/>
+              <a:ea typeface="Microsoft GothicNeo" panose="020B0500000101010101" pitchFamily="50" charset="-127"/>
+              <a:cs typeface="Microsoft GothicNeo" panose="020B0500000101010101" pitchFamily="50" charset="-127"/>
+            </a:endParaRPr>
+          </a:p>
+        </p:txBody>
+      </p:sp>
+      <p:sp>
+        <p:nvSpPr>
+          <p:cNvPr id="18" name="사각형: 둥근 모서리 17">
+            <a:extLst>
+              <a:ext uri="{FF2B5EF4-FFF2-40B4-BE49-F238E27FC236}">
+                <a16:creationId xmlns:a16="http://schemas.microsoft.com/office/drawing/2014/main" id="{F605DAD8-B74E-4E49-9BE6-BE6C8CE40AD0}"/>
+              </a:ext>
+            </a:extLst>
+          </p:cNvPr>
+          <p:cNvSpPr/>
+          <p:nvPr/>
+        </p:nvSpPr>
+        <p:spPr>
+          <a:xfrm>
+            <a:off x="2794838" y="2767780"/>
+            <a:ext cx="461154" cy="160020"/>
+          </a:xfrm>
+          <a:prstGeom prst="roundRect">
+            <a:avLst/>
+          </a:prstGeom>
+          <a:solidFill>
+            <a:schemeClr val="accent1">
+              <a:alpha val="50000"/>
+            </a:schemeClr>
+          </a:solidFill>
+          <a:ln>
+            <a:noFill/>
+          </a:ln>
+        </p:spPr>
+        <p:style>
+          <a:lnRef idx="0">
+            <a:scrgbClr r="0" g="0" b="0"/>
+          </a:lnRef>
+          <a:fillRef idx="0">
+            <a:scrgbClr r="0" g="0" b="0"/>
+          </a:fillRef>
+          <a:effectRef idx="0">
+            <a:scrgbClr r="0" g="0" b="0"/>
+          </a:effectRef>
+          <a:fontRef idx="minor">
+            <a:schemeClr val="lt1"/>
+          </a:fontRef>
+        </p:style>
+        <p:txBody>
+          <a:bodyPr rtlCol="0" anchor="ctr"/>
+          <a:lstStyle/>
+          <a:p>
+            <a:pPr algn="ctr"/>
+            <a:r>
+              <a:rPr lang="en-US" altLang="ko-KR" sz="600">
+                <a:solidFill>
+                  <a:schemeClr val="tx1"/>
+                </a:solidFill>
+                <a:latin typeface="LG Smart UI Bold" panose="020B0800000101010101" pitchFamily="50" charset="-127"/>
+                <a:ea typeface="LG Smart UI Bold" panose="020B0800000101010101" pitchFamily="50" charset="-127"/>
+                <a:cs typeface="Microsoft GothicNeo" panose="020B0500000101010101" pitchFamily="50" charset="-127"/>
+              </a:rPr>
+              <a:t>English</a:t>
+            </a:r>
+            <a:endParaRPr lang="ko-KR" altLang="en-US" sz="600">
+              <a:solidFill>
+                <a:schemeClr val="tx1"/>
+              </a:solidFill>
+              <a:latin typeface="LG Smart UI Bold" panose="020B0800000101010101" pitchFamily="50" charset="-127"/>
+              <a:ea typeface="LG Smart UI Bold" panose="020B0800000101010101" pitchFamily="50" charset="-127"/>
+              <a:cs typeface="Microsoft GothicNeo" panose="020B0500000101010101" pitchFamily="50" charset="-127"/>
+            </a:endParaRPr>
+          </a:p>
+        </p:txBody>
+      </p:sp>
+      <p:sp>
+        <p:nvSpPr>
+          <p:cNvPr id="19" name="사각형: 둥근 모서리 18">
+            <a:extLst>
+              <a:ext uri="{FF2B5EF4-FFF2-40B4-BE49-F238E27FC236}">
+                <a16:creationId xmlns:a16="http://schemas.microsoft.com/office/drawing/2014/main" id="{5B2E9673-1C97-4351-B5D8-43098DB9D0D8}"/>
+              </a:ext>
+            </a:extLst>
+          </p:cNvPr>
+          <p:cNvSpPr/>
+          <p:nvPr/>
+        </p:nvSpPr>
+        <p:spPr>
+          <a:xfrm>
+            <a:off x="3339812" y="2767780"/>
+            <a:ext cx="461154" cy="160020"/>
+          </a:xfrm>
+          <a:prstGeom prst="roundRect">
+            <a:avLst/>
+          </a:prstGeom>
+          <a:solidFill>
+            <a:schemeClr val="accent1">
+              <a:alpha val="50000"/>
+            </a:schemeClr>
+          </a:solidFill>
+          <a:ln>
+            <a:noFill/>
+          </a:ln>
+        </p:spPr>
+        <p:style>
+          <a:lnRef idx="0">
+            <a:scrgbClr r="0" g="0" b="0"/>
+          </a:lnRef>
+          <a:fillRef idx="0">
+            <a:scrgbClr r="0" g="0" b="0"/>
+          </a:fillRef>
+          <a:effectRef idx="0">
+            <a:scrgbClr r="0" g="0" b="0"/>
+          </a:effectRef>
+          <a:fontRef idx="minor">
+            <a:schemeClr val="lt1"/>
+          </a:fontRef>
+        </p:style>
+        <p:txBody>
+          <a:bodyPr rtlCol="0" anchor="ctr"/>
+          <a:lstStyle/>
+          <a:p>
+            <a:pPr algn="ctr"/>
+            <a:r>
+              <a:rPr lang="ko-KR" altLang="en-US" sz="650" b="1">
+                <a:solidFill>
+                  <a:schemeClr val="tx1"/>
+                </a:solidFill>
+                <a:latin typeface="LG Smart UI Bold" panose="020B0800000101010101" pitchFamily="50" charset="-127"/>
+                <a:ea typeface="LG Smart UI Bold" panose="020B0800000101010101" pitchFamily="50" charset="-127"/>
+                <a:cs typeface="Microsoft GothicNeo" panose="020B0500000101010101" pitchFamily="50" charset="-127"/>
+              </a:rPr>
+              <a:t>汉语</a:t>
+            </a:r>
+          </a:p>
+        </p:txBody>
+      </p:sp>
+      <p:sp>
+        <p:nvSpPr>
+          <p:cNvPr id="20" name="사각형: 둥근 모서리 19">
+            <a:extLst>
+              <a:ext uri="{FF2B5EF4-FFF2-40B4-BE49-F238E27FC236}">
+                <a16:creationId xmlns:a16="http://schemas.microsoft.com/office/drawing/2014/main" id="{0156FFB8-952A-4D9E-9E85-C53C9D8C6D3D}"/>
+              </a:ext>
+            </a:extLst>
+          </p:cNvPr>
+          <p:cNvSpPr/>
+          <p:nvPr/>
+        </p:nvSpPr>
+        <p:spPr>
+          <a:xfrm>
+            <a:off x="3884786" y="2767780"/>
+            <a:ext cx="461154" cy="160020"/>
+          </a:xfrm>
+          <a:prstGeom prst="roundRect">
+            <a:avLst/>
+          </a:prstGeom>
+          <a:solidFill>
+            <a:schemeClr val="accent1">
+              <a:alpha val="50000"/>
+            </a:schemeClr>
+          </a:solidFill>
+          <a:ln>
+            <a:noFill/>
+          </a:ln>
+        </p:spPr>
+        <p:style>
+          <a:lnRef idx="0">
+            <a:scrgbClr r="0" g="0" b="0"/>
+          </a:lnRef>
+          <a:fillRef idx="0">
+            <a:scrgbClr r="0" g="0" b="0"/>
+          </a:fillRef>
+          <a:effectRef idx="0">
+            <a:scrgbClr r="0" g="0" b="0"/>
+          </a:effectRef>
+          <a:fontRef idx="minor">
+            <a:schemeClr val="lt1"/>
+          </a:fontRef>
+        </p:style>
+        <p:txBody>
+          <a:bodyPr rtlCol="0" anchor="ctr"/>
+          <a:lstStyle/>
+          <a:p>
+            <a:pPr algn="ctr"/>
+            <a:r>
+              <a:rPr lang="ko-KR" altLang="en-US" sz="650">
                 <a:solidFill>
                   <a:schemeClr val="tx1"/>
                 </a:solidFill>
                 <a:latin typeface="Microsoft GothicNeo" panose="020B0500000101010101" pitchFamily="50" charset="-127"/>
                 <a:ea typeface="Microsoft GothicNeo" panose="020B0500000101010101" pitchFamily="50" charset="-127"/>
                 <a:cs typeface="Microsoft GothicNeo" panose="020B0500000101010101" pitchFamily="50" charset="-127"/>
-              </a:endParaRPr>
-            </a:p>
-          </p:txBody>
-        </p:sp>
-        <p:sp>
-          <p:nvSpPr>
-            <p:cNvPr id="19" name="사각형: 둥근 모서리 18">
-              <a:extLst>
-                <a:ext uri="{FF2B5EF4-FFF2-40B4-BE49-F238E27FC236}">
-                  <a16:creationId xmlns:a16="http://schemas.microsoft.com/office/drawing/2014/main" id="{5B2E9673-1C97-4351-B5D8-43098DB9D0D8}"/>
-                </a:ext>
-              </a:extLst>
-            </p:cNvPr>
-            <p:cNvSpPr/>
-            <p:nvPr/>
-          </p:nvSpPr>
-          <p:spPr>
-            <a:xfrm>
-              <a:off x="3339812" y="2767780"/>
-              <a:ext cx="461154" cy="160020"/>
-            </a:xfrm>
-            <a:prstGeom prst="roundRect">
-              <a:avLst/>
-            </a:prstGeom>
-            <a:solidFill>
-              <a:schemeClr val="accent1">
-                <a:alpha val="50000"/>
-              </a:schemeClr>
-            </a:solidFill>
-            <a:ln>
-              <a:noFill/>
-            </a:ln>
-          </p:spPr>
-          <p:style>
-            <a:lnRef idx="0">
-              <a:scrgbClr r="0" g="0" b="0"/>
-            </a:lnRef>
-            <a:fillRef idx="0">
-              <a:scrgbClr r="0" g="0" b="0"/>
-            </a:fillRef>
-            <a:effectRef idx="0">
-              <a:scrgbClr r="0" g="0" b="0"/>
-            </a:effectRef>
-            <a:fontRef idx="minor">
-              <a:schemeClr val="lt1"/>
-            </a:fontRef>
-          </p:style>
-          <p:txBody>
-            <a:bodyPr rtlCol="0" anchor="ctr"/>
-            <a:lstStyle/>
-            <a:p>
-              <a:pPr algn="ctr"/>
-              <a:r>
-                <a:rPr lang="ko-KR" altLang="en-US" sz="700" b="1">
-                  <a:solidFill>
-                    <a:schemeClr val="tx1"/>
-                  </a:solidFill>
-                  <a:latin typeface="Microsoft GothicNeo" panose="020B0500000101010101" pitchFamily="50" charset="-127"/>
-                  <a:ea typeface="Microsoft GothicNeo" panose="020B0500000101010101" pitchFamily="50" charset="-127"/>
-                  <a:cs typeface="Microsoft GothicNeo" panose="020B0500000101010101" pitchFamily="50" charset="-127"/>
-                </a:rPr>
-                <a:t>汉语</a:t>
-              </a:r>
-            </a:p>
-          </p:txBody>
-        </p:sp>
-        <p:sp>
-          <p:nvSpPr>
-            <p:cNvPr id="20" name="사각형: 둥근 모서리 19">
-              <a:extLst>
-                <a:ext uri="{FF2B5EF4-FFF2-40B4-BE49-F238E27FC236}">
-                  <a16:creationId xmlns:a16="http://schemas.microsoft.com/office/drawing/2014/main" id="{0156FFB8-952A-4D9E-9E85-C53C9D8C6D3D}"/>
-                </a:ext>
-              </a:extLst>
-            </p:cNvPr>
-            <p:cNvSpPr/>
-            <p:nvPr/>
-          </p:nvSpPr>
-          <p:spPr>
-            <a:xfrm>
-              <a:off x="3884786" y="2767780"/>
-              <a:ext cx="461154" cy="160020"/>
-            </a:xfrm>
-            <a:prstGeom prst="roundRect">
-              <a:avLst/>
-            </a:prstGeom>
-            <a:solidFill>
-              <a:schemeClr val="accent1">
-                <a:alpha val="50000"/>
-              </a:schemeClr>
-            </a:solidFill>
-            <a:ln>
-              <a:noFill/>
-            </a:ln>
-          </p:spPr>
-          <p:style>
-            <a:lnRef idx="0">
-              <a:scrgbClr r="0" g="0" b="0"/>
-            </a:lnRef>
-            <a:fillRef idx="0">
-              <a:scrgbClr r="0" g="0" b="0"/>
-            </a:fillRef>
-            <a:effectRef idx="0">
-              <a:scrgbClr r="0" g="0" b="0"/>
-            </a:effectRef>
-            <a:fontRef idx="minor">
-              <a:schemeClr val="lt1"/>
-            </a:fontRef>
-          </p:style>
-          <p:txBody>
-            <a:bodyPr rtlCol="0" anchor="ctr"/>
-            <a:lstStyle/>
-            <a:p>
-              <a:pPr algn="ctr"/>
-              <a:r>
-                <a:rPr lang="ko-KR" altLang="en-US" sz="700">
-                  <a:solidFill>
-                    <a:schemeClr val="tx1"/>
-                  </a:solidFill>
-                  <a:latin typeface="Microsoft GothicNeo" panose="020B0500000101010101" pitchFamily="50" charset="-127"/>
-                  <a:ea typeface="Microsoft GothicNeo" panose="020B0500000101010101" pitchFamily="50" charset="-127"/>
-                  <a:cs typeface="Microsoft GothicNeo" panose="020B0500000101010101" pitchFamily="50" charset="-127"/>
-                </a:rPr>
-                <a:t>日本語</a:t>
-              </a:r>
-              <a:endParaRPr lang="ko-KR" altLang="en-US" sz="100">
-                <a:solidFill>
-                  <a:schemeClr val="tx1"/>
-                </a:solidFill>
-                <a:latin typeface="Microsoft GothicNeo" panose="020B0500000101010101" pitchFamily="50" charset="-127"/>
-                <a:ea typeface="Microsoft GothicNeo" panose="020B0500000101010101" pitchFamily="50" charset="-127"/>
-                <a:cs typeface="Microsoft GothicNeo" panose="020B0500000101010101" pitchFamily="50" charset="-127"/>
-              </a:endParaRPr>
-            </a:p>
-          </p:txBody>
-        </p:sp>
-      </p:grpSp>
+              </a:rPr>
+              <a:t>日本語</a:t>
+            </a:r>
+          </a:p>
+        </p:txBody>
+      </p:sp>
     </p:spTree>
     <p:extLst>
       <p:ext uri="{BB962C8B-B14F-4D97-AF65-F5344CB8AC3E}">

</xml_diff>

<commit_message>
add other language logics
</commit_message>
<xml_diff>
--- a/화면디자인.pptx
+++ b/화면디자인.pptx
@@ -14,9 +14,13 @@
     <p:sldId id="264" r:id="rId8"/>
     <p:sldId id="267" r:id="rId9"/>
     <p:sldId id="265" r:id="rId10"/>
-    <p:sldId id="260" r:id="rId11"/>
-    <p:sldId id="261" r:id="rId12"/>
-    <p:sldId id="262" r:id="rId13"/>
+    <p:sldId id="268" r:id="rId11"/>
+    <p:sldId id="269" r:id="rId12"/>
+    <p:sldId id="270" r:id="rId13"/>
+    <p:sldId id="271" r:id="rId14"/>
+    <p:sldId id="260" r:id="rId15"/>
+    <p:sldId id="261" r:id="rId16"/>
+    <p:sldId id="262" r:id="rId17"/>
   </p:sldIdLst>
   <p:sldSz cx="12192000" cy="6858000"/>
   <p:notesSz cx="6858000" cy="9144000"/>
@@ -5033,6 +5037,2226 @@
           <a:chExt cx="0" cy="0"/>
         </a:xfrm>
       </p:grpSpPr>
+      <p:pic>
+        <p:nvPicPr>
+          <p:cNvPr id="15" name="그림 14">
+            <a:extLst>
+              <a:ext uri="{FF2B5EF4-FFF2-40B4-BE49-F238E27FC236}">
+                <a16:creationId xmlns:a16="http://schemas.microsoft.com/office/drawing/2014/main" id="{455787F0-82CE-48D1-88F6-311B6617C1F3}"/>
+              </a:ext>
+            </a:extLst>
+          </p:cNvPr>
+          <p:cNvPicPr>
+            <a:picLocks noChangeAspect="1"/>
+          </p:cNvPicPr>
+          <p:nvPr/>
+        </p:nvPicPr>
+        <p:blipFill>
+          <a:blip r:embed="rId2">
+            <a:extLst>
+              <a:ext uri="{28A0092B-C50C-407E-A947-70E740481C1C}">
+                <a14:useLocalDpi xmlns:a14="http://schemas.microsoft.com/office/drawing/2010/main" val="0"/>
+              </a:ext>
+            </a:extLst>
+          </a:blip>
+          <a:stretch>
+            <a:fillRect/>
+          </a:stretch>
+        </p:blipFill>
+        <p:spPr>
+          <a:xfrm>
+            <a:off x="7853570" y="2714513"/>
+            <a:ext cx="3391373" cy="943107"/>
+          </a:xfrm>
+          <a:prstGeom prst="rect">
+            <a:avLst/>
+          </a:prstGeom>
+        </p:spPr>
+      </p:pic>
+      <p:sp>
+        <p:nvSpPr>
+          <p:cNvPr id="26" name="Rectangle 1">
+            <a:extLst>
+              <a:ext uri="{FF2B5EF4-FFF2-40B4-BE49-F238E27FC236}">
+                <a16:creationId xmlns:a16="http://schemas.microsoft.com/office/drawing/2014/main" id="{7BFBC24A-F140-452B-ABAF-984243FD93B1}"/>
+              </a:ext>
+            </a:extLst>
+          </p:cNvPr>
+          <p:cNvSpPr>
+            <a:spLocks noChangeArrowheads="1"/>
+          </p:cNvSpPr>
+          <p:nvPr/>
+        </p:nvSpPr>
+        <p:spPr bwMode="auto">
+          <a:xfrm>
+            <a:off x="0" y="0"/>
+            <a:ext cx="3524250" cy="0"/>
+          </a:xfrm>
+          <a:prstGeom prst="rect">
+            <a:avLst/>
+          </a:prstGeom>
+          <a:solidFill>
+            <a:srgbClr val="FFFFFF"/>
+          </a:solidFill>
+          <a:ln>
+            <a:noFill/>
+          </a:ln>
+          <a:effectLst/>
+          <a:extLst>
+            <a:ext uri="{91240B29-F687-4F45-9708-019B960494DF}">
+              <a14:hiddenLine xmlns:a14="http://schemas.microsoft.com/office/drawing/2010/main" w="9525">
+                <a:solidFill>
+                  <a:schemeClr val="tx1"/>
+                </a:solidFill>
+                <a:miter lim="800000"/>
+                <a:headEnd/>
+                <a:tailEnd/>
+              </a14:hiddenLine>
+            </a:ext>
+            <a:ext uri="{AF507438-7753-43E0-B8FC-AC1667EBCBE1}">
+              <a14:hiddenEffects xmlns:a14="http://schemas.microsoft.com/office/drawing/2010/main">
+                <a:effectLst>
+                  <a:outerShdw dist="35921" dir="2700000" algn="ctr" rotWithShape="0">
+                    <a:schemeClr val="bg2"/>
+                  </a:outerShdw>
+                </a:effectLst>
+              </a14:hiddenEffects>
+            </a:ext>
+          </a:extLst>
+        </p:spPr>
+        <p:txBody>
+          <a:bodyPr vert="horz" wrap="none" lIns="0" tIns="0" rIns="0" bIns="0" numCol="1" anchor="t" anchorCtr="0" compatLnSpc="1">
+            <a:prstTxWarp prst="textNoShape">
+              <a:avLst/>
+            </a:prstTxWarp>
+            <a:spAutoFit/>
+          </a:bodyPr>
+          <a:lstStyle/>
+          <a:p>
+            <a:pPr marL="0" marR="0" lvl="0" indent="0" algn="l" defTabSz="914400" rtl="0" eaLnBrk="0" fontAlgn="t" latinLnBrk="0" hangingPunct="0">
+              <a:lnSpc>
+                <a:spcPct val="100000"/>
+              </a:lnSpc>
+              <a:spcBef>
+                <a:spcPct val="0"/>
+              </a:spcBef>
+              <a:spcAft>
+                <a:spcPct val="0"/>
+              </a:spcAft>
+              <a:buClrTx/>
+              <a:buSzTx/>
+              <a:buFontTx/>
+              <a:buNone/>
+              <a:tabLst/>
+            </a:pPr>
+            <a:br>
+              <a:rPr kumimoji="0" lang="ko-KR" altLang="ko-KR" sz="900" b="0" i="0" u="none" strike="noStrike" cap="none" normalizeH="0" baseline="0">
+                <a:ln>
+                  <a:noFill/>
+                </a:ln>
+                <a:solidFill>
+                  <a:srgbClr val="000000"/>
+                </a:solidFill>
+                <a:effectLst/>
+                <a:latin typeface="Arial" panose="020B0604020202020204" pitchFamily="34" charset="0"/>
+                <a:ea typeface="Noto Sans"/>
+              </a:rPr>
+            </a:br>
+            <a:endParaRPr kumimoji="0" lang="ko-KR" altLang="ko-KR" sz="900" b="0" i="0" u="none" strike="noStrike" cap="none" normalizeH="0" baseline="0">
+              <a:ln>
+                <a:noFill/>
+              </a:ln>
+              <a:solidFill>
+                <a:srgbClr val="000000"/>
+              </a:solidFill>
+              <a:effectLst/>
+              <a:latin typeface="Arial" panose="020B0604020202020204" pitchFamily="34" charset="0"/>
+              <a:ea typeface="Noto Sans"/>
+            </a:endParaRPr>
+          </a:p>
+          <a:p>
+            <a:pPr marL="0" marR="0" lvl="0" indent="0" algn="l" defTabSz="914400" rtl="0" eaLnBrk="0" fontAlgn="base" latinLnBrk="0" hangingPunct="0">
+              <a:lnSpc>
+                <a:spcPct val="100000"/>
+              </a:lnSpc>
+              <a:spcBef>
+                <a:spcPct val="0"/>
+              </a:spcBef>
+              <a:spcAft>
+                <a:spcPct val="0"/>
+              </a:spcAft>
+              <a:buClrTx/>
+              <a:buSzTx/>
+              <a:buFontTx/>
+              <a:buNone/>
+              <a:tabLst/>
+            </a:pPr>
+            <a:endParaRPr kumimoji="0" lang="ko-KR" altLang="ko-KR" sz="1800" b="0" i="0" u="none" strike="noStrike" cap="none" normalizeH="0" baseline="0">
+              <a:ln>
+                <a:noFill/>
+              </a:ln>
+              <a:solidFill>
+                <a:schemeClr val="tx1"/>
+              </a:solidFill>
+              <a:effectLst/>
+              <a:latin typeface="Arial" panose="020B0604020202020204" pitchFamily="34" charset="0"/>
+            </a:endParaRPr>
+          </a:p>
+        </p:txBody>
+      </p:sp>
+      <p:sp>
+        <p:nvSpPr>
+          <p:cNvPr id="27" name="Rectangle 2">
+            <a:extLst>
+              <a:ext uri="{FF2B5EF4-FFF2-40B4-BE49-F238E27FC236}">
+                <a16:creationId xmlns:a16="http://schemas.microsoft.com/office/drawing/2014/main" id="{E1486F90-D442-4C14-9B3C-0461246E46F5}"/>
+              </a:ext>
+            </a:extLst>
+          </p:cNvPr>
+          <p:cNvSpPr>
+            <a:spLocks noChangeArrowheads="1"/>
+          </p:cNvSpPr>
+          <p:nvPr/>
+        </p:nvSpPr>
+        <p:spPr bwMode="auto">
+          <a:xfrm>
+            <a:off x="0" y="0"/>
+            <a:ext cx="3524250" cy="0"/>
+          </a:xfrm>
+          <a:prstGeom prst="rect">
+            <a:avLst/>
+          </a:prstGeom>
+          <a:solidFill>
+            <a:srgbClr val="FFFFFF"/>
+          </a:solidFill>
+          <a:ln>
+            <a:noFill/>
+          </a:ln>
+          <a:effectLst/>
+          <a:extLst>
+            <a:ext uri="{91240B29-F687-4F45-9708-019B960494DF}">
+              <a14:hiddenLine xmlns:a14="http://schemas.microsoft.com/office/drawing/2010/main" w="9525">
+                <a:solidFill>
+                  <a:schemeClr val="tx1"/>
+                </a:solidFill>
+                <a:miter lim="800000"/>
+                <a:headEnd/>
+                <a:tailEnd/>
+              </a14:hiddenLine>
+            </a:ext>
+            <a:ext uri="{AF507438-7753-43E0-B8FC-AC1667EBCBE1}">
+              <a14:hiddenEffects xmlns:a14="http://schemas.microsoft.com/office/drawing/2010/main">
+                <a:effectLst>
+                  <a:outerShdw dist="35921" dir="2700000" algn="ctr" rotWithShape="0">
+                    <a:schemeClr val="bg2"/>
+                  </a:outerShdw>
+                </a:effectLst>
+              </a14:hiddenEffects>
+            </a:ext>
+          </a:extLst>
+        </p:spPr>
+        <p:txBody>
+          <a:bodyPr vert="horz" wrap="none" lIns="91440" tIns="45720" rIns="91440" bIns="45720" numCol="1" anchor="t" anchorCtr="0" compatLnSpc="1">
+            <a:prstTxWarp prst="textNoShape">
+              <a:avLst/>
+            </a:prstTxWarp>
+            <a:spAutoFit/>
+          </a:bodyPr>
+          <a:lstStyle/>
+          <a:p>
+            <a:pPr marL="0" marR="0" lvl="0" indent="0" algn="l" defTabSz="914400" rtl="0" eaLnBrk="0" fontAlgn="t" latinLnBrk="0" hangingPunct="0">
+              <a:lnSpc>
+                <a:spcPct val="100000"/>
+              </a:lnSpc>
+              <a:spcBef>
+                <a:spcPct val="0"/>
+              </a:spcBef>
+              <a:spcAft>
+                <a:spcPct val="0"/>
+              </a:spcAft>
+              <a:buClrTx/>
+              <a:buSzTx/>
+              <a:buFontTx/>
+              <a:buNone/>
+              <a:tabLst/>
+            </a:pPr>
+            <a:r>
+              <a:rPr kumimoji="0" lang="ko-KR" altLang="ko-KR" sz="1300" b="0" i="0" u="none" strike="noStrike" cap="none" normalizeH="0" baseline="0">
+                <a:ln>
+                  <a:noFill/>
+                </a:ln>
+                <a:solidFill>
+                  <a:srgbClr val="BBBBBB"/>
+                </a:solidFill>
+                <a:effectLst/>
+                <a:latin typeface="Arial" panose="020B0604020202020204" pitchFamily="34" charset="0"/>
+                <a:ea typeface="Noto Sans"/>
+              </a:rPr>
+              <a:t>4 / 5000</a:t>
+            </a:r>
+            <a:endParaRPr kumimoji="0" lang="ko-KR" altLang="ko-KR" sz="900" b="0" i="0" u="none" strike="noStrike" cap="none" normalizeH="0" baseline="0">
+              <a:ln>
+                <a:noFill/>
+              </a:ln>
+              <a:solidFill>
+                <a:srgbClr val="000000"/>
+              </a:solidFill>
+              <a:effectLst/>
+              <a:latin typeface="Arial" panose="020B0604020202020204" pitchFamily="34" charset="0"/>
+              <a:ea typeface="Noto Sans"/>
+            </a:endParaRPr>
+          </a:p>
+          <a:p>
+            <a:pPr marL="0" marR="0" lvl="0" indent="0" algn="l" defTabSz="914400" rtl="0" eaLnBrk="0" fontAlgn="base" latinLnBrk="0" hangingPunct="0">
+              <a:lnSpc>
+                <a:spcPct val="100000"/>
+              </a:lnSpc>
+              <a:spcBef>
+                <a:spcPct val="0"/>
+              </a:spcBef>
+              <a:spcAft>
+                <a:spcPct val="0"/>
+              </a:spcAft>
+              <a:buClrTx/>
+              <a:buSzTx/>
+              <a:buFontTx/>
+              <a:buNone/>
+              <a:tabLst/>
+            </a:pPr>
+            <a:endParaRPr kumimoji="0" lang="ko-KR" altLang="ko-KR" sz="1800" b="0" i="0" u="none" strike="noStrike" cap="none" normalizeH="0" baseline="0">
+              <a:ln>
+                <a:noFill/>
+              </a:ln>
+              <a:solidFill>
+                <a:schemeClr val="tx1"/>
+              </a:solidFill>
+              <a:effectLst/>
+              <a:latin typeface="Arial" panose="020B0604020202020204" pitchFamily="34" charset="0"/>
+            </a:endParaRPr>
+          </a:p>
+        </p:txBody>
+      </p:sp>
+      <p:sp>
+        <p:nvSpPr>
+          <p:cNvPr id="28" name="Rectangle 3">
+            <a:extLst>
+              <a:ext uri="{FF2B5EF4-FFF2-40B4-BE49-F238E27FC236}">
+                <a16:creationId xmlns:a16="http://schemas.microsoft.com/office/drawing/2014/main" id="{0A8CF76F-94FA-4951-8FFE-44657878F434}"/>
+              </a:ext>
+            </a:extLst>
+          </p:cNvPr>
+          <p:cNvSpPr>
+            <a:spLocks noChangeArrowheads="1"/>
+          </p:cNvSpPr>
+          <p:nvPr/>
+        </p:nvSpPr>
+        <p:spPr bwMode="auto">
+          <a:xfrm>
+            <a:off x="0" y="0"/>
+            <a:ext cx="3524250" cy="0"/>
+          </a:xfrm>
+          <a:prstGeom prst="rect">
+            <a:avLst/>
+          </a:prstGeom>
+          <a:solidFill>
+            <a:srgbClr val="FFFFFF"/>
+          </a:solidFill>
+          <a:ln>
+            <a:noFill/>
+          </a:ln>
+          <a:effectLst/>
+          <a:extLst>
+            <a:ext uri="{91240B29-F687-4F45-9708-019B960494DF}">
+              <a14:hiddenLine xmlns:a14="http://schemas.microsoft.com/office/drawing/2010/main" w="9525">
+                <a:solidFill>
+                  <a:schemeClr val="tx1"/>
+                </a:solidFill>
+                <a:miter lim="800000"/>
+                <a:headEnd/>
+                <a:tailEnd/>
+              </a14:hiddenLine>
+            </a:ext>
+            <a:ext uri="{AF507438-7753-43E0-B8FC-AC1667EBCBE1}">
+              <a14:hiddenEffects xmlns:a14="http://schemas.microsoft.com/office/drawing/2010/main">
+                <a:effectLst>
+                  <a:outerShdw dist="35921" dir="2700000" algn="ctr" rotWithShape="0">
+                    <a:schemeClr val="bg2"/>
+                  </a:outerShdw>
+                </a:effectLst>
+              </a14:hiddenEffects>
+            </a:ext>
+          </a:extLst>
+        </p:spPr>
+        <p:txBody>
+          <a:bodyPr vert="horz" wrap="none" lIns="0" tIns="0" rIns="0" bIns="0" numCol="1" anchor="t" anchorCtr="0" compatLnSpc="1">
+            <a:prstTxWarp prst="textNoShape">
+              <a:avLst/>
+            </a:prstTxWarp>
+            <a:spAutoFit/>
+          </a:bodyPr>
+          <a:lstStyle/>
+          <a:p>
+            <a:endParaRPr lang="ko-KR" altLang="en-US"/>
+          </a:p>
+        </p:txBody>
+      </p:sp>
+      <p:sp>
+        <p:nvSpPr>
+          <p:cNvPr id="29" name="Rectangle 4">
+            <a:extLst>
+              <a:ext uri="{FF2B5EF4-FFF2-40B4-BE49-F238E27FC236}">
+                <a16:creationId xmlns:a16="http://schemas.microsoft.com/office/drawing/2014/main" id="{88612D51-5CCA-4813-A21F-B62BE90D4876}"/>
+              </a:ext>
+            </a:extLst>
+          </p:cNvPr>
+          <p:cNvSpPr>
+            <a:spLocks noChangeArrowheads="1"/>
+          </p:cNvSpPr>
+          <p:nvPr/>
+        </p:nvSpPr>
+        <p:spPr bwMode="auto">
+          <a:xfrm>
+            <a:off x="0" y="0"/>
+            <a:ext cx="3524250" cy="0"/>
+          </a:xfrm>
+          <a:prstGeom prst="rect">
+            <a:avLst/>
+          </a:prstGeom>
+          <a:solidFill>
+            <a:srgbClr val="FFFFFF"/>
+          </a:solidFill>
+          <a:ln>
+            <a:noFill/>
+          </a:ln>
+          <a:effectLst/>
+          <a:extLst>
+            <a:ext uri="{91240B29-F687-4F45-9708-019B960494DF}">
+              <a14:hiddenLine xmlns:a14="http://schemas.microsoft.com/office/drawing/2010/main" w="9525">
+                <a:solidFill>
+                  <a:schemeClr val="tx1"/>
+                </a:solidFill>
+                <a:miter lim="800000"/>
+                <a:headEnd/>
+                <a:tailEnd/>
+              </a14:hiddenLine>
+            </a:ext>
+            <a:ext uri="{AF507438-7753-43E0-B8FC-AC1667EBCBE1}">
+              <a14:hiddenEffects xmlns:a14="http://schemas.microsoft.com/office/drawing/2010/main">
+                <a:effectLst>
+                  <a:outerShdw dist="35921" dir="2700000" algn="ctr" rotWithShape="0">
+                    <a:schemeClr val="bg2"/>
+                  </a:outerShdw>
+                </a:effectLst>
+              </a14:hiddenEffects>
+            </a:ext>
+          </a:extLst>
+        </p:spPr>
+        <p:txBody>
+          <a:bodyPr vert="horz" wrap="none" lIns="0" tIns="0" rIns="0" bIns="0" numCol="1" anchor="t" anchorCtr="0" compatLnSpc="1">
+            <a:prstTxWarp prst="textNoShape">
+              <a:avLst/>
+            </a:prstTxWarp>
+            <a:spAutoFit/>
+          </a:bodyPr>
+          <a:lstStyle/>
+          <a:p>
+            <a:endParaRPr lang="ko-KR" altLang="en-US"/>
+          </a:p>
+        </p:txBody>
+      </p:sp>
+      <p:sp>
+        <p:nvSpPr>
+          <p:cNvPr id="30" name="Rectangle 5">
+            <a:extLst>
+              <a:ext uri="{FF2B5EF4-FFF2-40B4-BE49-F238E27FC236}">
+                <a16:creationId xmlns:a16="http://schemas.microsoft.com/office/drawing/2014/main" id="{F4FEF402-D9C1-4459-9191-85CCCE2519D0}"/>
+              </a:ext>
+            </a:extLst>
+          </p:cNvPr>
+          <p:cNvSpPr>
+            <a:spLocks noChangeArrowheads="1"/>
+          </p:cNvSpPr>
+          <p:nvPr/>
+        </p:nvSpPr>
+        <p:spPr bwMode="auto">
+          <a:xfrm>
+            <a:off x="0" y="0"/>
+            <a:ext cx="3524250" cy="0"/>
+          </a:xfrm>
+          <a:prstGeom prst="rect">
+            <a:avLst/>
+          </a:prstGeom>
+          <a:solidFill>
+            <a:srgbClr val="FFFFFF"/>
+          </a:solidFill>
+          <a:ln>
+            <a:noFill/>
+          </a:ln>
+          <a:effectLst/>
+          <a:extLst>
+            <a:ext uri="{91240B29-F687-4F45-9708-019B960494DF}">
+              <a14:hiddenLine xmlns:a14="http://schemas.microsoft.com/office/drawing/2010/main" w="9525">
+                <a:solidFill>
+                  <a:schemeClr val="tx1"/>
+                </a:solidFill>
+                <a:miter lim="800000"/>
+                <a:headEnd/>
+                <a:tailEnd/>
+              </a14:hiddenLine>
+            </a:ext>
+            <a:ext uri="{AF507438-7753-43E0-B8FC-AC1667EBCBE1}">
+              <a14:hiddenEffects xmlns:a14="http://schemas.microsoft.com/office/drawing/2010/main">
+                <a:effectLst>
+                  <a:outerShdw dist="35921" dir="2700000" algn="ctr" rotWithShape="0">
+                    <a:schemeClr val="bg2"/>
+                  </a:outerShdw>
+                </a:effectLst>
+              </a14:hiddenEffects>
+            </a:ext>
+          </a:extLst>
+        </p:spPr>
+        <p:txBody>
+          <a:bodyPr vert="horz" wrap="none" lIns="0" tIns="0" rIns="0" bIns="0" numCol="1" anchor="t" anchorCtr="0" compatLnSpc="1">
+            <a:prstTxWarp prst="textNoShape">
+              <a:avLst/>
+            </a:prstTxWarp>
+            <a:spAutoFit/>
+          </a:bodyPr>
+          <a:lstStyle/>
+          <a:p>
+            <a:endParaRPr lang="ko-KR" altLang="en-US"/>
+          </a:p>
+        </p:txBody>
+      </p:sp>
+      <p:sp>
+        <p:nvSpPr>
+          <p:cNvPr id="31" name="Rectangle 6">
+            <a:extLst>
+              <a:ext uri="{FF2B5EF4-FFF2-40B4-BE49-F238E27FC236}">
+                <a16:creationId xmlns:a16="http://schemas.microsoft.com/office/drawing/2014/main" id="{6DB48067-2229-45D6-A003-D1EAF1E68C96}"/>
+              </a:ext>
+            </a:extLst>
+          </p:cNvPr>
+          <p:cNvSpPr>
+            <a:spLocks noChangeArrowheads="1"/>
+          </p:cNvSpPr>
+          <p:nvPr/>
+        </p:nvSpPr>
+        <p:spPr bwMode="auto">
+          <a:xfrm>
+            <a:off x="0" y="0"/>
+            <a:ext cx="3524250" cy="0"/>
+          </a:xfrm>
+          <a:prstGeom prst="rect">
+            <a:avLst/>
+          </a:prstGeom>
+          <a:solidFill>
+            <a:srgbClr val="FFFFFF"/>
+          </a:solidFill>
+          <a:ln>
+            <a:noFill/>
+          </a:ln>
+          <a:effectLst/>
+          <a:extLst>
+            <a:ext uri="{91240B29-F687-4F45-9708-019B960494DF}">
+              <a14:hiddenLine xmlns:a14="http://schemas.microsoft.com/office/drawing/2010/main" w="9525">
+                <a:solidFill>
+                  <a:schemeClr val="tx1"/>
+                </a:solidFill>
+                <a:miter lim="800000"/>
+                <a:headEnd/>
+                <a:tailEnd/>
+              </a14:hiddenLine>
+            </a:ext>
+            <a:ext uri="{AF507438-7753-43E0-B8FC-AC1667EBCBE1}">
+              <a14:hiddenEffects xmlns:a14="http://schemas.microsoft.com/office/drawing/2010/main">
+                <a:effectLst>
+                  <a:outerShdw dist="35921" dir="2700000" algn="ctr" rotWithShape="0">
+                    <a:schemeClr val="bg2"/>
+                  </a:outerShdw>
+                </a:effectLst>
+              </a14:hiddenEffects>
+            </a:ext>
+          </a:extLst>
+        </p:spPr>
+        <p:txBody>
+          <a:bodyPr vert="horz" wrap="none" lIns="0" tIns="0" rIns="0" bIns="0" numCol="1" anchor="t" anchorCtr="0" compatLnSpc="1">
+            <a:prstTxWarp prst="textNoShape">
+              <a:avLst/>
+            </a:prstTxWarp>
+            <a:spAutoFit/>
+          </a:bodyPr>
+          <a:lstStyle/>
+          <a:p>
+            <a:endParaRPr lang="ko-KR" altLang="en-US"/>
+          </a:p>
+        </p:txBody>
+      </p:sp>
+      <p:grpSp>
+        <p:nvGrpSpPr>
+          <p:cNvPr id="36" name="그룹 35">
+            <a:extLst>
+              <a:ext uri="{FF2B5EF4-FFF2-40B4-BE49-F238E27FC236}">
+                <a16:creationId xmlns:a16="http://schemas.microsoft.com/office/drawing/2014/main" id="{7C9BB2F9-588D-4B08-AC0A-6FA2934E1209}"/>
+              </a:ext>
+            </a:extLst>
+          </p:cNvPr>
+          <p:cNvGrpSpPr/>
+          <p:nvPr/>
+        </p:nvGrpSpPr>
+        <p:grpSpPr>
+          <a:xfrm>
+            <a:off x="5864465" y="1600180"/>
+            <a:ext cx="2389839" cy="457240"/>
+            <a:chOff x="5864465" y="1600180"/>
+            <a:chExt cx="2389839" cy="457240"/>
+          </a:xfrm>
+        </p:grpSpPr>
+        <p:grpSp>
+          <p:nvGrpSpPr>
+            <p:cNvPr id="19" name="그룹 18">
+              <a:extLst>
+                <a:ext uri="{FF2B5EF4-FFF2-40B4-BE49-F238E27FC236}">
+                  <a16:creationId xmlns:a16="http://schemas.microsoft.com/office/drawing/2014/main" id="{7B92A239-AA3B-4A1D-B59E-362685712F8A}"/>
+                </a:ext>
+              </a:extLst>
+            </p:cNvPr>
+            <p:cNvGrpSpPr/>
+            <p:nvPr/>
+          </p:nvGrpSpPr>
+          <p:grpSpPr>
+            <a:xfrm>
+              <a:off x="5864465" y="1600180"/>
+              <a:ext cx="2389839" cy="457240"/>
+              <a:chOff x="5864465" y="1600180"/>
+              <a:chExt cx="2389839" cy="457240"/>
+            </a:xfrm>
+          </p:grpSpPr>
+          <p:pic>
+            <p:nvPicPr>
+              <p:cNvPr id="7" name="그림 6">
+                <a:extLst>
+                  <a:ext uri="{FF2B5EF4-FFF2-40B4-BE49-F238E27FC236}">
+                    <a16:creationId xmlns:a16="http://schemas.microsoft.com/office/drawing/2014/main" id="{99419CC4-3D15-472C-87BC-5699BD512BFF}"/>
+                  </a:ext>
+                </a:extLst>
+              </p:cNvPr>
+              <p:cNvPicPr>
+                <a:picLocks noChangeAspect="1"/>
+              </p:cNvPicPr>
+              <p:nvPr/>
+            </p:nvPicPr>
+            <p:blipFill>
+              <a:blip r:embed="rId3">
+                <a:extLst>
+                  <a:ext uri="{28A0092B-C50C-407E-A947-70E740481C1C}">
+                    <a14:useLocalDpi xmlns:a14="http://schemas.microsoft.com/office/drawing/2010/main" val="0"/>
+                  </a:ext>
+                </a:extLst>
+              </a:blip>
+              <a:stretch>
+                <a:fillRect/>
+              </a:stretch>
+            </p:blipFill>
+            <p:spPr>
+              <a:xfrm>
+                <a:off x="5864465" y="1600180"/>
+                <a:ext cx="2389839" cy="457240"/>
+              </a:xfrm>
+              <a:prstGeom prst="rect">
+                <a:avLst/>
+              </a:prstGeom>
+            </p:spPr>
+          </p:pic>
+          <p:sp>
+            <p:nvSpPr>
+              <p:cNvPr id="18" name="직사각형 17">
+                <a:extLst>
+                  <a:ext uri="{FF2B5EF4-FFF2-40B4-BE49-F238E27FC236}">
+                    <a16:creationId xmlns:a16="http://schemas.microsoft.com/office/drawing/2014/main" id="{8D284EE8-5BB6-43BF-939C-394782D5DF94}"/>
+                  </a:ext>
+                </a:extLst>
+              </p:cNvPr>
+              <p:cNvSpPr/>
+              <p:nvPr/>
+            </p:nvSpPr>
+            <p:spPr>
+              <a:xfrm>
+                <a:off x="6073140" y="1722120"/>
+                <a:ext cx="1935481" cy="213360"/>
+              </a:xfrm>
+              <a:prstGeom prst="rect">
+                <a:avLst/>
+              </a:prstGeom>
+              <a:solidFill>
+                <a:srgbClr val="4272E1"/>
+              </a:solidFill>
+              <a:ln>
+                <a:noFill/>
+              </a:ln>
+            </p:spPr>
+            <p:style>
+              <a:lnRef idx="2">
+                <a:schemeClr val="accent1">
+                  <a:shade val="50000"/>
+                </a:schemeClr>
+              </a:lnRef>
+              <a:fillRef idx="1">
+                <a:schemeClr val="accent1"/>
+              </a:fillRef>
+              <a:effectRef idx="0">
+                <a:schemeClr val="accent1"/>
+              </a:effectRef>
+              <a:fontRef idx="minor">
+                <a:schemeClr val="lt1"/>
+              </a:fontRef>
+            </p:style>
+            <p:txBody>
+              <a:bodyPr rtlCol="0" anchor="ctr"/>
+              <a:lstStyle/>
+              <a:p>
+                <a:pPr algn="ctr"/>
+                <a:endParaRPr lang="ko-KR" altLang="en-US"/>
+              </a:p>
+            </p:txBody>
+          </p:sp>
+        </p:grpSp>
+        <p:sp>
+          <p:nvSpPr>
+            <p:cNvPr id="32" name="Rectangle 7">
+              <a:extLst>
+                <a:ext uri="{FF2B5EF4-FFF2-40B4-BE49-F238E27FC236}">
+                  <a16:creationId xmlns:a16="http://schemas.microsoft.com/office/drawing/2014/main" id="{82E800AE-8E2C-494C-9B7C-0FAD8DC0DA81}"/>
+                </a:ext>
+              </a:extLst>
+            </p:cNvPr>
+            <p:cNvSpPr>
+              <a:spLocks noChangeArrowheads="1"/>
+            </p:cNvSpPr>
+            <p:nvPr/>
+          </p:nvSpPr>
+          <p:spPr bwMode="auto">
+            <a:xfrm>
+              <a:off x="6470373" y="1685371"/>
+              <a:ext cx="1335302" cy="307777"/>
+            </a:xfrm>
+            <a:prstGeom prst="rect">
+              <a:avLst/>
+            </a:prstGeom>
+            <a:noFill/>
+            <a:ln>
+              <a:noFill/>
+            </a:ln>
+            <a:effectLst/>
+          </p:spPr>
+          <p:txBody>
+            <a:bodyPr vert="horz" wrap="none" lIns="0" tIns="0" rIns="0" bIns="0" numCol="1" anchor="t" anchorCtr="0" compatLnSpc="1">
+              <a:prstTxWarp prst="textNoShape">
+                <a:avLst/>
+              </a:prstTxWarp>
+              <a:spAutoFit/>
+            </a:bodyPr>
+            <a:lstStyle>
+              <a:lvl1pPr eaLnBrk="0" fontAlgn="base" hangingPunct="0">
+                <a:spcBef>
+                  <a:spcPct val="0"/>
+                </a:spcBef>
+                <a:spcAft>
+                  <a:spcPct val="0"/>
+                </a:spcAft>
+                <a:defRPr>
+                  <a:solidFill>
+                    <a:schemeClr val="tx1"/>
+                  </a:solidFill>
+                  <a:latin typeface="Arial" panose="020B0604020202020204" pitchFamily="34" charset="0"/>
+                </a:defRPr>
+              </a:lvl1pPr>
+              <a:lvl2pPr eaLnBrk="0" fontAlgn="base" hangingPunct="0">
+                <a:spcBef>
+                  <a:spcPct val="0"/>
+                </a:spcBef>
+                <a:spcAft>
+                  <a:spcPct val="0"/>
+                </a:spcAft>
+                <a:defRPr>
+                  <a:solidFill>
+                    <a:schemeClr val="tx1"/>
+                  </a:solidFill>
+                  <a:latin typeface="Arial" panose="020B0604020202020204" pitchFamily="34" charset="0"/>
+                </a:defRPr>
+              </a:lvl2pPr>
+              <a:lvl3pPr eaLnBrk="0" fontAlgn="base" hangingPunct="0">
+                <a:spcBef>
+                  <a:spcPct val="0"/>
+                </a:spcBef>
+                <a:spcAft>
+                  <a:spcPct val="0"/>
+                </a:spcAft>
+                <a:defRPr>
+                  <a:solidFill>
+                    <a:schemeClr val="tx1"/>
+                  </a:solidFill>
+                  <a:latin typeface="Arial" panose="020B0604020202020204" pitchFamily="34" charset="0"/>
+                </a:defRPr>
+              </a:lvl3pPr>
+              <a:lvl4pPr eaLnBrk="0" fontAlgn="base" hangingPunct="0">
+                <a:spcBef>
+                  <a:spcPct val="0"/>
+                </a:spcBef>
+                <a:spcAft>
+                  <a:spcPct val="0"/>
+                </a:spcAft>
+                <a:defRPr>
+                  <a:solidFill>
+                    <a:schemeClr val="tx1"/>
+                  </a:solidFill>
+                  <a:latin typeface="Arial" panose="020B0604020202020204" pitchFamily="34" charset="0"/>
+                </a:defRPr>
+              </a:lvl4pPr>
+              <a:lvl5pPr eaLnBrk="0" fontAlgn="base" hangingPunct="0">
+                <a:spcBef>
+                  <a:spcPct val="0"/>
+                </a:spcBef>
+                <a:spcAft>
+                  <a:spcPct val="0"/>
+                </a:spcAft>
+                <a:defRPr>
+                  <a:solidFill>
+                    <a:schemeClr val="tx1"/>
+                  </a:solidFill>
+                  <a:latin typeface="Arial" panose="020B0604020202020204" pitchFamily="34" charset="0"/>
+                </a:defRPr>
+              </a:lvl5pPr>
+              <a:lvl6pPr eaLnBrk="0" fontAlgn="base" hangingPunct="0">
+                <a:spcBef>
+                  <a:spcPct val="0"/>
+                </a:spcBef>
+                <a:spcAft>
+                  <a:spcPct val="0"/>
+                </a:spcAft>
+                <a:defRPr>
+                  <a:solidFill>
+                    <a:schemeClr val="tx1"/>
+                  </a:solidFill>
+                  <a:latin typeface="Arial" panose="020B0604020202020204" pitchFamily="34" charset="0"/>
+                </a:defRPr>
+              </a:lvl6pPr>
+              <a:lvl7pPr eaLnBrk="0" fontAlgn="base" hangingPunct="0">
+                <a:spcBef>
+                  <a:spcPct val="0"/>
+                </a:spcBef>
+                <a:spcAft>
+                  <a:spcPct val="0"/>
+                </a:spcAft>
+                <a:defRPr>
+                  <a:solidFill>
+                    <a:schemeClr val="tx1"/>
+                  </a:solidFill>
+                  <a:latin typeface="Arial" panose="020B0604020202020204" pitchFamily="34" charset="0"/>
+                </a:defRPr>
+              </a:lvl7pPr>
+              <a:lvl8pPr eaLnBrk="0" fontAlgn="base" hangingPunct="0">
+                <a:spcBef>
+                  <a:spcPct val="0"/>
+                </a:spcBef>
+                <a:spcAft>
+                  <a:spcPct val="0"/>
+                </a:spcAft>
+                <a:defRPr>
+                  <a:solidFill>
+                    <a:schemeClr val="tx1"/>
+                  </a:solidFill>
+                  <a:latin typeface="Arial" panose="020B0604020202020204" pitchFamily="34" charset="0"/>
+                </a:defRPr>
+              </a:lvl8pPr>
+              <a:lvl9pPr eaLnBrk="0" fontAlgn="base" hangingPunct="0">
+                <a:spcBef>
+                  <a:spcPct val="0"/>
+                </a:spcBef>
+                <a:spcAft>
+                  <a:spcPct val="0"/>
+                </a:spcAft>
+                <a:defRPr>
+                  <a:solidFill>
+                    <a:schemeClr val="tx1"/>
+                  </a:solidFill>
+                  <a:latin typeface="Arial" panose="020B0604020202020204" pitchFamily="34" charset="0"/>
+                </a:defRPr>
+              </a:lvl9pPr>
+            </a:lstStyle>
+            <a:p>
+              <a:pPr lvl="0" fontAlgn="t" latinLnBrk="0"/>
+              <a:r>
+                <a:rPr lang="ja-JP" altLang="en-US" b="1">
+                  <a:solidFill>
+                    <a:schemeClr val="bg1"/>
+                  </a:solidFill>
+                </a:rPr>
+                <a:t> アラーム</a:t>
+              </a:r>
+              <a:r>
+                <a:rPr lang="ko-KR" altLang="en-US" sz="2000" b="1">
+                  <a:solidFill>
+                    <a:schemeClr val="bg1"/>
+                  </a:solidFill>
+                  <a:latin typeface="Arial Rounded MT Bold" panose="020F0704030504030204" pitchFamily="34" charset="0"/>
+                </a:rPr>
+                <a:t>  </a:t>
+              </a:r>
+              <a:r>
+                <a:rPr kumimoji="0" lang="en-US" altLang="ko-KR" sz="2000" b="0" i="0" u="none" strike="noStrike" cap="none" normalizeH="0" baseline="0">
+                  <a:ln>
+                    <a:noFill/>
+                  </a:ln>
+                  <a:solidFill>
+                    <a:schemeClr val="bg1"/>
+                  </a:solidFill>
+                  <a:effectLst/>
+                  <a:latin typeface="Arial" panose="020B0604020202020204" pitchFamily="34" charset="0"/>
+                  <a:ea typeface="Noto Sans"/>
+                </a:rPr>
+                <a:t>+ </a:t>
+              </a:r>
+              <a:endParaRPr kumimoji="0" lang="ko-KR" altLang="ko-KR" sz="1600" b="0" i="0" u="none" strike="noStrike" cap="none" normalizeH="0" baseline="0">
+                <a:ln>
+                  <a:noFill/>
+                </a:ln>
+                <a:solidFill>
+                  <a:schemeClr val="bg1"/>
+                </a:solidFill>
+                <a:effectLst/>
+                <a:latin typeface="Arial" panose="020B0604020202020204" pitchFamily="34" charset="0"/>
+              </a:endParaRPr>
+            </a:p>
+          </p:txBody>
+        </p:sp>
+      </p:grpSp>
+      <p:grpSp>
+        <p:nvGrpSpPr>
+          <p:cNvPr id="37" name="그룹 36">
+            <a:extLst>
+              <a:ext uri="{FF2B5EF4-FFF2-40B4-BE49-F238E27FC236}">
+                <a16:creationId xmlns:a16="http://schemas.microsoft.com/office/drawing/2014/main" id="{3E0F8DF1-194D-4306-81E1-6085278C62ED}"/>
+              </a:ext>
+            </a:extLst>
+          </p:cNvPr>
+          <p:cNvGrpSpPr/>
+          <p:nvPr/>
+        </p:nvGrpSpPr>
+        <p:grpSpPr>
+          <a:xfrm>
+            <a:off x="4901080" y="3200380"/>
+            <a:ext cx="2389839" cy="457240"/>
+            <a:chOff x="4901080" y="3200380"/>
+            <a:chExt cx="2389839" cy="457240"/>
+          </a:xfrm>
+        </p:grpSpPr>
+        <p:grpSp>
+          <p:nvGrpSpPr>
+            <p:cNvPr id="17" name="그룹 16">
+              <a:extLst>
+                <a:ext uri="{FF2B5EF4-FFF2-40B4-BE49-F238E27FC236}">
+                  <a16:creationId xmlns:a16="http://schemas.microsoft.com/office/drawing/2014/main" id="{7DC181CB-0DE0-4E51-B74D-9F950204EEF3}"/>
+                </a:ext>
+              </a:extLst>
+            </p:cNvPr>
+            <p:cNvGrpSpPr/>
+            <p:nvPr/>
+          </p:nvGrpSpPr>
+          <p:grpSpPr>
+            <a:xfrm>
+              <a:off x="4901080" y="3200380"/>
+              <a:ext cx="2389839" cy="457240"/>
+              <a:chOff x="4901080" y="3200380"/>
+              <a:chExt cx="2389839" cy="457240"/>
+            </a:xfrm>
+          </p:grpSpPr>
+          <p:pic>
+            <p:nvPicPr>
+              <p:cNvPr id="5" name="그림 4">
+                <a:extLst>
+                  <a:ext uri="{FF2B5EF4-FFF2-40B4-BE49-F238E27FC236}">
+                    <a16:creationId xmlns:a16="http://schemas.microsoft.com/office/drawing/2014/main" id="{707ECB0E-6F3A-4185-A3C5-72FAE25A6E32}"/>
+                  </a:ext>
+                </a:extLst>
+              </p:cNvPr>
+              <p:cNvPicPr>
+                <a:picLocks noChangeAspect="1"/>
+              </p:cNvPicPr>
+              <p:nvPr/>
+            </p:nvPicPr>
+            <p:blipFill>
+              <a:blip r:embed="rId4">
+                <a:extLst>
+                  <a:ext uri="{28A0092B-C50C-407E-A947-70E740481C1C}">
+                    <a14:useLocalDpi xmlns:a14="http://schemas.microsoft.com/office/drawing/2010/main" val="0"/>
+                  </a:ext>
+                </a:extLst>
+              </a:blip>
+              <a:stretch>
+                <a:fillRect/>
+              </a:stretch>
+            </p:blipFill>
+            <p:spPr>
+              <a:xfrm>
+                <a:off x="4901080" y="3200380"/>
+                <a:ext cx="2389839" cy="457240"/>
+              </a:xfrm>
+              <a:prstGeom prst="rect">
+                <a:avLst/>
+              </a:prstGeom>
+            </p:spPr>
+          </p:pic>
+          <p:sp>
+            <p:nvSpPr>
+              <p:cNvPr id="16" name="직사각형 15">
+                <a:extLst>
+                  <a:ext uri="{FF2B5EF4-FFF2-40B4-BE49-F238E27FC236}">
+                    <a16:creationId xmlns:a16="http://schemas.microsoft.com/office/drawing/2014/main" id="{627F6771-AF85-451B-AACC-9B3A37E801CE}"/>
+                  </a:ext>
+                </a:extLst>
+              </p:cNvPr>
+              <p:cNvSpPr/>
+              <p:nvPr/>
+            </p:nvSpPr>
+            <p:spPr>
+              <a:xfrm>
+                <a:off x="5554980" y="3268980"/>
+                <a:ext cx="1036320" cy="304800"/>
+              </a:xfrm>
+              <a:prstGeom prst="rect">
+                <a:avLst/>
+              </a:prstGeom>
+              <a:solidFill>
+                <a:srgbClr val="E54022"/>
+              </a:solidFill>
+              <a:ln>
+                <a:noFill/>
+              </a:ln>
+            </p:spPr>
+            <p:style>
+              <a:lnRef idx="2">
+                <a:schemeClr val="accent1">
+                  <a:shade val="50000"/>
+                </a:schemeClr>
+              </a:lnRef>
+              <a:fillRef idx="1">
+                <a:schemeClr val="accent1"/>
+              </a:fillRef>
+              <a:effectRef idx="0">
+                <a:schemeClr val="accent1"/>
+              </a:effectRef>
+              <a:fontRef idx="minor">
+                <a:schemeClr val="lt1"/>
+              </a:fontRef>
+            </p:style>
+            <p:txBody>
+              <a:bodyPr rtlCol="0" anchor="ctr"/>
+              <a:lstStyle/>
+              <a:p>
+                <a:pPr algn="ctr"/>
+                <a:endParaRPr lang="ko-KR" altLang="en-US">
+                  <a:latin typeface="DengXian" panose="02010600030101010101" pitchFamily="2" charset="-122"/>
+                </a:endParaRPr>
+              </a:p>
+            </p:txBody>
+          </p:sp>
+        </p:grpSp>
+        <p:sp>
+          <p:nvSpPr>
+            <p:cNvPr id="33" name="Rectangle 7">
+              <a:extLst>
+                <a:ext uri="{FF2B5EF4-FFF2-40B4-BE49-F238E27FC236}">
+                  <a16:creationId xmlns:a16="http://schemas.microsoft.com/office/drawing/2014/main" id="{6CA63737-A778-47B1-8755-7AC060EB7DD9}"/>
+                </a:ext>
+              </a:extLst>
+            </p:cNvPr>
+            <p:cNvSpPr>
+              <a:spLocks noChangeArrowheads="1"/>
+            </p:cNvSpPr>
+            <p:nvPr/>
+          </p:nvSpPr>
+          <p:spPr bwMode="auto">
+            <a:xfrm>
+              <a:off x="5527796" y="3258449"/>
+              <a:ext cx="1207062" cy="307777"/>
+            </a:xfrm>
+            <a:prstGeom prst="rect">
+              <a:avLst/>
+            </a:prstGeom>
+            <a:noFill/>
+            <a:ln>
+              <a:noFill/>
+            </a:ln>
+            <a:effectLst/>
+          </p:spPr>
+          <p:txBody>
+            <a:bodyPr vert="horz" wrap="none" lIns="0" tIns="0" rIns="0" bIns="0" numCol="1" anchor="t" anchorCtr="0" compatLnSpc="1">
+              <a:prstTxWarp prst="textNoShape">
+                <a:avLst/>
+              </a:prstTxWarp>
+              <a:spAutoFit/>
+            </a:bodyPr>
+            <a:lstStyle>
+              <a:lvl1pPr eaLnBrk="0" fontAlgn="base" hangingPunct="0">
+                <a:spcBef>
+                  <a:spcPct val="0"/>
+                </a:spcBef>
+                <a:spcAft>
+                  <a:spcPct val="0"/>
+                </a:spcAft>
+                <a:defRPr>
+                  <a:solidFill>
+                    <a:schemeClr val="tx1"/>
+                  </a:solidFill>
+                  <a:latin typeface="Arial" panose="020B0604020202020204" pitchFamily="34" charset="0"/>
+                </a:defRPr>
+              </a:lvl1pPr>
+              <a:lvl2pPr eaLnBrk="0" fontAlgn="base" hangingPunct="0">
+                <a:spcBef>
+                  <a:spcPct val="0"/>
+                </a:spcBef>
+                <a:spcAft>
+                  <a:spcPct val="0"/>
+                </a:spcAft>
+                <a:defRPr>
+                  <a:solidFill>
+                    <a:schemeClr val="tx1"/>
+                  </a:solidFill>
+                  <a:latin typeface="Arial" panose="020B0604020202020204" pitchFamily="34" charset="0"/>
+                </a:defRPr>
+              </a:lvl2pPr>
+              <a:lvl3pPr eaLnBrk="0" fontAlgn="base" hangingPunct="0">
+                <a:spcBef>
+                  <a:spcPct val="0"/>
+                </a:spcBef>
+                <a:spcAft>
+                  <a:spcPct val="0"/>
+                </a:spcAft>
+                <a:defRPr>
+                  <a:solidFill>
+                    <a:schemeClr val="tx1"/>
+                  </a:solidFill>
+                  <a:latin typeface="Arial" panose="020B0604020202020204" pitchFamily="34" charset="0"/>
+                </a:defRPr>
+              </a:lvl3pPr>
+              <a:lvl4pPr eaLnBrk="0" fontAlgn="base" hangingPunct="0">
+                <a:spcBef>
+                  <a:spcPct val="0"/>
+                </a:spcBef>
+                <a:spcAft>
+                  <a:spcPct val="0"/>
+                </a:spcAft>
+                <a:defRPr>
+                  <a:solidFill>
+                    <a:schemeClr val="tx1"/>
+                  </a:solidFill>
+                  <a:latin typeface="Arial" panose="020B0604020202020204" pitchFamily="34" charset="0"/>
+                </a:defRPr>
+              </a:lvl4pPr>
+              <a:lvl5pPr eaLnBrk="0" fontAlgn="base" hangingPunct="0">
+                <a:spcBef>
+                  <a:spcPct val="0"/>
+                </a:spcBef>
+                <a:spcAft>
+                  <a:spcPct val="0"/>
+                </a:spcAft>
+                <a:defRPr>
+                  <a:solidFill>
+                    <a:schemeClr val="tx1"/>
+                  </a:solidFill>
+                  <a:latin typeface="Arial" panose="020B0604020202020204" pitchFamily="34" charset="0"/>
+                </a:defRPr>
+              </a:lvl5pPr>
+              <a:lvl6pPr eaLnBrk="0" fontAlgn="base" hangingPunct="0">
+                <a:spcBef>
+                  <a:spcPct val="0"/>
+                </a:spcBef>
+                <a:spcAft>
+                  <a:spcPct val="0"/>
+                </a:spcAft>
+                <a:defRPr>
+                  <a:solidFill>
+                    <a:schemeClr val="tx1"/>
+                  </a:solidFill>
+                  <a:latin typeface="Arial" panose="020B0604020202020204" pitchFamily="34" charset="0"/>
+                </a:defRPr>
+              </a:lvl6pPr>
+              <a:lvl7pPr eaLnBrk="0" fontAlgn="base" hangingPunct="0">
+                <a:spcBef>
+                  <a:spcPct val="0"/>
+                </a:spcBef>
+                <a:spcAft>
+                  <a:spcPct val="0"/>
+                </a:spcAft>
+                <a:defRPr>
+                  <a:solidFill>
+                    <a:schemeClr val="tx1"/>
+                  </a:solidFill>
+                  <a:latin typeface="Arial" panose="020B0604020202020204" pitchFamily="34" charset="0"/>
+                </a:defRPr>
+              </a:lvl7pPr>
+              <a:lvl8pPr eaLnBrk="0" fontAlgn="base" hangingPunct="0">
+                <a:spcBef>
+                  <a:spcPct val="0"/>
+                </a:spcBef>
+                <a:spcAft>
+                  <a:spcPct val="0"/>
+                </a:spcAft>
+                <a:defRPr>
+                  <a:solidFill>
+                    <a:schemeClr val="tx1"/>
+                  </a:solidFill>
+                  <a:latin typeface="Arial" panose="020B0604020202020204" pitchFamily="34" charset="0"/>
+                </a:defRPr>
+              </a:lvl8pPr>
+              <a:lvl9pPr eaLnBrk="0" fontAlgn="base" hangingPunct="0">
+                <a:spcBef>
+                  <a:spcPct val="0"/>
+                </a:spcBef>
+                <a:spcAft>
+                  <a:spcPct val="0"/>
+                </a:spcAft>
+                <a:defRPr>
+                  <a:solidFill>
+                    <a:schemeClr val="tx1"/>
+                  </a:solidFill>
+                  <a:latin typeface="Arial" panose="020B0604020202020204" pitchFamily="34" charset="0"/>
+                </a:defRPr>
+              </a:lvl9pPr>
+            </a:lstStyle>
+            <a:p>
+              <a:pPr lvl="0" fontAlgn="t" latinLnBrk="0"/>
+              <a:r>
+                <a:rPr lang="ja-JP" altLang="en-US" b="1">
+                  <a:solidFill>
+                    <a:schemeClr val="bg1"/>
+                  </a:solidFill>
+                </a:rPr>
+                <a:t>自己診断</a:t>
+              </a:r>
+              <a:r>
+                <a:rPr lang="ko-KR" altLang="en-US" b="1">
+                  <a:solidFill>
+                    <a:schemeClr val="bg1"/>
+                  </a:solidFill>
+                  <a:latin typeface="DengXian" panose="02010600030101010101" pitchFamily="2" charset="-122"/>
+                </a:rPr>
+                <a:t> </a:t>
+              </a:r>
+              <a:r>
+                <a:rPr kumimoji="0" lang="en-US" altLang="ko-KR" sz="2000" b="1" i="0" u="none" strike="noStrike" cap="none" normalizeH="0" baseline="0">
+                  <a:ln>
+                    <a:noFill/>
+                  </a:ln>
+                  <a:solidFill>
+                    <a:schemeClr val="bg1"/>
+                  </a:solidFill>
+                  <a:effectLst/>
+                  <a:ea typeface="DengXian" panose="02010600030101010101" pitchFamily="2" charset="-122"/>
+                  <a:cs typeface="Arial" panose="020B0604020202020204" pitchFamily="34" charset="0"/>
+                </a:rPr>
+                <a:t>+</a:t>
+              </a:r>
+              <a:r>
+                <a:rPr kumimoji="0" lang="en-US" altLang="ko-KR" sz="2000" b="1" i="0" u="none" strike="noStrike" cap="none" normalizeH="0" baseline="0">
+                  <a:ln>
+                    <a:noFill/>
+                  </a:ln>
+                  <a:solidFill>
+                    <a:schemeClr val="bg1"/>
+                  </a:solidFill>
+                  <a:effectLst/>
+                  <a:latin typeface="DengXian" panose="02010600030101010101" pitchFamily="2" charset="-122"/>
+                  <a:ea typeface="DengXian" panose="02010600030101010101" pitchFamily="2" charset="-122"/>
+                </a:rPr>
+                <a:t> </a:t>
+              </a:r>
+              <a:endParaRPr kumimoji="0" lang="ko-KR" altLang="ko-KR" sz="1600" b="1" i="0" u="none" strike="noStrike" cap="none" normalizeH="0" baseline="0">
+                <a:ln>
+                  <a:noFill/>
+                </a:ln>
+                <a:solidFill>
+                  <a:schemeClr val="bg1"/>
+                </a:solidFill>
+                <a:effectLst/>
+                <a:latin typeface="DengXian" panose="02010600030101010101" pitchFamily="2" charset="-122"/>
+              </a:endParaRPr>
+            </a:p>
+          </p:txBody>
+        </p:sp>
+      </p:grpSp>
+      <p:grpSp>
+        <p:nvGrpSpPr>
+          <p:cNvPr id="38" name="그룹 37">
+            <a:extLst>
+              <a:ext uri="{FF2B5EF4-FFF2-40B4-BE49-F238E27FC236}">
+                <a16:creationId xmlns:a16="http://schemas.microsoft.com/office/drawing/2014/main" id="{0E2C2EA3-822F-4CB8-ACDF-1127A1DF8612}"/>
+              </a:ext>
+            </a:extLst>
+          </p:cNvPr>
+          <p:cNvGrpSpPr/>
+          <p:nvPr/>
+        </p:nvGrpSpPr>
+        <p:grpSpPr>
+          <a:xfrm>
+            <a:off x="3969263" y="4221440"/>
+            <a:ext cx="2389839" cy="463336"/>
+            <a:chOff x="3969263" y="4221440"/>
+            <a:chExt cx="2389839" cy="463336"/>
+          </a:xfrm>
+        </p:grpSpPr>
+        <p:grpSp>
+          <p:nvGrpSpPr>
+            <p:cNvPr id="21" name="그룹 20">
+              <a:extLst>
+                <a:ext uri="{FF2B5EF4-FFF2-40B4-BE49-F238E27FC236}">
+                  <a16:creationId xmlns:a16="http://schemas.microsoft.com/office/drawing/2014/main" id="{38EB58A5-F757-4076-A916-32D0576C97E7}"/>
+                </a:ext>
+              </a:extLst>
+            </p:cNvPr>
+            <p:cNvGrpSpPr/>
+            <p:nvPr/>
+          </p:nvGrpSpPr>
+          <p:grpSpPr>
+            <a:xfrm>
+              <a:off x="3969263" y="4221440"/>
+              <a:ext cx="2389839" cy="463336"/>
+              <a:chOff x="3969263" y="4221440"/>
+              <a:chExt cx="2389839" cy="463336"/>
+            </a:xfrm>
+          </p:grpSpPr>
+          <p:pic>
+            <p:nvPicPr>
+              <p:cNvPr id="11" name="그림 10">
+                <a:extLst>
+                  <a:ext uri="{FF2B5EF4-FFF2-40B4-BE49-F238E27FC236}">
+                    <a16:creationId xmlns:a16="http://schemas.microsoft.com/office/drawing/2014/main" id="{9C90769D-CA97-4AF7-91F5-A50261FD2A77}"/>
+                  </a:ext>
+                </a:extLst>
+              </p:cNvPr>
+              <p:cNvPicPr>
+                <a:picLocks noChangeAspect="1"/>
+              </p:cNvPicPr>
+              <p:nvPr/>
+            </p:nvPicPr>
+            <p:blipFill>
+              <a:blip r:embed="rId5">
+                <a:extLst>
+                  <a:ext uri="{28A0092B-C50C-407E-A947-70E740481C1C}">
+                    <a14:useLocalDpi xmlns:a14="http://schemas.microsoft.com/office/drawing/2010/main" val="0"/>
+                  </a:ext>
+                </a:extLst>
+              </a:blip>
+              <a:stretch>
+                <a:fillRect/>
+              </a:stretch>
+            </p:blipFill>
+            <p:spPr>
+              <a:xfrm>
+                <a:off x="3969263" y="4221440"/>
+                <a:ext cx="2389839" cy="463336"/>
+              </a:xfrm>
+              <a:prstGeom prst="rect">
+                <a:avLst/>
+              </a:prstGeom>
+            </p:spPr>
+          </p:pic>
+          <p:sp>
+            <p:nvSpPr>
+              <p:cNvPr id="20" name="직사각형 19">
+                <a:extLst>
+                  <a:ext uri="{FF2B5EF4-FFF2-40B4-BE49-F238E27FC236}">
+                    <a16:creationId xmlns:a16="http://schemas.microsoft.com/office/drawing/2014/main" id="{5DEB2F6C-748E-4B62-B726-69A2E16B6BBE}"/>
+                  </a:ext>
+                </a:extLst>
+              </p:cNvPr>
+              <p:cNvSpPr/>
+              <p:nvPr/>
+            </p:nvSpPr>
+            <p:spPr>
+              <a:xfrm>
+                <a:off x="4160518" y="4346428"/>
+                <a:ext cx="1935481" cy="213360"/>
+              </a:xfrm>
+              <a:prstGeom prst="rect">
+                <a:avLst/>
+              </a:prstGeom>
+              <a:solidFill>
+                <a:srgbClr val="686868"/>
+              </a:solidFill>
+              <a:ln>
+                <a:noFill/>
+              </a:ln>
+            </p:spPr>
+            <p:style>
+              <a:lnRef idx="2">
+                <a:schemeClr val="accent1">
+                  <a:shade val="50000"/>
+                </a:schemeClr>
+              </a:lnRef>
+              <a:fillRef idx="1">
+                <a:schemeClr val="accent1"/>
+              </a:fillRef>
+              <a:effectRef idx="0">
+                <a:schemeClr val="accent1"/>
+              </a:effectRef>
+              <a:fontRef idx="minor">
+                <a:schemeClr val="lt1"/>
+              </a:fontRef>
+            </p:style>
+            <p:txBody>
+              <a:bodyPr rtlCol="0" anchor="ctr"/>
+              <a:lstStyle/>
+              <a:p>
+                <a:pPr algn="ctr"/>
+                <a:endParaRPr lang="ko-KR" altLang="en-US">
+                  <a:latin typeface="DengXian" panose="02010600030101010101" pitchFamily="2" charset="-122"/>
+                </a:endParaRPr>
+              </a:p>
+            </p:txBody>
+          </p:sp>
+        </p:grpSp>
+        <p:sp>
+          <p:nvSpPr>
+            <p:cNvPr id="34" name="Rectangle 7">
+              <a:extLst>
+                <a:ext uri="{FF2B5EF4-FFF2-40B4-BE49-F238E27FC236}">
+                  <a16:creationId xmlns:a16="http://schemas.microsoft.com/office/drawing/2014/main" id="{6831277D-0281-476F-B3A7-B38CB1BFA46B}"/>
+                </a:ext>
+              </a:extLst>
+            </p:cNvPr>
+            <p:cNvSpPr>
+              <a:spLocks noChangeArrowheads="1"/>
+            </p:cNvSpPr>
+            <p:nvPr/>
+          </p:nvSpPr>
+          <p:spPr bwMode="auto">
+            <a:xfrm>
+              <a:off x="4160518" y="4327567"/>
+              <a:ext cx="2123979" cy="307777"/>
+            </a:xfrm>
+            <a:prstGeom prst="rect">
+              <a:avLst/>
+            </a:prstGeom>
+            <a:noFill/>
+            <a:ln>
+              <a:noFill/>
+            </a:ln>
+            <a:effectLst/>
+          </p:spPr>
+          <p:txBody>
+            <a:bodyPr vert="horz" wrap="none" lIns="0" tIns="0" rIns="0" bIns="0" numCol="1" anchor="t" anchorCtr="0" compatLnSpc="1">
+              <a:prstTxWarp prst="textNoShape">
+                <a:avLst/>
+              </a:prstTxWarp>
+              <a:spAutoFit/>
+            </a:bodyPr>
+            <a:lstStyle>
+              <a:lvl1pPr eaLnBrk="0" fontAlgn="base" hangingPunct="0">
+                <a:spcBef>
+                  <a:spcPct val="0"/>
+                </a:spcBef>
+                <a:spcAft>
+                  <a:spcPct val="0"/>
+                </a:spcAft>
+                <a:defRPr>
+                  <a:solidFill>
+                    <a:schemeClr val="tx1"/>
+                  </a:solidFill>
+                  <a:latin typeface="Arial" panose="020B0604020202020204" pitchFamily="34" charset="0"/>
+                </a:defRPr>
+              </a:lvl1pPr>
+              <a:lvl2pPr eaLnBrk="0" fontAlgn="base" hangingPunct="0">
+                <a:spcBef>
+                  <a:spcPct val="0"/>
+                </a:spcBef>
+                <a:spcAft>
+                  <a:spcPct val="0"/>
+                </a:spcAft>
+                <a:defRPr>
+                  <a:solidFill>
+                    <a:schemeClr val="tx1"/>
+                  </a:solidFill>
+                  <a:latin typeface="Arial" panose="020B0604020202020204" pitchFamily="34" charset="0"/>
+                </a:defRPr>
+              </a:lvl2pPr>
+              <a:lvl3pPr eaLnBrk="0" fontAlgn="base" hangingPunct="0">
+                <a:spcBef>
+                  <a:spcPct val="0"/>
+                </a:spcBef>
+                <a:spcAft>
+                  <a:spcPct val="0"/>
+                </a:spcAft>
+                <a:defRPr>
+                  <a:solidFill>
+                    <a:schemeClr val="tx1"/>
+                  </a:solidFill>
+                  <a:latin typeface="Arial" panose="020B0604020202020204" pitchFamily="34" charset="0"/>
+                </a:defRPr>
+              </a:lvl3pPr>
+              <a:lvl4pPr eaLnBrk="0" fontAlgn="base" hangingPunct="0">
+                <a:spcBef>
+                  <a:spcPct val="0"/>
+                </a:spcBef>
+                <a:spcAft>
+                  <a:spcPct val="0"/>
+                </a:spcAft>
+                <a:defRPr>
+                  <a:solidFill>
+                    <a:schemeClr val="tx1"/>
+                  </a:solidFill>
+                  <a:latin typeface="Arial" panose="020B0604020202020204" pitchFamily="34" charset="0"/>
+                </a:defRPr>
+              </a:lvl4pPr>
+              <a:lvl5pPr eaLnBrk="0" fontAlgn="base" hangingPunct="0">
+                <a:spcBef>
+                  <a:spcPct val="0"/>
+                </a:spcBef>
+                <a:spcAft>
+                  <a:spcPct val="0"/>
+                </a:spcAft>
+                <a:defRPr>
+                  <a:solidFill>
+                    <a:schemeClr val="tx1"/>
+                  </a:solidFill>
+                  <a:latin typeface="Arial" panose="020B0604020202020204" pitchFamily="34" charset="0"/>
+                </a:defRPr>
+              </a:lvl5pPr>
+              <a:lvl6pPr eaLnBrk="0" fontAlgn="base" hangingPunct="0">
+                <a:spcBef>
+                  <a:spcPct val="0"/>
+                </a:spcBef>
+                <a:spcAft>
+                  <a:spcPct val="0"/>
+                </a:spcAft>
+                <a:defRPr>
+                  <a:solidFill>
+                    <a:schemeClr val="tx1"/>
+                  </a:solidFill>
+                  <a:latin typeface="Arial" panose="020B0604020202020204" pitchFamily="34" charset="0"/>
+                </a:defRPr>
+              </a:lvl6pPr>
+              <a:lvl7pPr eaLnBrk="0" fontAlgn="base" hangingPunct="0">
+                <a:spcBef>
+                  <a:spcPct val="0"/>
+                </a:spcBef>
+                <a:spcAft>
+                  <a:spcPct val="0"/>
+                </a:spcAft>
+                <a:defRPr>
+                  <a:solidFill>
+                    <a:schemeClr val="tx1"/>
+                  </a:solidFill>
+                  <a:latin typeface="Arial" panose="020B0604020202020204" pitchFamily="34" charset="0"/>
+                </a:defRPr>
+              </a:lvl7pPr>
+              <a:lvl8pPr eaLnBrk="0" fontAlgn="base" hangingPunct="0">
+                <a:spcBef>
+                  <a:spcPct val="0"/>
+                </a:spcBef>
+                <a:spcAft>
+                  <a:spcPct val="0"/>
+                </a:spcAft>
+                <a:defRPr>
+                  <a:solidFill>
+                    <a:schemeClr val="tx1"/>
+                  </a:solidFill>
+                  <a:latin typeface="Arial" panose="020B0604020202020204" pitchFamily="34" charset="0"/>
+                </a:defRPr>
+              </a:lvl8pPr>
+              <a:lvl9pPr eaLnBrk="0" fontAlgn="base" hangingPunct="0">
+                <a:spcBef>
+                  <a:spcPct val="0"/>
+                </a:spcBef>
+                <a:spcAft>
+                  <a:spcPct val="0"/>
+                </a:spcAft>
+                <a:defRPr>
+                  <a:solidFill>
+                    <a:schemeClr val="tx1"/>
+                  </a:solidFill>
+                  <a:latin typeface="Arial" panose="020B0604020202020204" pitchFamily="34" charset="0"/>
+                </a:defRPr>
+              </a:lvl9pPr>
+            </a:lstStyle>
+            <a:p>
+              <a:pPr lvl="0" fontAlgn="t" latinLnBrk="0"/>
+              <a:r>
+                <a:rPr lang="ja-JP" altLang="en-US" sz="1600" b="1">
+                  <a:solidFill>
+                    <a:schemeClr val="bg1"/>
+                  </a:solidFill>
+                </a:rPr>
+                <a:t>症状及び予防の心得 </a:t>
+              </a:r>
+              <a:r>
+                <a:rPr kumimoji="0" lang="en-US" altLang="ko-KR" sz="2000" b="0" i="0" u="none" strike="noStrike" cap="none" normalizeH="0" baseline="0">
+                  <a:ln>
+                    <a:noFill/>
+                  </a:ln>
+                  <a:solidFill>
+                    <a:schemeClr val="bg1"/>
+                  </a:solidFill>
+                  <a:effectLst/>
+                  <a:ea typeface="DengXian" panose="02010600030101010101" pitchFamily="2" charset="-122"/>
+                  <a:cs typeface="Arial" panose="020B0604020202020204" pitchFamily="34" charset="0"/>
+                </a:rPr>
+                <a:t>+</a:t>
+              </a:r>
+              <a:r>
+                <a:rPr kumimoji="0" lang="en-US" altLang="ko-KR" sz="2000" b="0" i="0" u="none" strike="noStrike" cap="none" normalizeH="0" baseline="0">
+                  <a:ln>
+                    <a:noFill/>
+                  </a:ln>
+                  <a:solidFill>
+                    <a:schemeClr val="bg1"/>
+                  </a:solidFill>
+                  <a:effectLst/>
+                  <a:latin typeface="DengXian" panose="02010600030101010101" pitchFamily="2" charset="-122"/>
+                  <a:ea typeface="DengXian" panose="02010600030101010101" pitchFamily="2" charset="-122"/>
+                </a:rPr>
+                <a:t> </a:t>
+              </a:r>
+              <a:endParaRPr kumimoji="0" lang="ko-KR" altLang="ko-KR" sz="1600" b="0" i="0" u="none" strike="noStrike" cap="none" normalizeH="0" baseline="0">
+                <a:ln>
+                  <a:noFill/>
+                </a:ln>
+                <a:solidFill>
+                  <a:schemeClr val="bg1"/>
+                </a:solidFill>
+                <a:effectLst/>
+                <a:latin typeface="DengXian" panose="02010600030101010101" pitchFamily="2" charset="-122"/>
+              </a:endParaRPr>
+            </a:p>
+          </p:txBody>
+        </p:sp>
+      </p:grpSp>
+      <p:grpSp>
+        <p:nvGrpSpPr>
+          <p:cNvPr id="42" name="그룹 41">
+            <a:extLst>
+              <a:ext uri="{FF2B5EF4-FFF2-40B4-BE49-F238E27FC236}">
+                <a16:creationId xmlns:a16="http://schemas.microsoft.com/office/drawing/2014/main" id="{671FDF12-D16D-4451-A446-7187A1E6677C}"/>
+              </a:ext>
+            </a:extLst>
+          </p:cNvPr>
+          <p:cNvGrpSpPr/>
+          <p:nvPr/>
+        </p:nvGrpSpPr>
+        <p:grpSpPr>
+          <a:xfrm>
+            <a:off x="7087433" y="4221439"/>
+            <a:ext cx="2389839" cy="463336"/>
+            <a:chOff x="7087433" y="4221439"/>
+            <a:chExt cx="2389839" cy="463336"/>
+          </a:xfrm>
+        </p:grpSpPr>
+        <p:grpSp>
+          <p:nvGrpSpPr>
+            <p:cNvPr id="23" name="그룹 22">
+              <a:extLst>
+                <a:ext uri="{FF2B5EF4-FFF2-40B4-BE49-F238E27FC236}">
+                  <a16:creationId xmlns:a16="http://schemas.microsoft.com/office/drawing/2014/main" id="{F489A692-6A4F-427F-AB7F-1DF69EAB8918}"/>
+                </a:ext>
+              </a:extLst>
+            </p:cNvPr>
+            <p:cNvGrpSpPr/>
+            <p:nvPr/>
+          </p:nvGrpSpPr>
+          <p:grpSpPr>
+            <a:xfrm>
+              <a:off x="7087433" y="4221439"/>
+              <a:ext cx="2389839" cy="463336"/>
+              <a:chOff x="7159417" y="4221440"/>
+              <a:chExt cx="2389839" cy="463336"/>
+            </a:xfrm>
+          </p:grpSpPr>
+          <p:pic>
+            <p:nvPicPr>
+              <p:cNvPr id="9" name="그림 8">
+                <a:extLst>
+                  <a:ext uri="{FF2B5EF4-FFF2-40B4-BE49-F238E27FC236}">
+                    <a16:creationId xmlns:a16="http://schemas.microsoft.com/office/drawing/2014/main" id="{20B772BE-F9E1-4C37-996B-44D447865D8C}"/>
+                  </a:ext>
+                </a:extLst>
+              </p:cNvPr>
+              <p:cNvPicPr>
+                <a:picLocks noChangeAspect="1"/>
+              </p:cNvPicPr>
+              <p:nvPr/>
+            </p:nvPicPr>
+            <p:blipFill>
+              <a:blip r:embed="rId6">
+                <a:extLst>
+                  <a:ext uri="{28A0092B-C50C-407E-A947-70E740481C1C}">
+                    <a14:useLocalDpi xmlns:a14="http://schemas.microsoft.com/office/drawing/2010/main" val="0"/>
+                  </a:ext>
+                </a:extLst>
+              </a:blip>
+              <a:stretch>
+                <a:fillRect/>
+              </a:stretch>
+            </p:blipFill>
+            <p:spPr>
+              <a:xfrm>
+                <a:off x="7159417" y="4221440"/>
+                <a:ext cx="2389839" cy="463336"/>
+              </a:xfrm>
+              <a:prstGeom prst="rect">
+                <a:avLst/>
+              </a:prstGeom>
+            </p:spPr>
+          </p:pic>
+          <p:sp>
+            <p:nvSpPr>
+              <p:cNvPr id="22" name="직사각형 21">
+                <a:extLst>
+                  <a:ext uri="{FF2B5EF4-FFF2-40B4-BE49-F238E27FC236}">
+                    <a16:creationId xmlns:a16="http://schemas.microsoft.com/office/drawing/2014/main" id="{8709B4B0-FF8B-4FEE-BB18-DDCEFD6624C8}"/>
+                  </a:ext>
+                </a:extLst>
+              </p:cNvPr>
+              <p:cNvSpPr/>
+              <p:nvPr/>
+            </p:nvSpPr>
+            <p:spPr>
+              <a:xfrm>
+                <a:off x="7475220" y="4346428"/>
+                <a:ext cx="1935481" cy="213360"/>
+              </a:xfrm>
+              <a:prstGeom prst="rect">
+                <a:avLst/>
+              </a:prstGeom>
+              <a:solidFill>
+                <a:srgbClr val="ED9126"/>
+              </a:solidFill>
+              <a:ln>
+                <a:noFill/>
+              </a:ln>
+            </p:spPr>
+            <p:style>
+              <a:lnRef idx="2">
+                <a:schemeClr val="accent1">
+                  <a:shade val="50000"/>
+                </a:schemeClr>
+              </a:lnRef>
+              <a:fillRef idx="1">
+                <a:schemeClr val="accent1"/>
+              </a:fillRef>
+              <a:effectRef idx="0">
+                <a:schemeClr val="accent1"/>
+              </a:effectRef>
+              <a:fontRef idx="minor">
+                <a:schemeClr val="lt1"/>
+              </a:fontRef>
+            </p:style>
+            <p:txBody>
+              <a:bodyPr rtlCol="0" anchor="ctr"/>
+              <a:lstStyle/>
+              <a:p>
+                <a:pPr algn="ctr"/>
+                <a:endParaRPr lang="ko-KR" altLang="en-US"/>
+              </a:p>
+            </p:txBody>
+          </p:sp>
+        </p:grpSp>
+        <p:sp>
+          <p:nvSpPr>
+            <p:cNvPr id="40" name="Rectangle 7">
+              <a:extLst>
+                <a:ext uri="{FF2B5EF4-FFF2-40B4-BE49-F238E27FC236}">
+                  <a16:creationId xmlns:a16="http://schemas.microsoft.com/office/drawing/2014/main" id="{5BA552E1-F42B-4BF1-ACCA-757DCA33D8BD}"/>
+                </a:ext>
+              </a:extLst>
+            </p:cNvPr>
+            <p:cNvSpPr>
+              <a:spLocks noChangeArrowheads="1"/>
+            </p:cNvSpPr>
+            <p:nvPr/>
+          </p:nvSpPr>
+          <p:spPr bwMode="auto">
+            <a:xfrm>
+              <a:off x="7536612" y="4327566"/>
+              <a:ext cx="1715213" cy="307777"/>
+            </a:xfrm>
+            <a:prstGeom prst="rect">
+              <a:avLst/>
+            </a:prstGeom>
+            <a:noFill/>
+            <a:ln>
+              <a:noFill/>
+            </a:ln>
+            <a:effectLst/>
+          </p:spPr>
+          <p:txBody>
+            <a:bodyPr vert="horz" wrap="none" lIns="0" tIns="0" rIns="0" bIns="0" numCol="1" anchor="t" anchorCtr="0" compatLnSpc="1">
+              <a:prstTxWarp prst="textNoShape">
+                <a:avLst/>
+              </a:prstTxWarp>
+              <a:spAutoFit/>
+            </a:bodyPr>
+            <a:lstStyle>
+              <a:lvl1pPr eaLnBrk="0" fontAlgn="base" hangingPunct="0">
+                <a:spcBef>
+                  <a:spcPct val="0"/>
+                </a:spcBef>
+                <a:spcAft>
+                  <a:spcPct val="0"/>
+                </a:spcAft>
+                <a:defRPr>
+                  <a:solidFill>
+                    <a:schemeClr val="tx1"/>
+                  </a:solidFill>
+                  <a:latin typeface="Arial" panose="020B0604020202020204" pitchFamily="34" charset="0"/>
+                </a:defRPr>
+              </a:lvl1pPr>
+              <a:lvl2pPr eaLnBrk="0" fontAlgn="base" hangingPunct="0">
+                <a:spcBef>
+                  <a:spcPct val="0"/>
+                </a:spcBef>
+                <a:spcAft>
+                  <a:spcPct val="0"/>
+                </a:spcAft>
+                <a:defRPr>
+                  <a:solidFill>
+                    <a:schemeClr val="tx1"/>
+                  </a:solidFill>
+                  <a:latin typeface="Arial" panose="020B0604020202020204" pitchFamily="34" charset="0"/>
+                </a:defRPr>
+              </a:lvl2pPr>
+              <a:lvl3pPr eaLnBrk="0" fontAlgn="base" hangingPunct="0">
+                <a:spcBef>
+                  <a:spcPct val="0"/>
+                </a:spcBef>
+                <a:spcAft>
+                  <a:spcPct val="0"/>
+                </a:spcAft>
+                <a:defRPr>
+                  <a:solidFill>
+                    <a:schemeClr val="tx1"/>
+                  </a:solidFill>
+                  <a:latin typeface="Arial" panose="020B0604020202020204" pitchFamily="34" charset="0"/>
+                </a:defRPr>
+              </a:lvl3pPr>
+              <a:lvl4pPr eaLnBrk="0" fontAlgn="base" hangingPunct="0">
+                <a:spcBef>
+                  <a:spcPct val="0"/>
+                </a:spcBef>
+                <a:spcAft>
+                  <a:spcPct val="0"/>
+                </a:spcAft>
+                <a:defRPr>
+                  <a:solidFill>
+                    <a:schemeClr val="tx1"/>
+                  </a:solidFill>
+                  <a:latin typeface="Arial" panose="020B0604020202020204" pitchFamily="34" charset="0"/>
+                </a:defRPr>
+              </a:lvl4pPr>
+              <a:lvl5pPr eaLnBrk="0" fontAlgn="base" hangingPunct="0">
+                <a:spcBef>
+                  <a:spcPct val="0"/>
+                </a:spcBef>
+                <a:spcAft>
+                  <a:spcPct val="0"/>
+                </a:spcAft>
+                <a:defRPr>
+                  <a:solidFill>
+                    <a:schemeClr val="tx1"/>
+                  </a:solidFill>
+                  <a:latin typeface="Arial" panose="020B0604020202020204" pitchFamily="34" charset="0"/>
+                </a:defRPr>
+              </a:lvl5pPr>
+              <a:lvl6pPr eaLnBrk="0" fontAlgn="base" hangingPunct="0">
+                <a:spcBef>
+                  <a:spcPct val="0"/>
+                </a:spcBef>
+                <a:spcAft>
+                  <a:spcPct val="0"/>
+                </a:spcAft>
+                <a:defRPr>
+                  <a:solidFill>
+                    <a:schemeClr val="tx1"/>
+                  </a:solidFill>
+                  <a:latin typeface="Arial" panose="020B0604020202020204" pitchFamily="34" charset="0"/>
+                </a:defRPr>
+              </a:lvl6pPr>
+              <a:lvl7pPr eaLnBrk="0" fontAlgn="base" hangingPunct="0">
+                <a:spcBef>
+                  <a:spcPct val="0"/>
+                </a:spcBef>
+                <a:spcAft>
+                  <a:spcPct val="0"/>
+                </a:spcAft>
+                <a:defRPr>
+                  <a:solidFill>
+                    <a:schemeClr val="tx1"/>
+                  </a:solidFill>
+                  <a:latin typeface="Arial" panose="020B0604020202020204" pitchFamily="34" charset="0"/>
+                </a:defRPr>
+              </a:lvl7pPr>
+              <a:lvl8pPr eaLnBrk="0" fontAlgn="base" hangingPunct="0">
+                <a:spcBef>
+                  <a:spcPct val="0"/>
+                </a:spcBef>
+                <a:spcAft>
+                  <a:spcPct val="0"/>
+                </a:spcAft>
+                <a:defRPr>
+                  <a:solidFill>
+                    <a:schemeClr val="tx1"/>
+                  </a:solidFill>
+                  <a:latin typeface="Arial" panose="020B0604020202020204" pitchFamily="34" charset="0"/>
+                </a:defRPr>
+              </a:lvl8pPr>
+              <a:lvl9pPr eaLnBrk="0" fontAlgn="base" hangingPunct="0">
+                <a:spcBef>
+                  <a:spcPct val="0"/>
+                </a:spcBef>
+                <a:spcAft>
+                  <a:spcPct val="0"/>
+                </a:spcAft>
+                <a:defRPr>
+                  <a:solidFill>
+                    <a:schemeClr val="tx1"/>
+                  </a:solidFill>
+                  <a:latin typeface="Arial" panose="020B0604020202020204" pitchFamily="34" charset="0"/>
+                </a:defRPr>
+              </a:lvl9pPr>
+            </a:lstStyle>
+            <a:p>
+              <a:pPr lvl="0" fontAlgn="t" latinLnBrk="0"/>
+              <a:r>
+                <a:rPr lang="zh-TW" altLang="en-US" b="1">
+                  <a:solidFill>
+                    <a:schemeClr val="bg1"/>
+                  </a:solidFill>
+                  <a:latin typeface="Yu Gothic (본문)"/>
+                </a:rPr>
+                <a:t>電子出入名簿</a:t>
+              </a:r>
+              <a:r>
+                <a:rPr lang="ko-KR" altLang="en-US" b="1">
+                  <a:solidFill>
+                    <a:schemeClr val="bg1"/>
+                  </a:solidFill>
+                  <a:latin typeface="Yu Gothic (본문)"/>
+                </a:rPr>
+                <a:t> </a:t>
+              </a:r>
+              <a:r>
+                <a:rPr kumimoji="0" lang="en-US" altLang="ko-KR" sz="2000" b="1" i="0" u="none" strike="noStrike" cap="none" normalizeH="0" baseline="0">
+                  <a:ln>
+                    <a:noFill/>
+                  </a:ln>
+                  <a:solidFill>
+                    <a:schemeClr val="bg1"/>
+                  </a:solidFill>
+                  <a:effectLst/>
+                  <a:latin typeface="Yu Gothic (본문)"/>
+                  <a:ea typeface="DengXian" panose="02010600030101010101" pitchFamily="2" charset="-122"/>
+                  <a:cs typeface="Arial" panose="020B0604020202020204" pitchFamily="34" charset="0"/>
+                </a:rPr>
+                <a:t>+</a:t>
+              </a:r>
+              <a:r>
+                <a:rPr kumimoji="0" lang="en-US" altLang="ko-KR" sz="2000" b="1" i="0" u="none" strike="noStrike" cap="none" normalizeH="0" baseline="0">
+                  <a:ln>
+                    <a:noFill/>
+                  </a:ln>
+                  <a:solidFill>
+                    <a:schemeClr val="bg1"/>
+                  </a:solidFill>
+                  <a:effectLst/>
+                  <a:latin typeface="Yu Gothic (본문)"/>
+                  <a:ea typeface="DengXian" panose="02010600030101010101" pitchFamily="2" charset="-122"/>
+                </a:rPr>
+                <a:t> </a:t>
+              </a:r>
+              <a:endParaRPr kumimoji="0" lang="ko-KR" altLang="ko-KR" sz="1600" b="1" i="0" u="none" strike="noStrike" cap="none" normalizeH="0" baseline="0">
+                <a:ln>
+                  <a:noFill/>
+                </a:ln>
+                <a:solidFill>
+                  <a:schemeClr val="bg1"/>
+                </a:solidFill>
+                <a:effectLst/>
+                <a:latin typeface="Yu Gothic (본문)"/>
+              </a:endParaRPr>
+            </a:p>
+          </p:txBody>
+        </p:sp>
+      </p:grpSp>
+    </p:spTree>
+    <p:extLst>
+      <p:ext uri="{BB962C8B-B14F-4D97-AF65-F5344CB8AC3E}">
+        <p14:creationId xmlns:p14="http://schemas.microsoft.com/office/powerpoint/2010/main" val="3506654116"/>
+      </p:ext>
+    </p:extLst>
+  </p:cSld>
+  <p:clrMapOvr>
+    <a:masterClrMapping/>
+  </p:clrMapOvr>
+</p:sld>
+</file>
+
+<file path=ppt/slides/slide11.xml><?xml version="1.0" encoding="utf-8"?>
+<p:sld xmlns:a="http://schemas.openxmlformats.org/drawingml/2006/main" xmlns:r="http://schemas.openxmlformats.org/officeDocument/2006/relationships" xmlns:p="http://schemas.openxmlformats.org/presentationml/2006/main">
+  <p:cSld>
+    <p:spTree>
+      <p:nvGrpSpPr>
+        <p:cNvPr id="1" name=""/>
+        <p:cNvGrpSpPr/>
+        <p:nvPr/>
+      </p:nvGrpSpPr>
+      <p:grpSpPr>
+        <a:xfrm>
+          <a:off x="0" y="0"/>
+          <a:ext cx="0" cy="0"/>
+          <a:chOff x="0" y="0"/>
+          <a:chExt cx="0" cy="0"/>
+        </a:xfrm>
+      </p:grpSpPr>
+      <p:sp>
+        <p:nvSpPr>
+          <p:cNvPr id="2" name="제목 1">
+            <a:extLst>
+              <a:ext uri="{FF2B5EF4-FFF2-40B4-BE49-F238E27FC236}">
+                <a16:creationId xmlns:a16="http://schemas.microsoft.com/office/drawing/2014/main" id="{C4DFD76A-464F-4266-A3BF-B8AC92553183}"/>
+              </a:ext>
+            </a:extLst>
+          </p:cNvPr>
+          <p:cNvSpPr>
+            <a:spLocks noGrp="1"/>
+          </p:cNvSpPr>
+          <p:nvPr>
+            <p:ph type="title"/>
+          </p:nvPr>
+        </p:nvSpPr>
+        <p:spPr/>
+        <p:txBody>
+          <a:bodyPr/>
+          <a:lstStyle/>
+          <a:p>
+            <a:endParaRPr lang="ko-KR" altLang="en-US"/>
+          </a:p>
+        </p:txBody>
+      </p:sp>
+      <p:sp>
+        <p:nvSpPr>
+          <p:cNvPr id="3" name="내용 개체 틀 2">
+            <a:extLst>
+              <a:ext uri="{FF2B5EF4-FFF2-40B4-BE49-F238E27FC236}">
+                <a16:creationId xmlns:a16="http://schemas.microsoft.com/office/drawing/2014/main" id="{5652D993-3003-4301-ADD2-854584CD2AC5}"/>
+              </a:ext>
+            </a:extLst>
+          </p:cNvPr>
+          <p:cNvSpPr>
+            <a:spLocks noGrp="1"/>
+          </p:cNvSpPr>
+          <p:nvPr>
+            <p:ph idx="1"/>
+          </p:nvPr>
+        </p:nvSpPr>
+        <p:spPr/>
+        <p:txBody>
+          <a:bodyPr/>
+          <a:lstStyle/>
+          <a:p>
+            <a:endParaRPr lang="ko-KR" altLang="en-US"/>
+          </a:p>
+        </p:txBody>
+      </p:sp>
+    </p:spTree>
+    <p:extLst>
+      <p:ext uri="{BB962C8B-B14F-4D97-AF65-F5344CB8AC3E}">
+        <p14:creationId xmlns:p14="http://schemas.microsoft.com/office/powerpoint/2010/main" val="1739756706"/>
+      </p:ext>
+    </p:extLst>
+  </p:cSld>
+  <p:clrMapOvr>
+    <a:masterClrMapping/>
+  </p:clrMapOvr>
+</p:sld>
+</file>
+
+<file path=ppt/slides/slide12.xml><?xml version="1.0" encoding="utf-8"?>
+<p:sld xmlns:a="http://schemas.openxmlformats.org/drawingml/2006/main" xmlns:r="http://schemas.openxmlformats.org/officeDocument/2006/relationships" xmlns:p="http://schemas.openxmlformats.org/presentationml/2006/main">
+  <p:cSld>
+    <p:spTree>
+      <p:nvGrpSpPr>
+        <p:cNvPr id="1" name=""/>
+        <p:cNvGrpSpPr/>
+        <p:nvPr/>
+      </p:nvGrpSpPr>
+      <p:grpSpPr>
+        <a:xfrm>
+          <a:off x="0" y="0"/>
+          <a:ext cx="0" cy="0"/>
+          <a:chOff x="0" y="0"/>
+          <a:chExt cx="0" cy="0"/>
+        </a:xfrm>
+      </p:grpSpPr>
+      <p:sp>
+        <p:nvSpPr>
+          <p:cNvPr id="2" name="제목 1">
+            <a:extLst>
+              <a:ext uri="{FF2B5EF4-FFF2-40B4-BE49-F238E27FC236}">
+                <a16:creationId xmlns:a16="http://schemas.microsoft.com/office/drawing/2014/main" id="{6C9C668D-0801-4506-A5DE-ECEE5BEB251B}"/>
+              </a:ext>
+            </a:extLst>
+          </p:cNvPr>
+          <p:cNvSpPr>
+            <a:spLocks noGrp="1"/>
+          </p:cNvSpPr>
+          <p:nvPr>
+            <p:ph type="title"/>
+          </p:nvPr>
+        </p:nvSpPr>
+        <p:spPr/>
+        <p:txBody>
+          <a:bodyPr/>
+          <a:lstStyle/>
+          <a:p>
+            <a:endParaRPr lang="ko-KR" altLang="en-US"/>
+          </a:p>
+        </p:txBody>
+      </p:sp>
+      <p:sp>
+        <p:nvSpPr>
+          <p:cNvPr id="3" name="내용 개체 틀 2">
+            <a:extLst>
+              <a:ext uri="{FF2B5EF4-FFF2-40B4-BE49-F238E27FC236}">
+                <a16:creationId xmlns:a16="http://schemas.microsoft.com/office/drawing/2014/main" id="{C6E547DB-B9F2-42A3-B733-C285905347D6}"/>
+              </a:ext>
+            </a:extLst>
+          </p:cNvPr>
+          <p:cNvSpPr>
+            <a:spLocks noGrp="1"/>
+          </p:cNvSpPr>
+          <p:nvPr>
+            <p:ph idx="1"/>
+          </p:nvPr>
+        </p:nvSpPr>
+        <p:spPr/>
+        <p:txBody>
+          <a:bodyPr/>
+          <a:lstStyle/>
+          <a:p>
+            <a:endParaRPr lang="ko-KR" altLang="en-US"/>
+          </a:p>
+        </p:txBody>
+      </p:sp>
+    </p:spTree>
+    <p:extLst>
+      <p:ext uri="{BB962C8B-B14F-4D97-AF65-F5344CB8AC3E}">
+        <p14:creationId xmlns:p14="http://schemas.microsoft.com/office/powerpoint/2010/main" val="3199518705"/>
+      </p:ext>
+    </p:extLst>
+  </p:cSld>
+  <p:clrMapOvr>
+    <a:masterClrMapping/>
+  </p:clrMapOvr>
+</p:sld>
+</file>
+
+<file path=ppt/slides/slide13.xml><?xml version="1.0" encoding="utf-8"?>
+<p:sld xmlns:a="http://schemas.openxmlformats.org/drawingml/2006/main" xmlns:r="http://schemas.openxmlformats.org/officeDocument/2006/relationships" xmlns:p="http://schemas.openxmlformats.org/presentationml/2006/main">
+  <p:cSld>
+    <p:spTree>
+      <p:nvGrpSpPr>
+        <p:cNvPr id="1" name=""/>
+        <p:cNvGrpSpPr/>
+        <p:nvPr/>
+      </p:nvGrpSpPr>
+      <p:grpSpPr>
+        <a:xfrm>
+          <a:off x="0" y="0"/>
+          <a:ext cx="0" cy="0"/>
+          <a:chOff x="0" y="0"/>
+          <a:chExt cx="0" cy="0"/>
+        </a:xfrm>
+      </p:grpSpPr>
+      <p:sp>
+        <p:nvSpPr>
+          <p:cNvPr id="2" name="제목 1">
+            <a:extLst>
+              <a:ext uri="{FF2B5EF4-FFF2-40B4-BE49-F238E27FC236}">
+                <a16:creationId xmlns:a16="http://schemas.microsoft.com/office/drawing/2014/main" id="{51BC5F7B-1A00-4722-B591-E814944D3D72}"/>
+              </a:ext>
+            </a:extLst>
+          </p:cNvPr>
+          <p:cNvSpPr>
+            <a:spLocks noGrp="1"/>
+          </p:cNvSpPr>
+          <p:nvPr>
+            <p:ph type="title"/>
+          </p:nvPr>
+        </p:nvSpPr>
+        <p:spPr/>
+        <p:txBody>
+          <a:bodyPr/>
+          <a:lstStyle/>
+          <a:p>
+            <a:endParaRPr lang="ko-KR" altLang="en-US"/>
+          </a:p>
+        </p:txBody>
+      </p:sp>
+      <p:sp>
+        <p:nvSpPr>
+          <p:cNvPr id="3" name="내용 개체 틀 2">
+            <a:extLst>
+              <a:ext uri="{FF2B5EF4-FFF2-40B4-BE49-F238E27FC236}">
+                <a16:creationId xmlns:a16="http://schemas.microsoft.com/office/drawing/2014/main" id="{F39B6B8A-C682-4093-B957-95BA7E99E4E5}"/>
+              </a:ext>
+            </a:extLst>
+          </p:cNvPr>
+          <p:cNvSpPr>
+            <a:spLocks noGrp="1"/>
+          </p:cNvSpPr>
+          <p:nvPr>
+            <p:ph idx="1"/>
+          </p:nvPr>
+        </p:nvSpPr>
+        <p:spPr/>
+        <p:txBody>
+          <a:bodyPr/>
+          <a:lstStyle/>
+          <a:p>
+            <a:endParaRPr lang="ko-KR" altLang="en-US"/>
+          </a:p>
+        </p:txBody>
+      </p:sp>
+    </p:spTree>
+    <p:extLst>
+      <p:ext uri="{BB962C8B-B14F-4D97-AF65-F5344CB8AC3E}">
+        <p14:creationId xmlns:p14="http://schemas.microsoft.com/office/powerpoint/2010/main" val="4092059694"/>
+      </p:ext>
+    </p:extLst>
+  </p:cSld>
+  <p:clrMapOvr>
+    <a:masterClrMapping/>
+  </p:clrMapOvr>
+</p:sld>
+</file>
+
+<file path=ppt/slides/slide14.xml><?xml version="1.0" encoding="utf-8"?>
+<p:sld xmlns:a="http://schemas.openxmlformats.org/drawingml/2006/main" xmlns:r="http://schemas.openxmlformats.org/officeDocument/2006/relationships" xmlns:p="http://schemas.openxmlformats.org/presentationml/2006/main">
+  <p:cSld>
+    <p:spTree>
+      <p:nvGrpSpPr>
+        <p:cNvPr id="1" name=""/>
+        <p:cNvGrpSpPr/>
+        <p:nvPr/>
+      </p:nvGrpSpPr>
+      <p:grpSpPr>
+        <a:xfrm>
+          <a:off x="0" y="0"/>
+          <a:ext cx="0" cy="0"/>
+          <a:chOff x="0" y="0"/>
+          <a:chExt cx="0" cy="0"/>
+        </a:xfrm>
+      </p:grpSpPr>
       <p:sp>
         <p:nvSpPr>
           <p:cNvPr id="2" name="제목 1">
@@ -6069,7 +8293,7 @@
 </p:sld>
 </file>
 
-<file path=ppt/slides/slide11.xml><?xml version="1.0" encoding="utf-8"?>
+<file path=ppt/slides/slide15.xml><?xml version="1.0" encoding="utf-8"?>
 <p:sld xmlns:a="http://schemas.openxmlformats.org/drawingml/2006/main" xmlns:r="http://schemas.openxmlformats.org/officeDocument/2006/relationships" xmlns:p="http://schemas.openxmlformats.org/presentationml/2006/main">
   <p:cSld>
     <p:spTree>
@@ -6322,7 +8546,7 @@
 </p:sld>
 </file>
 
-<file path=ppt/slides/slide12.xml><?xml version="1.0" encoding="utf-8"?>
+<file path=ppt/slides/slide16.xml><?xml version="1.0" encoding="utf-8"?>
 <p:sld xmlns:a="http://schemas.openxmlformats.org/drawingml/2006/main" xmlns:r="http://schemas.openxmlformats.org/officeDocument/2006/relationships" xmlns:p="http://schemas.openxmlformats.org/presentationml/2006/main">
   <p:cSld>
     <p:spTree>
@@ -9469,7 +11693,7 @@
           <a:p>
             <a:pPr algn="ctr"/>
             <a:r>
-              <a:rPr lang="en-US" altLang="ko-KR" sz="600">
+              <a:rPr lang="ko-KR" altLang="en-US" sz="600">
                 <a:solidFill>
                   <a:schemeClr val="tx1"/>
                 </a:solidFill>
@@ -9477,16 +11701,8 @@
                 <a:ea typeface="LG Smart UI Bold" panose="020B0800000101010101" pitchFamily="50" charset="-127"/>
                 <a:cs typeface="Microsoft GothicNeo" panose="020B0500000101010101" pitchFamily="50" charset="-127"/>
               </a:rPr>
-              <a:t>English</a:t>
-            </a:r>
-            <a:endParaRPr lang="ko-KR" altLang="en-US" sz="600">
-              <a:solidFill>
-                <a:schemeClr val="tx1"/>
-              </a:solidFill>
-              <a:latin typeface="LG Smart UI Bold" panose="020B0800000101010101" pitchFamily="50" charset="-127"/>
-              <a:ea typeface="LG Smart UI Bold" panose="020B0800000101010101" pitchFamily="50" charset="-127"/>
-              <a:cs typeface="Microsoft GothicNeo" panose="020B0500000101010101" pitchFamily="50" charset="-127"/>
-            </a:endParaRPr>
+              <a:t>한국어</a:t>
+            </a:r>
           </a:p>
         </p:txBody>
       </p:sp>

</xml_diff>

<commit_message>
add other languages alarm
</commit_message>
<xml_diff>
--- a/화면디자인.pptx
+++ b/화면디자인.pptx
@@ -274,7 +274,7 @@
           <a:p>
             <a:fld id="{9C821A5F-709B-4F3C-8FB8-505B675E4AE3}" type="datetimeFigureOut">
               <a:rPr lang="ko-KR" altLang="en-US" smtClean="0"/>
-              <a:t>2020-11-02</a:t>
+              <a:t>2020-11-03</a:t>
             </a:fld>
             <a:endParaRPr lang="ko-KR" altLang="en-US"/>
           </a:p>
@@ -472,7 +472,7 @@
           <a:p>
             <a:fld id="{9C821A5F-709B-4F3C-8FB8-505B675E4AE3}" type="datetimeFigureOut">
               <a:rPr lang="ko-KR" altLang="en-US" smtClean="0"/>
-              <a:t>2020-11-02</a:t>
+              <a:t>2020-11-03</a:t>
             </a:fld>
             <a:endParaRPr lang="ko-KR" altLang="en-US"/>
           </a:p>
@@ -680,7 +680,7 @@
           <a:p>
             <a:fld id="{9C821A5F-709B-4F3C-8FB8-505B675E4AE3}" type="datetimeFigureOut">
               <a:rPr lang="ko-KR" altLang="en-US" smtClean="0"/>
-              <a:t>2020-11-02</a:t>
+              <a:t>2020-11-03</a:t>
             </a:fld>
             <a:endParaRPr lang="ko-KR" altLang="en-US"/>
           </a:p>
@@ -878,7 +878,7 @@
           <a:p>
             <a:fld id="{9C821A5F-709B-4F3C-8FB8-505B675E4AE3}" type="datetimeFigureOut">
               <a:rPr lang="ko-KR" altLang="en-US" smtClean="0"/>
-              <a:t>2020-11-02</a:t>
+              <a:t>2020-11-03</a:t>
             </a:fld>
             <a:endParaRPr lang="ko-KR" altLang="en-US"/>
           </a:p>
@@ -1153,7 +1153,7 @@
           <a:p>
             <a:fld id="{9C821A5F-709B-4F3C-8FB8-505B675E4AE3}" type="datetimeFigureOut">
               <a:rPr lang="ko-KR" altLang="en-US" smtClean="0"/>
-              <a:t>2020-11-02</a:t>
+              <a:t>2020-11-03</a:t>
             </a:fld>
             <a:endParaRPr lang="ko-KR" altLang="en-US"/>
           </a:p>
@@ -1418,7 +1418,7 @@
           <a:p>
             <a:fld id="{9C821A5F-709B-4F3C-8FB8-505B675E4AE3}" type="datetimeFigureOut">
               <a:rPr lang="ko-KR" altLang="en-US" smtClean="0"/>
-              <a:t>2020-11-02</a:t>
+              <a:t>2020-11-03</a:t>
             </a:fld>
             <a:endParaRPr lang="ko-KR" altLang="en-US"/>
           </a:p>
@@ -1830,7 +1830,7 @@
           <a:p>
             <a:fld id="{9C821A5F-709B-4F3C-8FB8-505B675E4AE3}" type="datetimeFigureOut">
               <a:rPr lang="ko-KR" altLang="en-US" smtClean="0"/>
-              <a:t>2020-11-02</a:t>
+              <a:t>2020-11-03</a:t>
             </a:fld>
             <a:endParaRPr lang="ko-KR" altLang="en-US"/>
           </a:p>
@@ -1971,7 +1971,7 @@
           <a:p>
             <a:fld id="{9C821A5F-709B-4F3C-8FB8-505B675E4AE3}" type="datetimeFigureOut">
               <a:rPr lang="ko-KR" altLang="en-US" smtClean="0"/>
-              <a:t>2020-11-02</a:t>
+              <a:t>2020-11-03</a:t>
             </a:fld>
             <a:endParaRPr lang="ko-KR" altLang="en-US"/>
           </a:p>
@@ -2084,7 +2084,7 @@
           <a:p>
             <a:fld id="{9C821A5F-709B-4F3C-8FB8-505B675E4AE3}" type="datetimeFigureOut">
               <a:rPr lang="ko-KR" altLang="en-US" smtClean="0"/>
-              <a:t>2020-11-02</a:t>
+              <a:t>2020-11-03</a:t>
             </a:fld>
             <a:endParaRPr lang="ko-KR" altLang="en-US"/>
           </a:p>
@@ -2395,7 +2395,7 @@
           <a:p>
             <a:fld id="{9C821A5F-709B-4F3C-8FB8-505B675E4AE3}" type="datetimeFigureOut">
               <a:rPr lang="ko-KR" altLang="en-US" smtClean="0"/>
-              <a:t>2020-11-02</a:t>
+              <a:t>2020-11-03</a:t>
             </a:fld>
             <a:endParaRPr lang="ko-KR" altLang="en-US"/>
           </a:p>
@@ -2683,7 +2683,7 @@
           <a:p>
             <a:fld id="{9C821A5F-709B-4F3C-8FB8-505B675E4AE3}" type="datetimeFigureOut">
               <a:rPr lang="ko-KR" altLang="en-US" smtClean="0"/>
-              <a:t>2020-11-02</a:t>
+              <a:t>2020-11-03</a:t>
             </a:fld>
             <a:endParaRPr lang="ko-KR" altLang="en-US"/>
           </a:p>
@@ -2924,7 +2924,7 @@
           <a:p>
             <a:fld id="{9C821A5F-709B-4F3C-8FB8-505B675E4AE3}" type="datetimeFigureOut">
               <a:rPr lang="ko-KR" altLang="en-US" smtClean="0"/>
-              <a:t>2020-11-02</a:t>
+              <a:t>2020-11-03</a:t>
             </a:fld>
             <a:endParaRPr lang="ko-KR" altLang="en-US"/>
           </a:p>
@@ -11626,7 +11626,7 @@
                 <a:ea typeface="Microsoft GothicNeo" panose="020B0500000101010101" pitchFamily="50" charset="-127"/>
                 <a:cs typeface="Microsoft GothicNeo" panose="020B0500000101010101" pitchFamily="50" charset="-127"/>
               </a:rPr>
-              <a:t>증상 및 예방수칙 </a:t>
+              <a:t>증상 및 예방수칙 챗봇 </a:t>
             </a:r>
             <a:r>
               <a:rPr lang="en-US" altLang="ko-KR" sz="1100">

</xml_diff>